<commit_message>
Updated the 'general challenges' section. Will be updated further
</commit_message>
<xml_diff>
--- a/PPT.pptx
+++ b/PPT.pptx
@@ -2,17 +2,20 @@
 <file path=ppt/presentation.xml><?xml version="1.0" encoding="utf-8"?>
 <p:presentation xmlns:a="http://schemas.openxmlformats.org/drawingml/2006/main" xmlns:r="http://schemas.openxmlformats.org/officeDocument/2006/relationships" xmlns:p="http://schemas.openxmlformats.org/presentationml/2006/main">
   <p:sldMasterIdLst>
-    <p:sldMasterId id="2147483648" r:id="rId5"/>
+    <p:sldMasterId id="2147483648" r:id="rId1"/>
   </p:sldMasterIdLst>
   <p:notesMasterIdLst>
-    <p:notesMasterId r:id="rId7"/>
+    <p:notesMasterId r:id="rId10"/>
   </p:notesMasterIdLst>
   <p:sldIdLst>
-    <p:sldId id="256" r:id="rId8"/>
-    <p:sldId id="257" r:id="rId9"/>
-    <p:sldId id="258" r:id="rId10"/>
-    <p:sldId id="259" r:id="rId11"/>
-    <p:sldId id="260" r:id="rId12"/>
+    <p:sldId id="256" r:id="rId2"/>
+    <p:sldId id="257" r:id="rId3"/>
+    <p:sldId id="261" r:id="rId4"/>
+    <p:sldId id="262" r:id="rId5"/>
+    <p:sldId id="263" r:id="rId6"/>
+    <p:sldId id="258" r:id="rId7"/>
+    <p:sldId id="259" r:id="rId8"/>
+    <p:sldId id="260" r:id="rId9"/>
   </p:sldIdLst>
   <p:sldSz cx="13004800" cy="9753600"/>
   <p:notesSz cx="6858000" cy="9144000"/>
@@ -32,7 +35,7 @@
       <a:buFontTx/>
       <a:buNone/>
       <a:tabLst/>
-      <a:defRPr b="0" baseline="0" cap="none" i="0" spc="0" strike="noStrike" sz="1800" u="none" kumimoji="0" normalizeH="0">
+      <a:defRPr kumimoji="0" sz="1800" b="0" i="0" u="none" strike="noStrike" cap="none" spc="0" normalizeH="0" baseline="0">
         <a:ln>
           <a:noFill/>
         </a:ln>
@@ -58,7 +61,7 @@
       <a:buFontTx/>
       <a:buNone/>
       <a:tabLst/>
-      <a:defRPr b="0" baseline="0" cap="none" i="0" spc="0" strike="noStrike" sz="3600" u="none" kumimoji="0" normalizeH="0">
+      <a:defRPr kumimoji="0" sz="3600" b="0" i="0" u="none" strike="noStrike" cap="none" spc="0" normalizeH="0" baseline="0">
         <a:ln>
           <a:noFill/>
         </a:ln>
@@ -88,7 +91,7 @@
       <a:buFontTx/>
       <a:buNone/>
       <a:tabLst/>
-      <a:defRPr b="0" baseline="0" cap="none" i="0" spc="0" strike="noStrike" sz="3600" u="none" kumimoji="0" normalizeH="0">
+      <a:defRPr kumimoji="0" sz="3600" b="0" i="0" u="none" strike="noStrike" cap="none" spc="0" normalizeH="0" baseline="0">
         <a:ln>
           <a:noFill/>
         </a:ln>
@@ -118,7 +121,7 @@
       <a:buFontTx/>
       <a:buNone/>
       <a:tabLst/>
-      <a:defRPr b="0" baseline="0" cap="none" i="0" spc="0" strike="noStrike" sz="3600" u="none" kumimoji="0" normalizeH="0">
+      <a:defRPr kumimoji="0" sz="3600" b="0" i="0" u="none" strike="noStrike" cap="none" spc="0" normalizeH="0" baseline="0">
         <a:ln>
           <a:noFill/>
         </a:ln>
@@ -148,7 +151,7 @@
       <a:buFontTx/>
       <a:buNone/>
       <a:tabLst/>
-      <a:defRPr b="0" baseline="0" cap="none" i="0" spc="0" strike="noStrike" sz="3600" u="none" kumimoji="0" normalizeH="0">
+      <a:defRPr kumimoji="0" sz="3600" b="0" i="0" u="none" strike="noStrike" cap="none" spc="0" normalizeH="0" baseline="0">
         <a:ln>
           <a:noFill/>
         </a:ln>
@@ -178,7 +181,7 @@
       <a:buFontTx/>
       <a:buNone/>
       <a:tabLst/>
-      <a:defRPr b="0" baseline="0" cap="none" i="0" spc="0" strike="noStrike" sz="3600" u="none" kumimoji="0" normalizeH="0">
+      <a:defRPr kumimoji="0" sz="3600" b="0" i="0" u="none" strike="noStrike" cap="none" spc="0" normalizeH="0" baseline="0">
         <a:ln>
           <a:noFill/>
         </a:ln>
@@ -208,7 +211,7 @@
       <a:buFontTx/>
       <a:buNone/>
       <a:tabLst/>
-      <a:defRPr b="0" baseline="0" cap="none" i="0" spc="0" strike="noStrike" sz="3600" u="none" kumimoji="0" normalizeH="0">
+      <a:defRPr kumimoji="0" sz="3600" b="0" i="0" u="none" strike="noStrike" cap="none" spc="0" normalizeH="0" baseline="0">
         <a:ln>
           <a:noFill/>
         </a:ln>
@@ -238,7 +241,7 @@
       <a:buFontTx/>
       <a:buNone/>
       <a:tabLst/>
-      <a:defRPr b="0" baseline="0" cap="none" i="0" spc="0" strike="noStrike" sz="3600" u="none" kumimoji="0" normalizeH="0">
+      <a:defRPr kumimoji="0" sz="3600" b="0" i="0" u="none" strike="noStrike" cap="none" spc="0" normalizeH="0" baseline="0">
         <a:ln>
           <a:noFill/>
         </a:ln>
@@ -268,7 +271,7 @@
       <a:buFontTx/>
       <a:buNone/>
       <a:tabLst/>
-      <a:defRPr b="0" baseline="0" cap="none" i="0" spc="0" strike="noStrike" sz="3600" u="none" kumimoji="0" normalizeH="0">
+      <a:defRPr kumimoji="0" sz="3600" b="0" i="0" u="none" strike="noStrike" cap="none" spc="0" normalizeH="0" baseline="0">
         <a:ln>
           <a:noFill/>
         </a:ln>
@@ -298,7 +301,7 @@
       <a:buFontTx/>
       <a:buNone/>
       <a:tabLst/>
-      <a:defRPr b="0" baseline="0" cap="none" i="0" spc="0" strike="noStrike" sz="3600" u="none" kumimoji="0" normalizeH="0">
+      <a:defRPr kumimoji="0" sz="3600" b="0" i="0" u="none" strike="noStrike" cap="none" spc="0" normalizeH="0" baseline="0">
         <a:ln>
           <a:noFill/>
         </a:ln>
@@ -317,13 +320,14 @@
 </p:presentation>
 </file>
 
-<file path=ppt/commentAuthors.xml><?xml version="1.0" encoding="utf-8"?>
-<p:cmAuthorLst xmlns:a="http://schemas.openxmlformats.org/drawingml/2006/main" xmlns:r="http://schemas.openxmlformats.org/officeDocument/2006/relationships" xmlns:p="http://schemas.openxmlformats.org/presentationml/2006/main"/>
-</file>
-
 <file path=ppt/notesMasters/notesMaster1.xml><?xml version="1.0" encoding="utf-8"?>
 <p:notesMaster xmlns:a="http://schemas.openxmlformats.org/drawingml/2006/main" xmlns:r="http://schemas.openxmlformats.org/officeDocument/2006/relationships" xmlns:p="http://schemas.openxmlformats.org/presentationml/2006/main">
   <p:cSld>
+    <p:bg>
+      <p:bgRef idx="1001">
+        <a:schemeClr val="bg1"/>
+      </p:bgRef>
+    </p:bg>
     <p:spTree>
       <p:nvGrpSpPr>
         <p:cNvPr id="1" name=""/>
@@ -341,7 +345,9 @@
       <p:sp>
         <p:nvSpPr>
           <p:cNvPr id="116" name="Shape 116"/>
-          <p:cNvSpPr/>
+          <p:cNvSpPr>
+            <a:spLocks noGrp="1" noRot="1" noChangeAspect="1"/>
+          </p:cNvSpPr>
           <p:nvPr>
             <p:ph type="sldImg"/>
           </p:nvPr>
@@ -359,14 +365,16 @@
           <a:bodyPr/>
           <a:lstStyle/>
           <a:p>
-            <a:pPr/>
+            <a:endParaRPr/>
           </a:p>
         </p:txBody>
       </p:sp>
       <p:sp>
         <p:nvSpPr>
           <p:cNvPr id="117" name="Shape 117"/>
-          <p:cNvSpPr/>
+          <p:cNvSpPr>
+            <a:spLocks noGrp="1"/>
+          </p:cNvSpPr>
           <p:nvPr>
             <p:ph type="body" sz="quarter" idx="1"/>
           </p:nvPr>
@@ -384,11 +392,16 @@
           <a:bodyPr/>
           <a:lstStyle/>
           <a:p>
-            <a:pPr/>
+            <a:endParaRPr/>
           </a:p>
         </p:txBody>
       </p:sp>
     </p:spTree>
+    <p:extLst>
+      <p:ext uri="{BB962C8B-B14F-4D97-AF65-F5344CB8AC3E}">
+        <p14:creationId xmlns:p14="http://schemas.microsoft.com/office/powerpoint/2010/main" val="127199451"/>
+      </p:ext>
+    </p:extLst>
   </p:cSld>
   <p:clrMap bg1="lt1" tx1="dk1" bg2="lt2" tx2="dk2" accent1="accent1" accent2="accent2" accent3="accent3" accent4="accent4" accent5="accent5" accent6="accent6" hlink="hlink" folHlink="folHlink"/>
   <p:notesStyle>
@@ -496,7 +509,7 @@
 </file>
 
 <file path=ppt/slideLayouts/slideLayout1.xml><?xml version="1.0" encoding="utf-8"?>
-<p:sldLayout xmlns:a="http://schemas.openxmlformats.org/drawingml/2006/main" xmlns:r="http://schemas.openxmlformats.org/officeDocument/2006/relationships" xmlns:p="http://schemas.openxmlformats.org/presentationml/2006/main" type="title" showMasterSp="1" showMasterPhAnim="1">
+<p:sldLayout xmlns:a="http://schemas.openxmlformats.org/drawingml/2006/main" xmlns:r="http://schemas.openxmlformats.org/officeDocument/2006/relationships" xmlns:p="http://schemas.openxmlformats.org/presentationml/2006/main" type="title">
   <p:cSld name="Title &amp; Subtitle">
     <p:spTree>
       <p:nvGrpSpPr>
@@ -515,7 +528,9 @@
       <p:sp>
         <p:nvSpPr>
           <p:cNvPr id="11" name="Shape 11"/>
-          <p:cNvSpPr/>
+          <p:cNvSpPr>
+            <a:spLocks noGrp="1"/>
+          </p:cNvSpPr>
           <p:nvPr>
             <p:ph type="title"/>
           </p:nvPr>
@@ -533,7 +548,6 @@
           <a:bodyPr anchor="b"/>
           <a:lstStyle/>
           <a:p>
-            <a:pPr/>
             <a:r>
               <a:t>Title Text</a:t>
             </a:r>
@@ -543,7 +557,9 @@
       <p:sp>
         <p:nvSpPr>
           <p:cNvPr id="12" name="Shape 12"/>
-          <p:cNvSpPr/>
+          <p:cNvSpPr>
+            <a:spLocks noGrp="1"/>
+          </p:cNvSpPr>
           <p:nvPr>
             <p:ph type="body" sz="quarter" idx="1"/>
           </p:nvPr>
@@ -602,7 +618,6 @@
             </a:lvl5pPr>
           </a:lstStyle>
           <a:p>
-            <a:pPr/>
             <a:r>
               <a:t>Body Level One</a:t>
             </a:r>
@@ -636,7 +651,9 @@
       <p:sp>
         <p:nvSpPr>
           <p:cNvPr id="13" name="Shape 13"/>
-          <p:cNvSpPr/>
+          <p:cNvSpPr>
+            <a:spLocks noGrp="1"/>
+          </p:cNvSpPr>
           <p:nvPr>
             <p:ph type="sldNum" sz="quarter" idx="2"/>
           </p:nvPr>
@@ -650,8 +667,10 @@
           <a:bodyPr/>
           <a:lstStyle/>
           <a:p>
-            <a:pPr/>
-            <a:fld id="{86CB4B4D-7CA3-9044-876B-883B54F8677D}" type="slidenum"/>
+            <a:fld id="{86CB4B4D-7CA3-9044-876B-883B54F8677D}" type="slidenum">
+              <a:t>‹#›</a:t>
+            </a:fld>
+            <a:endParaRPr/>
           </a:p>
         </p:txBody>
       </p:sp>
@@ -660,12 +679,12 @@
   <p:clrMapOvr>
     <a:masterClrMapping/>
   </p:clrMapOvr>
-  <p:transition xmlns:p14="http://schemas.microsoft.com/office/powerpoint/2010/main" spd="med" advClick="1"/>
+  <p:transition spd="med"/>
 </p:sldLayout>
 </file>
 
 <file path=ppt/slideLayouts/slideLayout10.xml><?xml version="1.0" encoding="utf-8"?>
-<p:sldLayout xmlns:a="http://schemas.openxmlformats.org/drawingml/2006/main" xmlns:r="http://schemas.openxmlformats.org/officeDocument/2006/relationships" xmlns:p="http://schemas.openxmlformats.org/presentationml/2006/main" type="tx" showMasterSp="1" showMasterPhAnim="1">
+<p:sldLayout xmlns:a="http://schemas.openxmlformats.org/drawingml/2006/main" xmlns:r="http://schemas.openxmlformats.org/officeDocument/2006/relationships" xmlns:p="http://schemas.openxmlformats.org/presentationml/2006/main" type="tx">
   <p:cSld name="Quote">
     <p:spTree>
       <p:nvGrpSpPr>
@@ -684,7 +703,9 @@
       <p:sp>
         <p:nvSpPr>
           <p:cNvPr id="93" name="Shape 93"/>
-          <p:cNvSpPr/>
+          <p:cNvSpPr>
+            <a:spLocks noGrp="1"/>
+          </p:cNvSpPr>
           <p:nvPr>
             <p:ph type="body" sz="quarter" idx="13"/>
           </p:nvPr>
@@ -713,7 +734,6 @@
             </a:lvl1pPr>
           </a:lstStyle>
           <a:p>
-            <a:pPr/>
             <a:r>
               <a:t>–Johnny Appleseed</a:t>
             </a:r>
@@ -723,7 +743,9 @@
       <p:sp>
         <p:nvSpPr>
           <p:cNvPr id="94" name="Shape 94"/>
-          <p:cNvSpPr/>
+          <p:cNvSpPr>
+            <a:spLocks noGrp="1"/>
+          </p:cNvSpPr>
           <p:nvPr>
             <p:ph type="body" sz="quarter" idx="14"/>
           </p:nvPr>
@@ -752,7 +774,6 @@
             </a:lvl1pPr>
           </a:lstStyle>
           <a:p>
-            <a:pPr/>
             <a:r>
               <a:t>“Type a quote here.” </a:t>
             </a:r>
@@ -762,7 +783,9 @@
       <p:sp>
         <p:nvSpPr>
           <p:cNvPr id="95" name="Shape 95"/>
-          <p:cNvSpPr/>
+          <p:cNvSpPr>
+            <a:spLocks noGrp="1"/>
+          </p:cNvSpPr>
           <p:nvPr>
             <p:ph type="sldNum" sz="quarter" idx="2"/>
           </p:nvPr>
@@ -776,8 +799,10 @@
           <a:bodyPr/>
           <a:lstStyle/>
           <a:p>
-            <a:pPr/>
-            <a:fld id="{86CB4B4D-7CA3-9044-876B-883B54F8677D}" type="slidenum"/>
+            <a:fld id="{86CB4B4D-7CA3-9044-876B-883B54F8677D}" type="slidenum">
+              <a:t>‹#›</a:t>
+            </a:fld>
+            <a:endParaRPr/>
           </a:p>
         </p:txBody>
       </p:sp>
@@ -786,12 +811,12 @@
   <p:clrMapOvr>
     <a:masterClrMapping/>
   </p:clrMapOvr>
-  <p:transition xmlns:p14="http://schemas.microsoft.com/office/powerpoint/2010/main" spd="med" advClick="1"/>
+  <p:transition spd="med"/>
 </p:sldLayout>
 </file>
 
 <file path=ppt/slideLayouts/slideLayout11.xml><?xml version="1.0" encoding="utf-8"?>
-<p:sldLayout xmlns:a="http://schemas.openxmlformats.org/drawingml/2006/main" xmlns:r="http://schemas.openxmlformats.org/officeDocument/2006/relationships" xmlns:p="http://schemas.openxmlformats.org/presentationml/2006/main" type="tx" showMasterSp="1" showMasterPhAnim="1">
+<p:sldLayout xmlns:a="http://schemas.openxmlformats.org/drawingml/2006/main" xmlns:r="http://schemas.openxmlformats.org/officeDocument/2006/relationships" xmlns:p="http://schemas.openxmlformats.org/presentationml/2006/main" type="tx">
   <p:cSld name="Photo">
     <p:spTree>
       <p:nvGrpSpPr>
@@ -810,7 +835,9 @@
       <p:sp>
         <p:nvSpPr>
           <p:cNvPr id="102" name="Shape 102"/>
-          <p:cNvSpPr/>
+          <p:cNvSpPr>
+            <a:spLocks noGrp="1"/>
+          </p:cNvSpPr>
           <p:nvPr>
             <p:ph type="pic" idx="13"/>
           </p:nvPr>
@@ -830,14 +857,16 @@
           </a:bodyPr>
           <a:lstStyle/>
           <a:p>
-            <a:pPr/>
+            <a:endParaRPr/>
           </a:p>
         </p:txBody>
       </p:sp>
       <p:sp>
         <p:nvSpPr>
           <p:cNvPr id="103" name="Shape 103"/>
-          <p:cNvSpPr/>
+          <p:cNvSpPr>
+            <a:spLocks noGrp="1"/>
+          </p:cNvSpPr>
           <p:nvPr>
             <p:ph type="sldNum" sz="quarter" idx="2"/>
           </p:nvPr>
@@ -851,8 +880,10 @@
           <a:bodyPr/>
           <a:lstStyle/>
           <a:p>
-            <a:pPr/>
-            <a:fld id="{86CB4B4D-7CA3-9044-876B-883B54F8677D}" type="slidenum"/>
+            <a:fld id="{86CB4B4D-7CA3-9044-876B-883B54F8677D}" type="slidenum">
+              <a:t>‹#›</a:t>
+            </a:fld>
+            <a:endParaRPr/>
           </a:p>
         </p:txBody>
       </p:sp>
@@ -861,12 +892,12 @@
   <p:clrMapOvr>
     <a:masterClrMapping/>
   </p:clrMapOvr>
-  <p:transition xmlns:p14="http://schemas.microsoft.com/office/powerpoint/2010/main" spd="med" advClick="1"/>
+  <p:transition spd="med"/>
 </p:sldLayout>
 </file>
 
 <file path=ppt/slideLayouts/slideLayout12.xml><?xml version="1.0" encoding="utf-8"?>
-<p:sldLayout xmlns:a="http://schemas.openxmlformats.org/drawingml/2006/main" xmlns:r="http://schemas.openxmlformats.org/officeDocument/2006/relationships" xmlns:p="http://schemas.openxmlformats.org/presentationml/2006/main" type="tx" showMasterSp="1" showMasterPhAnim="1">
+<p:sldLayout xmlns:a="http://schemas.openxmlformats.org/drawingml/2006/main" xmlns:r="http://schemas.openxmlformats.org/officeDocument/2006/relationships" xmlns:p="http://schemas.openxmlformats.org/presentationml/2006/main" type="tx">
   <p:cSld name="Blank">
     <p:spTree>
       <p:nvGrpSpPr>
@@ -885,7 +916,9 @@
       <p:sp>
         <p:nvSpPr>
           <p:cNvPr id="110" name="Shape 110"/>
-          <p:cNvSpPr/>
+          <p:cNvSpPr>
+            <a:spLocks noGrp="1"/>
+          </p:cNvSpPr>
           <p:nvPr>
             <p:ph type="sldNum" sz="quarter" idx="2"/>
           </p:nvPr>
@@ -899,8 +932,10 @@
           <a:bodyPr/>
           <a:lstStyle/>
           <a:p>
-            <a:pPr/>
-            <a:fld id="{86CB4B4D-7CA3-9044-876B-883B54F8677D}" type="slidenum"/>
+            <a:fld id="{86CB4B4D-7CA3-9044-876B-883B54F8677D}" type="slidenum">
+              <a:t>‹#›</a:t>
+            </a:fld>
+            <a:endParaRPr/>
           </a:p>
         </p:txBody>
       </p:sp>
@@ -909,12 +944,12 @@
   <p:clrMapOvr>
     <a:masterClrMapping/>
   </p:clrMapOvr>
-  <p:transition xmlns:p14="http://schemas.microsoft.com/office/powerpoint/2010/main" spd="med" advClick="1"/>
+  <p:transition spd="med"/>
 </p:sldLayout>
 </file>
 
 <file path=ppt/slideLayouts/slideLayout2.xml><?xml version="1.0" encoding="utf-8"?>
-<p:sldLayout xmlns:a="http://schemas.openxmlformats.org/drawingml/2006/main" xmlns:r="http://schemas.openxmlformats.org/officeDocument/2006/relationships" xmlns:p="http://schemas.openxmlformats.org/presentationml/2006/main" type="tx" showMasterSp="1" showMasterPhAnim="1">
+<p:sldLayout xmlns:a="http://schemas.openxmlformats.org/drawingml/2006/main" xmlns:r="http://schemas.openxmlformats.org/officeDocument/2006/relationships" xmlns:p="http://schemas.openxmlformats.org/presentationml/2006/main" type="tx">
   <p:cSld name="Photo - Horizontal">
     <p:spTree>
       <p:nvGrpSpPr>
@@ -933,7 +968,9 @@
       <p:sp>
         <p:nvSpPr>
           <p:cNvPr id="20" name="Shape 20"/>
-          <p:cNvSpPr/>
+          <p:cNvSpPr>
+            <a:spLocks noGrp="1"/>
+          </p:cNvSpPr>
           <p:nvPr>
             <p:ph type="pic" idx="13"/>
           </p:nvPr>
@@ -953,14 +990,16 @@
           </a:bodyPr>
           <a:lstStyle/>
           <a:p>
-            <a:pPr/>
+            <a:endParaRPr/>
           </a:p>
         </p:txBody>
       </p:sp>
       <p:sp>
         <p:nvSpPr>
           <p:cNvPr id="21" name="Shape 21"/>
-          <p:cNvSpPr/>
+          <p:cNvSpPr>
+            <a:spLocks noGrp="1"/>
+          </p:cNvSpPr>
           <p:nvPr>
             <p:ph type="title"/>
           </p:nvPr>
@@ -978,7 +1017,6 @@
           <a:bodyPr anchor="b"/>
           <a:lstStyle/>
           <a:p>
-            <a:pPr/>
             <a:r>
               <a:t>Title Text</a:t>
             </a:r>
@@ -988,7 +1026,9 @@
       <p:sp>
         <p:nvSpPr>
           <p:cNvPr id="22" name="Shape 22"/>
-          <p:cNvSpPr/>
+          <p:cNvSpPr>
+            <a:spLocks noGrp="1"/>
+          </p:cNvSpPr>
           <p:nvPr>
             <p:ph type="body" sz="quarter" idx="1"/>
           </p:nvPr>
@@ -1047,7 +1087,6 @@
             </a:lvl5pPr>
           </a:lstStyle>
           <a:p>
-            <a:pPr/>
             <a:r>
               <a:t>Body Level One</a:t>
             </a:r>
@@ -1081,7 +1120,9 @@
       <p:sp>
         <p:nvSpPr>
           <p:cNvPr id="23" name="Shape 23"/>
-          <p:cNvSpPr/>
+          <p:cNvSpPr>
+            <a:spLocks noGrp="1"/>
+          </p:cNvSpPr>
           <p:nvPr>
             <p:ph type="sldNum" sz="quarter" idx="2"/>
           </p:nvPr>
@@ -1099,8 +1140,10 @@
           <a:bodyPr/>
           <a:lstStyle/>
           <a:p>
-            <a:pPr/>
-            <a:fld id="{86CB4B4D-7CA3-9044-876B-883B54F8677D}" type="slidenum"/>
+            <a:fld id="{86CB4B4D-7CA3-9044-876B-883B54F8677D}" type="slidenum">
+              <a:t>‹#›</a:t>
+            </a:fld>
+            <a:endParaRPr/>
           </a:p>
         </p:txBody>
       </p:sp>
@@ -1109,12 +1152,12 @@
   <p:clrMapOvr>
     <a:masterClrMapping/>
   </p:clrMapOvr>
-  <p:transition xmlns:p14="http://schemas.microsoft.com/office/powerpoint/2010/main" spd="med" advClick="1"/>
+  <p:transition spd="med"/>
 </p:sldLayout>
 </file>
 
 <file path=ppt/slideLayouts/slideLayout3.xml><?xml version="1.0" encoding="utf-8"?>
-<p:sldLayout xmlns:a="http://schemas.openxmlformats.org/drawingml/2006/main" xmlns:r="http://schemas.openxmlformats.org/officeDocument/2006/relationships" xmlns:p="http://schemas.openxmlformats.org/presentationml/2006/main" type="tx" showMasterSp="1" showMasterPhAnim="1">
+<p:sldLayout xmlns:a="http://schemas.openxmlformats.org/drawingml/2006/main" xmlns:r="http://schemas.openxmlformats.org/officeDocument/2006/relationships" xmlns:p="http://schemas.openxmlformats.org/presentationml/2006/main" type="tx">
   <p:cSld name="Title - Center">
     <p:spTree>
       <p:nvGrpSpPr>
@@ -1133,7 +1176,9 @@
       <p:sp>
         <p:nvSpPr>
           <p:cNvPr id="30" name="Shape 30"/>
-          <p:cNvSpPr/>
+          <p:cNvSpPr>
+            <a:spLocks noGrp="1"/>
+          </p:cNvSpPr>
           <p:nvPr>
             <p:ph type="title"/>
           </p:nvPr>
@@ -1151,7 +1196,6 @@
           <a:bodyPr/>
           <a:lstStyle/>
           <a:p>
-            <a:pPr/>
             <a:r>
               <a:t>Title Text</a:t>
             </a:r>
@@ -1161,7 +1205,9 @@
       <p:sp>
         <p:nvSpPr>
           <p:cNvPr id="31" name="Shape 31"/>
-          <p:cNvSpPr/>
+          <p:cNvSpPr>
+            <a:spLocks noGrp="1"/>
+          </p:cNvSpPr>
           <p:nvPr>
             <p:ph type="sldNum" sz="quarter" idx="2"/>
           </p:nvPr>
@@ -1175,8 +1221,10 @@
           <a:bodyPr/>
           <a:lstStyle/>
           <a:p>
-            <a:pPr/>
-            <a:fld id="{86CB4B4D-7CA3-9044-876B-883B54F8677D}" type="slidenum"/>
+            <a:fld id="{86CB4B4D-7CA3-9044-876B-883B54F8677D}" type="slidenum">
+              <a:t>‹#›</a:t>
+            </a:fld>
+            <a:endParaRPr/>
           </a:p>
         </p:txBody>
       </p:sp>
@@ -1185,12 +1233,12 @@
   <p:clrMapOvr>
     <a:masterClrMapping/>
   </p:clrMapOvr>
-  <p:transition xmlns:p14="http://schemas.microsoft.com/office/powerpoint/2010/main" spd="med" advClick="1"/>
+  <p:transition spd="med"/>
 </p:sldLayout>
 </file>
 
 <file path=ppt/slideLayouts/slideLayout4.xml><?xml version="1.0" encoding="utf-8"?>
-<p:sldLayout xmlns:a="http://schemas.openxmlformats.org/drawingml/2006/main" xmlns:r="http://schemas.openxmlformats.org/officeDocument/2006/relationships" xmlns:p="http://schemas.openxmlformats.org/presentationml/2006/main" type="tx" showMasterSp="1" showMasterPhAnim="1">
+<p:sldLayout xmlns:a="http://schemas.openxmlformats.org/drawingml/2006/main" xmlns:r="http://schemas.openxmlformats.org/officeDocument/2006/relationships" xmlns:p="http://schemas.openxmlformats.org/presentationml/2006/main" type="tx">
   <p:cSld name="Photo - Vertical">
     <p:spTree>
       <p:nvGrpSpPr>
@@ -1209,7 +1257,9 @@
       <p:sp>
         <p:nvSpPr>
           <p:cNvPr id="38" name="Shape 38"/>
-          <p:cNvSpPr/>
+          <p:cNvSpPr>
+            <a:spLocks noGrp="1"/>
+          </p:cNvSpPr>
           <p:nvPr>
             <p:ph type="pic" sz="half" idx="13"/>
           </p:nvPr>
@@ -1229,14 +1279,16 @@
           </a:bodyPr>
           <a:lstStyle/>
           <a:p>
-            <a:pPr/>
+            <a:endParaRPr/>
           </a:p>
         </p:txBody>
       </p:sp>
       <p:sp>
         <p:nvSpPr>
           <p:cNvPr id="39" name="Shape 39"/>
-          <p:cNvSpPr/>
+          <p:cNvSpPr>
+            <a:spLocks noGrp="1"/>
+          </p:cNvSpPr>
           <p:nvPr>
             <p:ph type="title"/>
           </p:nvPr>
@@ -1258,7 +1310,6 @@
             </a:lvl1pPr>
           </a:lstStyle>
           <a:p>
-            <a:pPr/>
             <a:r>
               <a:t>Title Text</a:t>
             </a:r>
@@ -1268,7 +1319,9 @@
       <p:sp>
         <p:nvSpPr>
           <p:cNvPr id="40" name="Shape 40"/>
-          <p:cNvSpPr/>
+          <p:cNvSpPr>
+            <a:spLocks noGrp="1"/>
+          </p:cNvSpPr>
           <p:nvPr>
             <p:ph type="body" sz="quarter" idx="1"/>
           </p:nvPr>
@@ -1327,7 +1380,6 @@
             </a:lvl5pPr>
           </a:lstStyle>
           <a:p>
-            <a:pPr/>
             <a:r>
               <a:t>Body Level One</a:t>
             </a:r>
@@ -1361,7 +1413,9 @@
       <p:sp>
         <p:nvSpPr>
           <p:cNvPr id="41" name="Shape 41"/>
-          <p:cNvSpPr/>
+          <p:cNvSpPr>
+            <a:spLocks noGrp="1"/>
+          </p:cNvSpPr>
           <p:nvPr>
             <p:ph type="sldNum" sz="quarter" idx="2"/>
           </p:nvPr>
@@ -1375,8 +1429,10 @@
           <a:bodyPr/>
           <a:lstStyle/>
           <a:p>
-            <a:pPr/>
-            <a:fld id="{86CB4B4D-7CA3-9044-876B-883B54F8677D}" type="slidenum"/>
+            <a:fld id="{86CB4B4D-7CA3-9044-876B-883B54F8677D}" type="slidenum">
+              <a:t>‹#›</a:t>
+            </a:fld>
+            <a:endParaRPr/>
           </a:p>
         </p:txBody>
       </p:sp>
@@ -1385,12 +1441,12 @@
   <p:clrMapOvr>
     <a:masterClrMapping/>
   </p:clrMapOvr>
-  <p:transition xmlns:p14="http://schemas.microsoft.com/office/powerpoint/2010/main" spd="med" advClick="1"/>
+  <p:transition spd="med"/>
 </p:sldLayout>
 </file>
 
 <file path=ppt/slideLayouts/slideLayout5.xml><?xml version="1.0" encoding="utf-8"?>
-<p:sldLayout xmlns:a="http://schemas.openxmlformats.org/drawingml/2006/main" xmlns:r="http://schemas.openxmlformats.org/officeDocument/2006/relationships" xmlns:p="http://schemas.openxmlformats.org/presentationml/2006/main" type="tx" showMasterSp="1" showMasterPhAnim="1">
+<p:sldLayout xmlns:a="http://schemas.openxmlformats.org/drawingml/2006/main" xmlns:r="http://schemas.openxmlformats.org/officeDocument/2006/relationships" xmlns:p="http://schemas.openxmlformats.org/presentationml/2006/main" type="tx">
   <p:cSld name="Title - Top">
     <p:spTree>
       <p:nvGrpSpPr>
@@ -1409,7 +1465,9 @@
       <p:sp>
         <p:nvSpPr>
           <p:cNvPr id="48" name="Shape 48"/>
-          <p:cNvSpPr/>
+          <p:cNvSpPr>
+            <a:spLocks noGrp="1"/>
+          </p:cNvSpPr>
           <p:nvPr>
             <p:ph type="title"/>
           </p:nvPr>
@@ -1423,7 +1481,6 @@
           <a:bodyPr/>
           <a:lstStyle/>
           <a:p>
-            <a:pPr/>
             <a:r>
               <a:t>Title Text</a:t>
             </a:r>
@@ -1433,7 +1490,9 @@
       <p:sp>
         <p:nvSpPr>
           <p:cNvPr id="49" name="Shape 49"/>
-          <p:cNvSpPr/>
+          <p:cNvSpPr>
+            <a:spLocks noGrp="1"/>
+          </p:cNvSpPr>
           <p:nvPr>
             <p:ph type="sldNum" sz="quarter" idx="2"/>
           </p:nvPr>
@@ -1447,8 +1506,10 @@
           <a:bodyPr/>
           <a:lstStyle/>
           <a:p>
-            <a:pPr/>
-            <a:fld id="{86CB4B4D-7CA3-9044-876B-883B54F8677D}" type="slidenum"/>
+            <a:fld id="{86CB4B4D-7CA3-9044-876B-883B54F8677D}" type="slidenum">
+              <a:t>‹#›</a:t>
+            </a:fld>
+            <a:endParaRPr/>
           </a:p>
         </p:txBody>
       </p:sp>
@@ -1457,12 +1518,12 @@
   <p:clrMapOvr>
     <a:masterClrMapping/>
   </p:clrMapOvr>
-  <p:transition xmlns:p14="http://schemas.microsoft.com/office/powerpoint/2010/main" spd="med" advClick="1"/>
+  <p:transition spd="med"/>
 </p:sldLayout>
 </file>
 
 <file path=ppt/slideLayouts/slideLayout6.xml><?xml version="1.0" encoding="utf-8"?>
-<p:sldLayout xmlns:a="http://schemas.openxmlformats.org/drawingml/2006/main" xmlns:r="http://schemas.openxmlformats.org/officeDocument/2006/relationships" xmlns:p="http://schemas.openxmlformats.org/presentationml/2006/main" type="tx" showMasterSp="1" showMasterPhAnim="1">
+<p:sldLayout xmlns:a="http://schemas.openxmlformats.org/drawingml/2006/main" xmlns:r="http://schemas.openxmlformats.org/officeDocument/2006/relationships" xmlns:p="http://schemas.openxmlformats.org/presentationml/2006/main" type="tx">
   <p:cSld name="Title &amp; Bullets">
     <p:spTree>
       <p:nvGrpSpPr>
@@ -1481,7 +1542,9 @@
       <p:sp>
         <p:nvSpPr>
           <p:cNvPr id="56" name="Shape 56"/>
-          <p:cNvSpPr/>
+          <p:cNvSpPr>
+            <a:spLocks noGrp="1"/>
+          </p:cNvSpPr>
           <p:nvPr>
             <p:ph type="title"/>
           </p:nvPr>
@@ -1495,7 +1558,6 @@
           <a:bodyPr/>
           <a:lstStyle/>
           <a:p>
-            <a:pPr/>
             <a:r>
               <a:t>Title Text</a:t>
             </a:r>
@@ -1505,7 +1567,9 @@
       <p:sp>
         <p:nvSpPr>
           <p:cNvPr id="57" name="Shape 57"/>
-          <p:cNvSpPr/>
+          <p:cNvSpPr>
+            <a:spLocks noGrp="1"/>
+          </p:cNvSpPr>
           <p:nvPr>
             <p:ph type="body" idx="1"/>
           </p:nvPr>
@@ -1519,7 +1583,6 @@
           <a:bodyPr/>
           <a:lstStyle/>
           <a:p>
-            <a:pPr/>
             <a:r>
               <a:t>Body Level One</a:t>
             </a:r>
@@ -1553,7 +1616,9 @@
       <p:sp>
         <p:nvSpPr>
           <p:cNvPr id="58" name="Shape 58"/>
-          <p:cNvSpPr/>
+          <p:cNvSpPr>
+            <a:spLocks noGrp="1"/>
+          </p:cNvSpPr>
           <p:nvPr>
             <p:ph type="sldNum" sz="quarter" idx="2"/>
           </p:nvPr>
@@ -1567,8 +1632,10 @@
           <a:bodyPr/>
           <a:lstStyle/>
           <a:p>
-            <a:pPr/>
-            <a:fld id="{86CB4B4D-7CA3-9044-876B-883B54F8677D}" type="slidenum"/>
+            <a:fld id="{86CB4B4D-7CA3-9044-876B-883B54F8677D}" type="slidenum">
+              <a:t>‹#›</a:t>
+            </a:fld>
+            <a:endParaRPr/>
           </a:p>
         </p:txBody>
       </p:sp>
@@ -1577,12 +1644,12 @@
   <p:clrMapOvr>
     <a:masterClrMapping/>
   </p:clrMapOvr>
-  <p:transition xmlns:p14="http://schemas.microsoft.com/office/powerpoint/2010/main" spd="med" advClick="1"/>
+  <p:transition spd="med"/>
 </p:sldLayout>
 </file>
 
 <file path=ppt/slideLayouts/slideLayout7.xml><?xml version="1.0" encoding="utf-8"?>
-<p:sldLayout xmlns:a="http://schemas.openxmlformats.org/drawingml/2006/main" xmlns:r="http://schemas.openxmlformats.org/officeDocument/2006/relationships" xmlns:p="http://schemas.openxmlformats.org/presentationml/2006/main" type="tx" showMasterSp="1" showMasterPhAnim="1">
+<p:sldLayout xmlns:a="http://schemas.openxmlformats.org/drawingml/2006/main" xmlns:r="http://schemas.openxmlformats.org/officeDocument/2006/relationships" xmlns:p="http://schemas.openxmlformats.org/presentationml/2006/main" type="tx">
   <p:cSld name="Title, Bullets &amp; Photo">
     <p:spTree>
       <p:nvGrpSpPr>
@@ -1601,7 +1668,9 @@
       <p:sp>
         <p:nvSpPr>
           <p:cNvPr id="65" name="Shape 65"/>
-          <p:cNvSpPr/>
+          <p:cNvSpPr>
+            <a:spLocks noGrp="1"/>
+          </p:cNvSpPr>
           <p:nvPr>
             <p:ph type="pic" sz="half" idx="13"/>
           </p:nvPr>
@@ -1621,14 +1690,16 @@
           </a:bodyPr>
           <a:lstStyle/>
           <a:p>
-            <a:pPr/>
+            <a:endParaRPr/>
           </a:p>
         </p:txBody>
       </p:sp>
       <p:sp>
         <p:nvSpPr>
           <p:cNvPr id="66" name="Shape 66"/>
-          <p:cNvSpPr/>
+          <p:cNvSpPr>
+            <a:spLocks noGrp="1"/>
+          </p:cNvSpPr>
           <p:nvPr>
             <p:ph type="title"/>
           </p:nvPr>
@@ -1642,7 +1713,6 @@
           <a:bodyPr/>
           <a:lstStyle/>
           <a:p>
-            <a:pPr/>
             <a:r>
               <a:t>Title Text</a:t>
             </a:r>
@@ -1652,7 +1722,9 @@
       <p:sp>
         <p:nvSpPr>
           <p:cNvPr id="67" name="Shape 67"/>
-          <p:cNvSpPr/>
+          <p:cNvSpPr>
+            <a:spLocks noGrp="1"/>
+          </p:cNvSpPr>
           <p:nvPr>
             <p:ph type="body" sz="half" idx="1"/>
           </p:nvPr>
@@ -1701,7 +1773,6 @@
             </a:lvl5pPr>
           </a:lstStyle>
           <a:p>
-            <a:pPr/>
             <a:r>
               <a:t>Body Level One</a:t>
             </a:r>
@@ -1735,7 +1806,9 @@
       <p:sp>
         <p:nvSpPr>
           <p:cNvPr id="68" name="Shape 68"/>
-          <p:cNvSpPr/>
+          <p:cNvSpPr>
+            <a:spLocks noGrp="1"/>
+          </p:cNvSpPr>
           <p:nvPr>
             <p:ph type="sldNum" sz="quarter" idx="2"/>
           </p:nvPr>
@@ -1749,8 +1822,10 @@
           <a:bodyPr/>
           <a:lstStyle/>
           <a:p>
-            <a:pPr/>
-            <a:fld id="{86CB4B4D-7CA3-9044-876B-883B54F8677D}" type="slidenum"/>
+            <a:fld id="{86CB4B4D-7CA3-9044-876B-883B54F8677D}" type="slidenum">
+              <a:t>‹#›</a:t>
+            </a:fld>
+            <a:endParaRPr/>
           </a:p>
         </p:txBody>
       </p:sp>
@@ -1759,12 +1834,12 @@
   <p:clrMapOvr>
     <a:masterClrMapping/>
   </p:clrMapOvr>
-  <p:transition xmlns:p14="http://schemas.microsoft.com/office/powerpoint/2010/main" spd="med" advClick="1"/>
+  <p:transition spd="med"/>
 </p:sldLayout>
 </file>
 
 <file path=ppt/slideLayouts/slideLayout8.xml><?xml version="1.0" encoding="utf-8"?>
-<p:sldLayout xmlns:a="http://schemas.openxmlformats.org/drawingml/2006/main" xmlns:r="http://schemas.openxmlformats.org/officeDocument/2006/relationships" xmlns:p="http://schemas.openxmlformats.org/presentationml/2006/main" type="tx" showMasterSp="1" showMasterPhAnim="1">
+<p:sldLayout xmlns:a="http://schemas.openxmlformats.org/drawingml/2006/main" xmlns:r="http://schemas.openxmlformats.org/officeDocument/2006/relationships" xmlns:p="http://schemas.openxmlformats.org/presentationml/2006/main" type="tx">
   <p:cSld name="Bullets">
     <p:spTree>
       <p:nvGrpSpPr>
@@ -1783,7 +1858,9 @@
       <p:sp>
         <p:nvSpPr>
           <p:cNvPr id="75" name="Shape 75"/>
-          <p:cNvSpPr/>
+          <p:cNvSpPr>
+            <a:spLocks noGrp="1"/>
+          </p:cNvSpPr>
           <p:nvPr>
             <p:ph type="body" idx="1"/>
           </p:nvPr>
@@ -1801,7 +1878,6 @@
           <a:bodyPr/>
           <a:lstStyle/>
           <a:p>
-            <a:pPr/>
             <a:r>
               <a:t>Body Level One</a:t>
             </a:r>
@@ -1835,7 +1911,9 @@
       <p:sp>
         <p:nvSpPr>
           <p:cNvPr id="76" name="Shape 76"/>
-          <p:cNvSpPr/>
+          <p:cNvSpPr>
+            <a:spLocks noGrp="1"/>
+          </p:cNvSpPr>
           <p:nvPr>
             <p:ph type="sldNum" sz="quarter" idx="2"/>
           </p:nvPr>
@@ -1849,8 +1927,10 @@
           <a:bodyPr/>
           <a:lstStyle/>
           <a:p>
-            <a:pPr/>
-            <a:fld id="{86CB4B4D-7CA3-9044-876B-883B54F8677D}" type="slidenum"/>
+            <a:fld id="{86CB4B4D-7CA3-9044-876B-883B54F8677D}" type="slidenum">
+              <a:t>‹#›</a:t>
+            </a:fld>
+            <a:endParaRPr/>
           </a:p>
         </p:txBody>
       </p:sp>
@@ -1859,12 +1939,12 @@
   <p:clrMapOvr>
     <a:masterClrMapping/>
   </p:clrMapOvr>
-  <p:transition xmlns:p14="http://schemas.microsoft.com/office/powerpoint/2010/main" spd="med" advClick="1"/>
+  <p:transition spd="med"/>
 </p:sldLayout>
 </file>
 
 <file path=ppt/slideLayouts/slideLayout9.xml><?xml version="1.0" encoding="utf-8"?>
-<p:sldLayout xmlns:a="http://schemas.openxmlformats.org/drawingml/2006/main" xmlns:r="http://schemas.openxmlformats.org/officeDocument/2006/relationships" xmlns:p="http://schemas.openxmlformats.org/presentationml/2006/main" type="tx" showMasterSp="1" showMasterPhAnim="1">
+<p:sldLayout xmlns:a="http://schemas.openxmlformats.org/drawingml/2006/main" xmlns:r="http://schemas.openxmlformats.org/officeDocument/2006/relationships" xmlns:p="http://schemas.openxmlformats.org/presentationml/2006/main" type="tx">
   <p:cSld name="Photo - 3 Up">
     <p:spTree>
       <p:nvGrpSpPr>
@@ -1883,7 +1963,9 @@
       <p:sp>
         <p:nvSpPr>
           <p:cNvPr id="83" name="Shape 83"/>
-          <p:cNvSpPr/>
+          <p:cNvSpPr>
+            <a:spLocks noGrp="1"/>
+          </p:cNvSpPr>
           <p:nvPr>
             <p:ph type="pic" sz="quarter" idx="13"/>
           </p:nvPr>
@@ -1903,14 +1985,16 @@
           </a:bodyPr>
           <a:lstStyle/>
           <a:p>
-            <a:pPr/>
+            <a:endParaRPr/>
           </a:p>
         </p:txBody>
       </p:sp>
       <p:sp>
         <p:nvSpPr>
           <p:cNvPr id="84" name="Shape 84"/>
-          <p:cNvSpPr/>
+          <p:cNvSpPr>
+            <a:spLocks noGrp="1"/>
+          </p:cNvSpPr>
           <p:nvPr>
             <p:ph type="pic" sz="quarter" idx="14"/>
           </p:nvPr>
@@ -1930,14 +2014,16 @@
           </a:bodyPr>
           <a:lstStyle/>
           <a:p>
-            <a:pPr/>
+            <a:endParaRPr/>
           </a:p>
         </p:txBody>
       </p:sp>
       <p:sp>
         <p:nvSpPr>
           <p:cNvPr id="85" name="Shape 85"/>
-          <p:cNvSpPr/>
+          <p:cNvSpPr>
+            <a:spLocks noGrp="1"/>
+          </p:cNvSpPr>
           <p:nvPr>
             <p:ph type="pic" sz="half" idx="15"/>
           </p:nvPr>
@@ -1957,14 +2043,16 @@
           </a:bodyPr>
           <a:lstStyle/>
           <a:p>
-            <a:pPr/>
+            <a:endParaRPr/>
           </a:p>
         </p:txBody>
       </p:sp>
       <p:sp>
         <p:nvSpPr>
           <p:cNvPr id="86" name="Shape 86"/>
-          <p:cNvSpPr/>
+          <p:cNvSpPr>
+            <a:spLocks noGrp="1"/>
+          </p:cNvSpPr>
           <p:nvPr>
             <p:ph type="sldNum" sz="quarter" idx="2"/>
           </p:nvPr>
@@ -1978,8 +2066,10 @@
           <a:bodyPr/>
           <a:lstStyle/>
           <a:p>
-            <a:pPr/>
-            <a:fld id="{86CB4B4D-7CA3-9044-876B-883B54F8677D}" type="slidenum"/>
+            <a:fld id="{86CB4B4D-7CA3-9044-876B-883B54F8677D}" type="slidenum">
+              <a:t>‹#›</a:t>
+            </a:fld>
+            <a:endParaRPr/>
           </a:p>
         </p:txBody>
       </p:sp>
@@ -1988,7 +2078,7 @@
   <p:clrMapOvr>
     <a:masterClrMapping/>
   </p:clrMapOvr>
-  <p:transition xmlns:p14="http://schemas.microsoft.com/office/powerpoint/2010/main" spd="med" advClick="1"/>
+  <p:transition spd="med"/>
 </p:sldLayout>
 </file>
 
@@ -2000,6 +2090,7 @@
         <a:solidFill>
           <a:srgbClr val="FFFFFF"/>
         </a:solidFill>
+        <a:effectLst/>
       </p:bgPr>
     </p:bg>
     <p:spTree>
@@ -2019,7 +2110,9 @@
       <p:sp>
         <p:nvSpPr>
           <p:cNvPr id="2" name="Shape 2"/>
-          <p:cNvSpPr/>
+          <p:cNvSpPr>
+            <a:spLocks noGrp="1"/>
+          </p:cNvSpPr>
           <p:nvPr>
             <p:ph type="title"/>
           </p:nvPr>
@@ -2037,17 +2130,16 @@
           </a:ln>
           <a:extLst>
             <a:ext uri="{C572A759-6A51-4108-AA02-DFA0A04FC94B}">
-              <ma14:wrappingTextBoxFlag xmlns:ma14="http://schemas.microsoft.com/office/mac/drawingml/2011/main" val="1"/>
+              <ma14:wrappingTextBoxFlag xmlns:ma14="http://schemas.microsoft.com/office/mac/drawingml/2011/main" xmlns="" val="1"/>
             </a:ext>
           </a:extLst>
         </p:spPr>
         <p:txBody>
           <a:bodyPr lIns="50800" tIns="50800" rIns="50800" bIns="50800" anchor="ctr">
-            <a:normAutofit fontScale="100000" lnSpcReduction="0"/>
+            <a:normAutofit/>
           </a:bodyPr>
           <a:lstStyle/>
           <a:p>
-            <a:pPr/>
             <a:r>
               <a:t>Title Text</a:t>
             </a:r>
@@ -2057,7 +2149,9 @@
       <p:sp>
         <p:nvSpPr>
           <p:cNvPr id="3" name="Shape 3"/>
-          <p:cNvSpPr/>
+          <p:cNvSpPr>
+            <a:spLocks noGrp="1"/>
+          </p:cNvSpPr>
           <p:nvPr>
             <p:ph type="body" idx="1"/>
           </p:nvPr>
@@ -2075,17 +2169,16 @@
           </a:ln>
           <a:extLst>
             <a:ext uri="{C572A759-6A51-4108-AA02-DFA0A04FC94B}">
-              <ma14:wrappingTextBoxFlag xmlns:ma14="http://schemas.microsoft.com/office/mac/drawingml/2011/main" val="1"/>
+              <ma14:wrappingTextBoxFlag xmlns:ma14="http://schemas.microsoft.com/office/mac/drawingml/2011/main" xmlns="" val="1"/>
             </a:ext>
           </a:extLst>
         </p:spPr>
         <p:txBody>
           <a:bodyPr lIns="50800" tIns="50800" rIns="50800" bIns="50800" anchor="ctr">
-            <a:normAutofit fontScale="100000" lnSpcReduction="0"/>
+            <a:normAutofit/>
           </a:bodyPr>
           <a:lstStyle/>
           <a:p>
-            <a:pPr/>
             <a:r>
               <a:t>Body Level One</a:t>
             </a:r>
@@ -2119,7 +2212,9 @@
       <p:sp>
         <p:nvSpPr>
           <p:cNvPr id="4" name="Shape 4"/>
-          <p:cNvSpPr/>
+          <p:cNvSpPr>
+            <a:spLocks noGrp="1"/>
+          </p:cNvSpPr>
           <p:nvPr>
             <p:ph type="sldNum" sz="quarter" idx="2"/>
           </p:nvPr>
@@ -2146,8 +2241,10 @@
             </a:lvl1pPr>
           </a:lstStyle>
           <a:p>
-            <a:pPr/>
-            <a:fld id="{86CB4B4D-7CA3-9044-876B-883B54F8677D}" type="slidenum"/>
+            <a:fld id="{86CB4B4D-7CA3-9044-876B-883B54F8677D}" type="slidenum">
+              <a:t>‹#›</a:t>
+            </a:fld>
+            <a:endParaRPr/>
           </a:p>
         </p:txBody>
       </p:sp>
@@ -2155,20 +2252,20 @@
   </p:cSld>
   <p:clrMap bg1="lt1" tx1="dk1" bg2="lt2" tx2="dk2" accent1="accent1" accent2="accent2" accent3="accent3" accent4="accent4" accent5="accent5" accent6="accent6" hlink="hlink" folHlink="folHlink"/>
   <p:sldLayoutIdLst>
-    <p:sldLayoutId id="2147483649" r:id="rId2"/>
-    <p:sldLayoutId id="2147483650" r:id="rId3"/>
-    <p:sldLayoutId id="2147483651" r:id="rId4"/>
-    <p:sldLayoutId id="2147483652" r:id="rId5"/>
-    <p:sldLayoutId id="2147483653" r:id="rId6"/>
-    <p:sldLayoutId id="2147483654" r:id="rId7"/>
-    <p:sldLayoutId id="2147483655" r:id="rId8"/>
-    <p:sldLayoutId id="2147483656" r:id="rId9"/>
-    <p:sldLayoutId id="2147483657" r:id="rId10"/>
-    <p:sldLayoutId id="2147483658" r:id="rId11"/>
-    <p:sldLayoutId id="2147483659" r:id="rId12"/>
-    <p:sldLayoutId id="2147483660" r:id="rId13"/>
+    <p:sldLayoutId id="2147483649" r:id="rId1"/>
+    <p:sldLayoutId id="2147483650" r:id="rId2"/>
+    <p:sldLayoutId id="2147483651" r:id="rId3"/>
+    <p:sldLayoutId id="2147483652" r:id="rId4"/>
+    <p:sldLayoutId id="2147483653" r:id="rId5"/>
+    <p:sldLayoutId id="2147483654" r:id="rId6"/>
+    <p:sldLayoutId id="2147483655" r:id="rId7"/>
+    <p:sldLayoutId id="2147483656" r:id="rId8"/>
+    <p:sldLayoutId id="2147483657" r:id="rId9"/>
+    <p:sldLayoutId id="2147483658" r:id="rId10"/>
+    <p:sldLayoutId id="2147483659" r:id="rId11"/>
+    <p:sldLayoutId id="2147483660" r:id="rId12"/>
   </p:sldLayoutIdLst>
-  <p:transition xmlns:p14="http://schemas.microsoft.com/office/powerpoint/2010/main" spd="med" advClick="1"/>
+  <p:transition spd="med"/>
   <p:txStyles>
     <p:titleStyle>
       <a:lvl1pPr marL="0" marR="0" indent="0" algn="ctr" defTabSz="584200" rtl="0" latinLnBrk="0">
@@ -2186,7 +2283,7 @@
         <a:buFontTx/>
         <a:buNone/>
         <a:tabLst/>
-        <a:defRPr b="0" baseline="0" cap="none" i="0" spc="0" strike="noStrike" sz="8000" u="none">
+        <a:defRPr sz="8000" b="0" i="0" u="none" strike="noStrike" cap="none" spc="0" baseline="0">
           <a:ln>
             <a:noFill/>
           </a:ln>
@@ -2215,7 +2312,7 @@
         <a:buFontTx/>
         <a:buNone/>
         <a:tabLst/>
-        <a:defRPr b="0" baseline="0" cap="none" i="0" spc="0" strike="noStrike" sz="8000" u="none">
+        <a:defRPr sz="8000" b="0" i="0" u="none" strike="noStrike" cap="none" spc="0" baseline="0">
           <a:ln>
             <a:noFill/>
           </a:ln>
@@ -2244,7 +2341,7 @@
         <a:buFontTx/>
         <a:buNone/>
         <a:tabLst/>
-        <a:defRPr b="0" baseline="0" cap="none" i="0" spc="0" strike="noStrike" sz="8000" u="none">
+        <a:defRPr sz="8000" b="0" i="0" u="none" strike="noStrike" cap="none" spc="0" baseline="0">
           <a:ln>
             <a:noFill/>
           </a:ln>
@@ -2273,7 +2370,7 @@
         <a:buFontTx/>
         <a:buNone/>
         <a:tabLst/>
-        <a:defRPr b="0" baseline="0" cap="none" i="0" spc="0" strike="noStrike" sz="8000" u="none">
+        <a:defRPr sz="8000" b="0" i="0" u="none" strike="noStrike" cap="none" spc="0" baseline="0">
           <a:ln>
             <a:noFill/>
           </a:ln>
@@ -2302,7 +2399,7 @@
         <a:buFontTx/>
         <a:buNone/>
         <a:tabLst/>
-        <a:defRPr b="0" baseline="0" cap="none" i="0" spc="0" strike="noStrike" sz="8000" u="none">
+        <a:defRPr sz="8000" b="0" i="0" u="none" strike="noStrike" cap="none" spc="0" baseline="0">
           <a:ln>
             <a:noFill/>
           </a:ln>
@@ -2331,7 +2428,7 @@
         <a:buFontTx/>
         <a:buNone/>
         <a:tabLst/>
-        <a:defRPr b="0" baseline="0" cap="none" i="0" spc="0" strike="noStrike" sz="8000" u="none">
+        <a:defRPr sz="8000" b="0" i="0" u="none" strike="noStrike" cap="none" spc="0" baseline="0">
           <a:ln>
             <a:noFill/>
           </a:ln>
@@ -2360,7 +2457,7 @@
         <a:buFontTx/>
         <a:buNone/>
         <a:tabLst/>
-        <a:defRPr b="0" baseline="0" cap="none" i="0" spc="0" strike="noStrike" sz="8000" u="none">
+        <a:defRPr sz="8000" b="0" i="0" u="none" strike="noStrike" cap="none" spc="0" baseline="0">
           <a:ln>
             <a:noFill/>
           </a:ln>
@@ -2389,7 +2486,7 @@
         <a:buFontTx/>
         <a:buNone/>
         <a:tabLst/>
-        <a:defRPr b="0" baseline="0" cap="none" i="0" spc="0" strike="noStrike" sz="8000" u="none">
+        <a:defRPr sz="8000" b="0" i="0" u="none" strike="noStrike" cap="none" spc="0" baseline="0">
           <a:ln>
             <a:noFill/>
           </a:ln>
@@ -2418,7 +2515,7 @@
         <a:buFontTx/>
         <a:buNone/>
         <a:tabLst/>
-        <a:defRPr b="0" baseline="0" cap="none" i="0" spc="0" strike="noStrike" sz="8000" u="none">
+        <a:defRPr sz="8000" b="0" i="0" u="none" strike="noStrike" cap="none" spc="0" baseline="0">
           <a:ln>
             <a:noFill/>
           </a:ln>
@@ -2449,7 +2546,7 @@
         <a:buFontTx/>
         <a:buChar char="•"/>
         <a:tabLst/>
-        <a:defRPr b="0" baseline="0" cap="none" i="0" spc="0" strike="noStrike" sz="3600" u="none">
+        <a:defRPr sz="3600" b="0" i="0" u="none" strike="noStrike" cap="none" spc="0" baseline="0">
           <a:ln>
             <a:noFill/>
           </a:ln>
@@ -2478,7 +2575,7 @@
         <a:buFontTx/>
         <a:buChar char="•"/>
         <a:tabLst/>
-        <a:defRPr b="0" baseline="0" cap="none" i="0" spc="0" strike="noStrike" sz="3600" u="none">
+        <a:defRPr sz="3600" b="0" i="0" u="none" strike="noStrike" cap="none" spc="0" baseline="0">
           <a:ln>
             <a:noFill/>
           </a:ln>
@@ -2507,7 +2604,7 @@
         <a:buFontTx/>
         <a:buChar char="•"/>
         <a:tabLst/>
-        <a:defRPr b="0" baseline="0" cap="none" i="0" spc="0" strike="noStrike" sz="3600" u="none">
+        <a:defRPr sz="3600" b="0" i="0" u="none" strike="noStrike" cap="none" spc="0" baseline="0">
           <a:ln>
             <a:noFill/>
           </a:ln>
@@ -2536,7 +2633,7 @@
         <a:buFontTx/>
         <a:buChar char="•"/>
         <a:tabLst/>
-        <a:defRPr b="0" baseline="0" cap="none" i="0" spc="0" strike="noStrike" sz="3600" u="none">
+        <a:defRPr sz="3600" b="0" i="0" u="none" strike="noStrike" cap="none" spc="0" baseline="0">
           <a:ln>
             <a:noFill/>
           </a:ln>
@@ -2565,7 +2662,7 @@
         <a:buFontTx/>
         <a:buChar char="•"/>
         <a:tabLst/>
-        <a:defRPr b="0" baseline="0" cap="none" i="0" spc="0" strike="noStrike" sz="3600" u="none">
+        <a:defRPr sz="3600" b="0" i="0" u="none" strike="noStrike" cap="none" spc="0" baseline="0">
           <a:ln>
             <a:noFill/>
           </a:ln>
@@ -2594,7 +2691,7 @@
         <a:buFontTx/>
         <a:buChar char="•"/>
         <a:tabLst/>
-        <a:defRPr b="0" baseline="0" cap="none" i="0" spc="0" strike="noStrike" sz="3600" u="none">
+        <a:defRPr sz="3600" b="0" i="0" u="none" strike="noStrike" cap="none" spc="0" baseline="0">
           <a:ln>
             <a:noFill/>
           </a:ln>
@@ -2623,7 +2720,7 @@
         <a:buFontTx/>
         <a:buChar char="•"/>
         <a:tabLst/>
-        <a:defRPr b="0" baseline="0" cap="none" i="0" spc="0" strike="noStrike" sz="3600" u="none">
+        <a:defRPr sz="3600" b="0" i="0" u="none" strike="noStrike" cap="none" spc="0" baseline="0">
           <a:ln>
             <a:noFill/>
           </a:ln>
@@ -2652,7 +2749,7 @@
         <a:buFontTx/>
         <a:buChar char="•"/>
         <a:tabLst/>
-        <a:defRPr b="0" baseline="0" cap="none" i="0" spc="0" strike="noStrike" sz="3600" u="none">
+        <a:defRPr sz="3600" b="0" i="0" u="none" strike="noStrike" cap="none" spc="0" baseline="0">
           <a:ln>
             <a:noFill/>
           </a:ln>
@@ -2681,7 +2778,7 @@
         <a:buFontTx/>
         <a:buChar char="•"/>
         <a:tabLst/>
-        <a:defRPr b="0" baseline="0" cap="none" i="0" spc="0" strike="noStrike" sz="3600" u="none">
+        <a:defRPr sz="3600" b="0" i="0" u="none" strike="noStrike" cap="none" spc="0" baseline="0">
           <a:ln>
             <a:noFill/>
           </a:ln>
@@ -2712,7 +2809,7 @@
         <a:buFontTx/>
         <a:buNone/>
         <a:tabLst/>
-        <a:defRPr b="0" baseline="0" cap="none" i="0" spc="0" strike="noStrike" sz="1800" u="none">
+        <a:defRPr sz="1800" b="0" i="0" u="none" strike="noStrike" cap="none" spc="0" baseline="0">
           <a:ln>
             <a:noFill/>
           </a:ln>
@@ -2741,7 +2838,7 @@
         <a:buFontTx/>
         <a:buNone/>
         <a:tabLst/>
-        <a:defRPr b="0" baseline="0" cap="none" i="0" spc="0" strike="noStrike" sz="1800" u="none">
+        <a:defRPr sz="1800" b="0" i="0" u="none" strike="noStrike" cap="none" spc="0" baseline="0">
           <a:ln>
             <a:noFill/>
           </a:ln>
@@ -2770,7 +2867,7 @@
         <a:buFontTx/>
         <a:buNone/>
         <a:tabLst/>
-        <a:defRPr b="0" baseline="0" cap="none" i="0" spc="0" strike="noStrike" sz="1800" u="none">
+        <a:defRPr sz="1800" b="0" i="0" u="none" strike="noStrike" cap="none" spc="0" baseline="0">
           <a:ln>
             <a:noFill/>
           </a:ln>
@@ -2799,7 +2896,7 @@
         <a:buFontTx/>
         <a:buNone/>
         <a:tabLst/>
-        <a:defRPr b="0" baseline="0" cap="none" i="0" spc="0" strike="noStrike" sz="1800" u="none">
+        <a:defRPr sz="1800" b="0" i="0" u="none" strike="noStrike" cap="none" spc="0" baseline="0">
           <a:ln>
             <a:noFill/>
           </a:ln>
@@ -2828,7 +2925,7 @@
         <a:buFontTx/>
         <a:buNone/>
         <a:tabLst/>
-        <a:defRPr b="0" baseline="0" cap="none" i="0" spc="0" strike="noStrike" sz="1800" u="none">
+        <a:defRPr sz="1800" b="0" i="0" u="none" strike="noStrike" cap="none" spc="0" baseline="0">
           <a:ln>
             <a:noFill/>
           </a:ln>
@@ -2857,7 +2954,7 @@
         <a:buFontTx/>
         <a:buNone/>
         <a:tabLst/>
-        <a:defRPr b="0" baseline="0" cap="none" i="0" spc="0" strike="noStrike" sz="1800" u="none">
+        <a:defRPr sz="1800" b="0" i="0" u="none" strike="noStrike" cap="none" spc="0" baseline="0">
           <a:ln>
             <a:noFill/>
           </a:ln>
@@ -2886,7 +2983,7 @@
         <a:buFontTx/>
         <a:buNone/>
         <a:tabLst/>
-        <a:defRPr b="0" baseline="0" cap="none" i="0" spc="0" strike="noStrike" sz="1800" u="none">
+        <a:defRPr sz="1800" b="0" i="0" u="none" strike="noStrike" cap="none" spc="0" baseline="0">
           <a:ln>
             <a:noFill/>
           </a:ln>
@@ -2915,7 +3012,7 @@
         <a:buFontTx/>
         <a:buNone/>
         <a:tabLst/>
-        <a:defRPr b="0" baseline="0" cap="none" i="0" spc="0" strike="noStrike" sz="1800" u="none">
+        <a:defRPr sz="1800" b="0" i="0" u="none" strike="noStrike" cap="none" spc="0" baseline="0">
           <a:ln>
             <a:noFill/>
           </a:ln>
@@ -2944,7 +3041,7 @@
         <a:buFontTx/>
         <a:buNone/>
         <a:tabLst/>
-        <a:defRPr b="0" baseline="0" cap="none" i="0" spc="0" strike="noStrike" sz="1800" u="none">
+        <a:defRPr sz="1800" b="0" i="0" u="none" strike="noStrike" cap="none" spc="0" baseline="0">
           <a:ln>
             <a:noFill/>
           </a:ln>
@@ -2964,7 +3061,7 @@
 </file>
 
 <file path=ppt/slides/slide1.xml><?xml version="1.0" encoding="utf-8"?>
-<p:sld xmlns:a="http://schemas.openxmlformats.org/drawingml/2006/main" xmlns:r="http://schemas.openxmlformats.org/officeDocument/2006/relationships" xmlns:p="http://schemas.openxmlformats.org/presentationml/2006/main" showMasterSp="1" showMasterPhAnim="1">
+<p:sld xmlns:a="http://schemas.openxmlformats.org/drawingml/2006/main" xmlns:r="http://schemas.openxmlformats.org/officeDocument/2006/relationships" xmlns:p="http://schemas.openxmlformats.org/presentationml/2006/main">
   <p:cSld>
     <p:spTree>
       <p:nvGrpSpPr>
@@ -2983,7 +3080,9 @@
       <p:sp>
         <p:nvSpPr>
           <p:cNvPr id="119" name="Shape 119"/>
-          <p:cNvSpPr/>
+          <p:cNvSpPr>
+            <a:spLocks noGrp="1"/>
+          </p:cNvSpPr>
           <p:nvPr>
             <p:ph type="ctrTitle"/>
           </p:nvPr>
@@ -2994,14 +3093,15 @@
           </a:prstGeom>
         </p:spPr>
         <p:txBody>
-          <a:bodyPr/>
+          <a:bodyPr>
+            <a:normAutofit fontScale="90000"/>
+          </a:bodyPr>
           <a:lstStyle>
             <a:lvl1pPr defTabSz="514095">
               <a:defRPr sz="7040"/>
             </a:lvl1pPr>
           </a:lstStyle>
           <a:p>
-            <a:pPr/>
             <a:r>
               <a:t>Challenges of Intercultural Project Management</a:t>
             </a:r>
@@ -3011,7 +3111,9 @@
       <p:sp>
         <p:nvSpPr>
           <p:cNvPr id="120" name="Shape 120"/>
-          <p:cNvSpPr/>
+          <p:cNvSpPr>
+            <a:spLocks noGrp="1"/>
+          </p:cNvSpPr>
           <p:nvPr>
             <p:ph type="subTitle" sz="quarter" idx="1"/>
           </p:nvPr>
@@ -3025,7 +3127,6 @@
           <a:bodyPr/>
           <a:lstStyle/>
           <a:p>
-            <a:pPr/>
             <a:r>
               <a:t>General, Virtual, and onsite</a:t>
             </a:r>
@@ -3051,13 +3152,13 @@
           </a:ln>
           <a:extLst>
             <a:ext uri="{C572A759-6A51-4108-AA02-DFA0A04FC94B}">
-              <ma14:wrappingTextBoxFlag xmlns:ma14="http://schemas.microsoft.com/office/mac/drawingml/2011/main" val="1"/>
+              <ma14:wrappingTextBoxFlag xmlns:ma14="http://schemas.microsoft.com/office/mac/drawingml/2011/main" xmlns="" val="1"/>
             </a:ext>
           </a:extLst>
         </p:spPr>
         <p:txBody>
           <a:bodyPr lIns="50800" tIns="50800" rIns="50800" bIns="50800">
-            <a:normAutofit fontScale="100000" lnSpcReduction="0"/>
+            <a:normAutofit/>
           </a:bodyPr>
           <a:lstStyle>
             <a:lvl1pPr>
@@ -3065,7 +3166,6 @@
             </a:lvl1pPr>
           </a:lstStyle>
           <a:p>
-            <a:pPr/>
             <a:r>
               <a:t>Samiul Jahan, Imam Bux Mullah , Farzaneh Sabzi</a:t>
             </a:r>
@@ -3077,12 +3177,12 @@
   <p:clrMapOvr>
     <a:masterClrMapping/>
   </p:clrMapOvr>
-  <p:transition xmlns:p14="http://schemas.microsoft.com/office/powerpoint/2010/main" spd="med" advClick="1"/>
+  <p:transition spd="med"/>
 </p:sld>
 </file>
 
 <file path=ppt/slides/slide2.xml><?xml version="1.0" encoding="utf-8"?>
-<p:sld xmlns:a="http://schemas.openxmlformats.org/drawingml/2006/main" xmlns:r="http://schemas.openxmlformats.org/officeDocument/2006/relationships" xmlns:p="http://schemas.openxmlformats.org/presentationml/2006/main" showMasterSp="1" showMasterPhAnim="1">
+<p:sld xmlns:a="http://schemas.openxmlformats.org/drawingml/2006/main" xmlns:r="http://schemas.openxmlformats.org/officeDocument/2006/relationships" xmlns:p="http://schemas.openxmlformats.org/presentationml/2006/main">
   <p:cSld>
     <p:spTree>
       <p:nvGrpSpPr>
@@ -3102,7 +3202,7 @@
         <p:nvPicPr>
           <p:cNvPr id="123" name="110809_familychineseoahu_en_00317_2040x1360.jpeg"/>
           <p:cNvPicPr>
-            <a:picLocks noChangeAspect="1"/>
+            <a:picLocks noGrp="1" noChangeAspect="1"/>
           </p:cNvPicPr>
           <p:nvPr>
             <p:ph type="pic" idx="13"/>
@@ -3112,7 +3212,7 @@
           <a:blip r:embed="rId2">
             <a:extLst/>
           </a:blip>
-          <a:srcRect l="32374" t="0" r="24460" b="102"/>
+          <a:srcRect l="32374" r="24460" b="102"/>
           <a:stretch>
             <a:fillRect/>
           </a:stretch>
@@ -3126,7 +3226,9 @@
       <p:sp>
         <p:nvSpPr>
           <p:cNvPr id="124" name="Shape 124"/>
-          <p:cNvSpPr/>
+          <p:cNvSpPr>
+            <a:spLocks noGrp="1"/>
+          </p:cNvSpPr>
           <p:nvPr>
             <p:ph type="title"/>
           </p:nvPr>
@@ -3140,8 +3242,8 @@
           <a:bodyPr/>
           <a:lstStyle/>
           <a:p>
-            <a:pPr/>
-            <a:r>
+            <a:r>
+              <a:rPr dirty="0"/>
               <a:t>General Challenges</a:t>
             </a:r>
           </a:p>
@@ -3150,7 +3252,9 @@
       <p:sp>
         <p:nvSpPr>
           <p:cNvPr id="125" name="Shape 125"/>
-          <p:cNvSpPr/>
+          <p:cNvSpPr>
+            <a:spLocks noGrp="1"/>
+          </p:cNvSpPr>
           <p:nvPr>
             <p:ph type="body" sz="quarter" idx="1"/>
           </p:nvPr>
@@ -3165,6 +3269,11 @@
           <a:lstStyle/>
           <a:p>
             <a:pPr algn="l"/>
+            <a:r>
+              <a:rPr lang="en-US" dirty="0"/>
+              <a:t>The PMs should be aware of the following challenges while working in a culturally diverse team -</a:t>
+            </a:r>
+            <a:endParaRPr lang="en-US" dirty="0"/>
           </a:p>
         </p:txBody>
       </p:sp>
@@ -3173,12 +3282,391 @@
   <p:clrMapOvr>
     <a:masterClrMapping/>
   </p:clrMapOvr>
-  <p:transition xmlns:p14="http://schemas.microsoft.com/office/powerpoint/2010/main" spd="med" advClick="1" p14:dur="1000"/>
+  <p:transition spd="slow"/>
 </p:sld>
 </file>
 
 <file path=ppt/slides/slide3.xml><?xml version="1.0" encoding="utf-8"?>
-<p:sld xmlns:a="http://schemas.openxmlformats.org/drawingml/2006/main" xmlns:r="http://schemas.openxmlformats.org/officeDocument/2006/relationships" xmlns:p="http://schemas.openxmlformats.org/presentationml/2006/main" showMasterSp="1" showMasterPhAnim="1">
+<p:sld xmlns:a="http://schemas.openxmlformats.org/drawingml/2006/main" xmlns:r="http://schemas.openxmlformats.org/officeDocument/2006/relationships" xmlns:p="http://schemas.openxmlformats.org/presentationml/2006/main">
+  <p:cSld>
+    <p:spTree>
+      <p:nvGrpSpPr>
+        <p:cNvPr id="1" name=""/>
+        <p:cNvGrpSpPr/>
+        <p:nvPr/>
+      </p:nvGrpSpPr>
+      <p:grpSpPr>
+        <a:xfrm>
+          <a:off x="0" y="0"/>
+          <a:ext cx="0" cy="0"/>
+          <a:chOff x="0" y="0"/>
+          <a:chExt cx="0" cy="0"/>
+        </a:xfrm>
+      </p:grpSpPr>
+      <p:pic>
+        <p:nvPicPr>
+          <p:cNvPr id="123" name="110809_familychineseoahu_en_00317_2040x1360.jpeg"/>
+          <p:cNvPicPr>
+            <a:picLocks noGrp="1" noChangeAspect="1"/>
+          </p:cNvPicPr>
+          <p:nvPr>
+            <p:ph type="pic" idx="13"/>
+          </p:nvPr>
+        </p:nvPicPr>
+        <p:blipFill>
+          <a:blip r:embed="rId2">
+            <a:extLst/>
+          </a:blip>
+          <a:srcRect l="32374" r="24460" b="102"/>
+          <a:stretch>
+            <a:fillRect/>
+          </a:stretch>
+        </p:blipFill>
+        <p:spPr>
+          <a:prstGeom prst="rect">
+            <a:avLst/>
+          </a:prstGeom>
+        </p:spPr>
+      </p:pic>
+      <p:sp>
+        <p:nvSpPr>
+          <p:cNvPr id="124" name="Shape 124"/>
+          <p:cNvSpPr>
+            <a:spLocks noGrp="1"/>
+          </p:cNvSpPr>
+          <p:nvPr>
+            <p:ph type="title"/>
+          </p:nvPr>
+        </p:nvSpPr>
+        <p:spPr>
+          <a:prstGeom prst="rect">
+            <a:avLst/>
+          </a:prstGeom>
+        </p:spPr>
+        <p:txBody>
+          <a:bodyPr/>
+          <a:lstStyle/>
+          <a:p>
+            <a:r>
+              <a:rPr dirty="0"/>
+              <a:t>General Challenges</a:t>
+            </a:r>
+          </a:p>
+        </p:txBody>
+      </p:sp>
+      <p:sp>
+        <p:nvSpPr>
+          <p:cNvPr id="125" name="Shape 125"/>
+          <p:cNvSpPr>
+            <a:spLocks noGrp="1"/>
+          </p:cNvSpPr>
+          <p:nvPr>
+            <p:ph type="body" sz="quarter" idx="1"/>
+          </p:nvPr>
+        </p:nvSpPr>
+        <p:spPr>
+          <a:prstGeom prst="rect">
+            <a:avLst/>
+          </a:prstGeom>
+        </p:spPr>
+        <p:txBody>
+          <a:bodyPr>
+            <a:normAutofit fontScale="92500" lnSpcReduction="10000"/>
+          </a:bodyPr>
+          <a:lstStyle/>
+          <a:p>
+            <a:pPr algn="just"/>
+            <a:r>
+              <a:rPr lang="en-US" dirty="0"/>
+              <a:t>Every country or even the states within the country have some different national culture and ways of business thinking. Not understanding them might create issues </a:t>
+            </a:r>
+            <a:r>
+              <a:rPr lang="en-US" dirty="0" smtClean="0"/>
+              <a:t>during the </a:t>
+            </a:r>
+            <a:r>
+              <a:rPr lang="en-US" dirty="0"/>
+              <a:t>projects. PMs should be encouraged to realize and respect these issues.</a:t>
+            </a:r>
+            <a:endParaRPr lang="en-US" dirty="0"/>
+          </a:p>
+          <a:p>
+            <a:pPr algn="l"/>
+            <a:endParaRPr dirty="0"/>
+          </a:p>
+        </p:txBody>
+      </p:sp>
+    </p:spTree>
+    <p:extLst>
+      <p:ext uri="{BB962C8B-B14F-4D97-AF65-F5344CB8AC3E}">
+        <p14:creationId xmlns:p14="http://schemas.microsoft.com/office/powerpoint/2010/main" val="1135872767"/>
+      </p:ext>
+    </p:extLst>
+  </p:cSld>
+  <p:clrMapOvr>
+    <a:masterClrMapping/>
+  </p:clrMapOvr>
+  <p:transition spd="slow"/>
+</p:sld>
+</file>
+
+<file path=ppt/slides/slide4.xml><?xml version="1.0" encoding="utf-8"?>
+<p:sld xmlns:a="http://schemas.openxmlformats.org/drawingml/2006/main" xmlns:r="http://schemas.openxmlformats.org/officeDocument/2006/relationships" xmlns:p="http://schemas.openxmlformats.org/presentationml/2006/main">
+  <p:cSld>
+    <p:spTree>
+      <p:nvGrpSpPr>
+        <p:cNvPr id="1" name=""/>
+        <p:cNvGrpSpPr/>
+        <p:nvPr/>
+      </p:nvGrpSpPr>
+      <p:grpSpPr>
+        <a:xfrm>
+          <a:off x="0" y="0"/>
+          <a:ext cx="0" cy="0"/>
+          <a:chOff x="0" y="0"/>
+          <a:chExt cx="0" cy="0"/>
+        </a:xfrm>
+      </p:grpSpPr>
+      <p:pic>
+        <p:nvPicPr>
+          <p:cNvPr id="123" name="110809_familychineseoahu_en_00317_2040x1360.jpeg"/>
+          <p:cNvPicPr>
+            <a:picLocks noGrp="1" noChangeAspect="1"/>
+          </p:cNvPicPr>
+          <p:nvPr>
+            <p:ph type="pic" idx="13"/>
+          </p:nvPr>
+        </p:nvPicPr>
+        <p:blipFill>
+          <a:blip r:embed="rId2">
+            <a:extLst/>
+          </a:blip>
+          <a:srcRect l="32374" r="24460" b="102"/>
+          <a:stretch>
+            <a:fillRect/>
+          </a:stretch>
+        </p:blipFill>
+        <p:spPr>
+          <a:prstGeom prst="rect">
+            <a:avLst/>
+          </a:prstGeom>
+        </p:spPr>
+      </p:pic>
+      <p:sp>
+        <p:nvSpPr>
+          <p:cNvPr id="124" name="Shape 124"/>
+          <p:cNvSpPr>
+            <a:spLocks noGrp="1"/>
+          </p:cNvSpPr>
+          <p:nvPr>
+            <p:ph type="title"/>
+          </p:nvPr>
+        </p:nvSpPr>
+        <p:spPr>
+          <a:prstGeom prst="rect">
+            <a:avLst/>
+          </a:prstGeom>
+        </p:spPr>
+        <p:txBody>
+          <a:bodyPr/>
+          <a:lstStyle/>
+          <a:p>
+            <a:r>
+              <a:rPr dirty="0"/>
+              <a:t>General Challenges</a:t>
+            </a:r>
+          </a:p>
+        </p:txBody>
+      </p:sp>
+      <p:sp>
+        <p:nvSpPr>
+          <p:cNvPr id="125" name="Shape 125"/>
+          <p:cNvSpPr>
+            <a:spLocks noGrp="1"/>
+          </p:cNvSpPr>
+          <p:nvPr>
+            <p:ph type="body" sz="quarter" idx="1"/>
+          </p:nvPr>
+        </p:nvSpPr>
+        <p:spPr>
+          <a:prstGeom prst="rect">
+            <a:avLst/>
+          </a:prstGeom>
+        </p:spPr>
+        <p:txBody>
+          <a:bodyPr>
+            <a:normAutofit/>
+          </a:bodyPr>
+          <a:lstStyle/>
+          <a:p>
+            <a:pPr algn="just"/>
+            <a:r>
+              <a:rPr lang="en-US" dirty="0"/>
+              <a:t>Not being careful with stereotypes, and peoples perspective. Every individuals have different ideas and ways of looking at life.</a:t>
+            </a:r>
+            <a:endParaRPr lang="en-US" dirty="0"/>
+          </a:p>
+          <a:p>
+            <a:pPr algn="l"/>
+            <a:endParaRPr dirty="0"/>
+          </a:p>
+        </p:txBody>
+      </p:sp>
+    </p:spTree>
+    <p:extLst>
+      <p:ext uri="{BB962C8B-B14F-4D97-AF65-F5344CB8AC3E}">
+        <p14:creationId xmlns:p14="http://schemas.microsoft.com/office/powerpoint/2010/main" val="1518596562"/>
+      </p:ext>
+    </p:extLst>
+  </p:cSld>
+  <p:clrMapOvr>
+    <a:masterClrMapping/>
+  </p:clrMapOvr>
+  <p:transition spd="slow"/>
+</p:sld>
+</file>
+
+<file path=ppt/slides/slide5.xml><?xml version="1.0" encoding="utf-8"?>
+<p:sld xmlns:a="http://schemas.openxmlformats.org/drawingml/2006/main" xmlns:r="http://schemas.openxmlformats.org/officeDocument/2006/relationships" xmlns:p="http://schemas.openxmlformats.org/presentationml/2006/main">
+  <p:cSld>
+    <p:spTree>
+      <p:nvGrpSpPr>
+        <p:cNvPr id="1" name=""/>
+        <p:cNvGrpSpPr/>
+        <p:nvPr/>
+      </p:nvGrpSpPr>
+      <p:grpSpPr>
+        <a:xfrm>
+          <a:off x="0" y="0"/>
+          <a:ext cx="0" cy="0"/>
+          <a:chOff x="0" y="0"/>
+          <a:chExt cx="0" cy="0"/>
+        </a:xfrm>
+      </p:grpSpPr>
+      <p:pic>
+        <p:nvPicPr>
+          <p:cNvPr id="123" name="110809_familychineseoahu_en_00317_2040x1360.jpeg"/>
+          <p:cNvPicPr>
+            <a:picLocks noGrp="1" noChangeAspect="1"/>
+          </p:cNvPicPr>
+          <p:nvPr>
+            <p:ph type="pic" idx="13"/>
+          </p:nvPr>
+        </p:nvPicPr>
+        <p:blipFill>
+          <a:blip r:embed="rId2">
+            <a:extLst/>
+          </a:blip>
+          <a:srcRect l="32374" r="24460" b="102"/>
+          <a:stretch>
+            <a:fillRect/>
+          </a:stretch>
+        </p:blipFill>
+        <p:spPr>
+          <a:prstGeom prst="rect">
+            <a:avLst/>
+          </a:prstGeom>
+        </p:spPr>
+      </p:pic>
+      <p:sp>
+        <p:nvSpPr>
+          <p:cNvPr id="124" name="Shape 124"/>
+          <p:cNvSpPr>
+            <a:spLocks noGrp="1"/>
+          </p:cNvSpPr>
+          <p:nvPr>
+            <p:ph type="title"/>
+          </p:nvPr>
+        </p:nvSpPr>
+        <p:spPr>
+          <a:prstGeom prst="rect">
+            <a:avLst/>
+          </a:prstGeom>
+        </p:spPr>
+        <p:txBody>
+          <a:bodyPr/>
+          <a:lstStyle/>
+          <a:p>
+            <a:r>
+              <a:rPr dirty="0"/>
+              <a:t>General Challenges</a:t>
+            </a:r>
+          </a:p>
+        </p:txBody>
+      </p:sp>
+      <p:sp>
+        <p:nvSpPr>
+          <p:cNvPr id="125" name="Shape 125"/>
+          <p:cNvSpPr>
+            <a:spLocks noGrp="1"/>
+          </p:cNvSpPr>
+          <p:nvPr>
+            <p:ph type="body" sz="quarter" idx="1"/>
+          </p:nvPr>
+        </p:nvSpPr>
+        <p:spPr>
+          <a:prstGeom prst="rect">
+            <a:avLst/>
+          </a:prstGeom>
+        </p:spPr>
+        <p:txBody>
+          <a:bodyPr>
+            <a:normAutofit fontScale="85000" lnSpcReduction="20000"/>
+          </a:bodyPr>
+          <a:lstStyle/>
+          <a:p>
+            <a:pPr algn="just"/>
+            <a:r>
+              <a:rPr lang="en-US" dirty="0"/>
+              <a:t>Language barrier. This is one of the primary reason behind miscommunication and misunderstanding in teams</a:t>
+            </a:r>
+            <a:r>
+              <a:rPr lang="en-US" dirty="0" smtClean="0"/>
+              <a:t>.</a:t>
+            </a:r>
+          </a:p>
+          <a:p>
+            <a:pPr algn="just"/>
+            <a:endParaRPr lang="en-US" dirty="0"/>
+          </a:p>
+          <a:p>
+            <a:pPr algn="just"/>
+            <a:r>
+              <a:rPr lang="en-US" dirty="0"/>
+              <a:t>Some languages might sound rude, some might sound polite while speaking. By looking at others' voice and tone people might get offended while the person speaking is not </a:t>
+            </a:r>
+            <a:r>
+              <a:rPr lang="en-US" dirty="0" smtClean="0"/>
+              <a:t>actually meaning </a:t>
+            </a:r>
+            <a:r>
+              <a:rPr lang="en-US" dirty="0"/>
+              <a:t>any offense.</a:t>
+            </a:r>
+            <a:endParaRPr lang="en-US" dirty="0"/>
+          </a:p>
+          <a:p>
+            <a:pPr algn="l"/>
+            <a:endParaRPr dirty="0"/>
+          </a:p>
+        </p:txBody>
+      </p:sp>
+    </p:spTree>
+    <p:extLst>
+      <p:ext uri="{BB962C8B-B14F-4D97-AF65-F5344CB8AC3E}">
+        <p14:creationId xmlns:p14="http://schemas.microsoft.com/office/powerpoint/2010/main" val="1119995063"/>
+      </p:ext>
+    </p:extLst>
+  </p:cSld>
+  <p:clrMapOvr>
+    <a:masterClrMapping/>
+  </p:clrMapOvr>
+  <p:transition spd="slow"/>
+</p:sld>
+</file>
+
+<file path=ppt/slides/slide6.xml><?xml version="1.0" encoding="utf-8"?>
+<p:sld xmlns:a="http://schemas.openxmlformats.org/drawingml/2006/main" xmlns:r="http://schemas.openxmlformats.org/officeDocument/2006/relationships" xmlns:p="http://schemas.openxmlformats.org/presentationml/2006/main">
   <p:cSld>
     <p:spTree>
       <p:nvGrpSpPr>
@@ -3198,7 +3686,7 @@
         <p:nvPicPr>
           <p:cNvPr id="127" name="110809_familychineseoahu_en_00317_2040x1360.jpeg"/>
           <p:cNvPicPr>
-            <a:picLocks noChangeAspect="1"/>
+            <a:picLocks noGrp="1" noChangeAspect="1"/>
           </p:cNvPicPr>
           <p:nvPr>
             <p:ph type="pic" idx="13"/>
@@ -3208,7 +3696,7 @@
           <a:blip r:embed="rId2">
             <a:extLst/>
           </a:blip>
-          <a:srcRect l="32374" t="0" r="24460" b="102"/>
+          <a:srcRect l="32374" r="24460" b="102"/>
           <a:stretch>
             <a:fillRect/>
           </a:stretch>
@@ -3222,7 +3710,9 @@
       <p:sp>
         <p:nvSpPr>
           <p:cNvPr id="128" name="Shape 128"/>
-          <p:cNvSpPr/>
+          <p:cNvSpPr>
+            <a:spLocks noGrp="1"/>
+          </p:cNvSpPr>
           <p:nvPr>
             <p:ph type="title"/>
           </p:nvPr>
@@ -3236,7 +3726,6 @@
           <a:bodyPr/>
           <a:lstStyle/>
           <a:p>
-            <a:pPr/>
             <a:r>
               <a:t>Virtual Challenges</a:t>
             </a:r>
@@ -3246,7 +3735,9 @@
       <p:sp>
         <p:nvSpPr>
           <p:cNvPr id="129" name="Shape 129"/>
-          <p:cNvSpPr/>
+          <p:cNvSpPr>
+            <a:spLocks noGrp="1"/>
+          </p:cNvSpPr>
           <p:nvPr>
             <p:ph type="body" sz="quarter" idx="1"/>
           </p:nvPr>
@@ -3261,6 +3752,7 @@
           <a:lstStyle/>
           <a:p>
             <a:pPr algn="l"/>
+            <a:endParaRPr/>
           </a:p>
         </p:txBody>
       </p:sp>
@@ -3269,12 +3761,12 @@
   <p:clrMapOvr>
     <a:masterClrMapping/>
   </p:clrMapOvr>
-  <p:transition xmlns:p14="http://schemas.microsoft.com/office/powerpoint/2010/main" spd="med" advClick="1" p14:dur="1000"/>
+  <p:transition spd="slow"/>
 </p:sld>
 </file>
 
-<file path=ppt/slides/slide4.xml><?xml version="1.0" encoding="utf-8"?>
-<p:sld xmlns:a="http://schemas.openxmlformats.org/drawingml/2006/main" xmlns:r="http://schemas.openxmlformats.org/officeDocument/2006/relationships" xmlns:p="http://schemas.openxmlformats.org/presentationml/2006/main" showMasterSp="1" showMasterPhAnim="1">
+<file path=ppt/slides/slide7.xml><?xml version="1.0" encoding="utf-8"?>
+<p:sld xmlns:a="http://schemas.openxmlformats.org/drawingml/2006/main" xmlns:r="http://schemas.openxmlformats.org/officeDocument/2006/relationships" xmlns:p="http://schemas.openxmlformats.org/presentationml/2006/main">
   <p:cSld>
     <p:spTree>
       <p:nvGrpSpPr>
@@ -3294,7 +3786,7 @@
         <p:nvPicPr>
           <p:cNvPr id="131" name="110809_familychineseoahu_en_00317_2040x1360.jpeg"/>
           <p:cNvPicPr>
-            <a:picLocks noChangeAspect="1"/>
+            <a:picLocks noGrp="1" noChangeAspect="1"/>
           </p:cNvPicPr>
           <p:nvPr>
             <p:ph type="pic" idx="13"/>
@@ -3304,7 +3796,7 @@
           <a:blip r:embed="rId2">
             <a:extLst/>
           </a:blip>
-          <a:srcRect l="32374" t="0" r="24460" b="102"/>
+          <a:srcRect l="32374" r="24460" b="102"/>
           <a:stretch>
             <a:fillRect/>
           </a:stretch>
@@ -3318,7 +3810,9 @@
       <p:sp>
         <p:nvSpPr>
           <p:cNvPr id="132" name="Shape 132"/>
-          <p:cNvSpPr/>
+          <p:cNvSpPr>
+            <a:spLocks noGrp="1"/>
+          </p:cNvSpPr>
           <p:nvPr>
             <p:ph type="title"/>
           </p:nvPr>
@@ -3332,7 +3826,6 @@
           <a:bodyPr/>
           <a:lstStyle/>
           <a:p>
-            <a:pPr/>
             <a:r>
               <a:t>Onsite </a:t>
             </a:r>
@@ -3342,7 +3835,9 @@
       <p:sp>
         <p:nvSpPr>
           <p:cNvPr id="133" name="Shape 133"/>
-          <p:cNvSpPr/>
+          <p:cNvSpPr>
+            <a:spLocks noGrp="1"/>
+          </p:cNvSpPr>
           <p:nvPr>
             <p:ph type="body" sz="quarter" idx="1"/>
           </p:nvPr>
@@ -3357,6 +3852,7 @@
           <a:lstStyle/>
           <a:p>
             <a:pPr algn="l"/>
+            <a:endParaRPr/>
           </a:p>
         </p:txBody>
       </p:sp>
@@ -3365,12 +3861,12 @@
   <p:clrMapOvr>
     <a:masterClrMapping/>
   </p:clrMapOvr>
-  <p:transition xmlns:p14="http://schemas.microsoft.com/office/powerpoint/2010/main" spd="med" advClick="1" p14:dur="1000"/>
+  <p:transition spd="slow"/>
 </p:sld>
 </file>
 
-<file path=ppt/slides/slide5.xml><?xml version="1.0" encoding="utf-8"?>
-<p:sld xmlns:a="http://schemas.openxmlformats.org/drawingml/2006/main" xmlns:r="http://schemas.openxmlformats.org/officeDocument/2006/relationships" xmlns:p="http://schemas.openxmlformats.org/presentationml/2006/main" showMasterSp="1" showMasterPhAnim="1">
+<file path=ppt/slides/slide8.xml><?xml version="1.0" encoding="utf-8"?>
+<p:sld xmlns:a="http://schemas.openxmlformats.org/drawingml/2006/main" xmlns:r="http://schemas.openxmlformats.org/officeDocument/2006/relationships" xmlns:p="http://schemas.openxmlformats.org/presentationml/2006/main">
   <p:cSld>
     <p:spTree>
       <p:nvGrpSpPr>
@@ -3389,7 +3885,9 @@
       <p:sp>
         <p:nvSpPr>
           <p:cNvPr id="135" name="Shape 135"/>
-          <p:cNvSpPr/>
+          <p:cNvSpPr>
+            <a:spLocks noGrp="1"/>
+          </p:cNvSpPr>
           <p:nvPr>
             <p:ph type="title"/>
           </p:nvPr>
@@ -3403,7 +3901,6 @@
           <a:bodyPr/>
           <a:lstStyle/>
           <a:p>
-            <a:pPr/>
             <a:r>
               <a:t>Drawbacks</a:t>
             </a:r>
@@ -3413,7 +3910,9 @@
       <p:sp>
         <p:nvSpPr>
           <p:cNvPr id="136" name="Shape 136"/>
-          <p:cNvSpPr/>
+          <p:cNvSpPr>
+            <a:spLocks noGrp="1"/>
+          </p:cNvSpPr>
           <p:nvPr>
             <p:ph type="body" idx="1"/>
           </p:nvPr>
@@ -3427,7 +3926,7 @@
           <a:bodyPr/>
           <a:lstStyle/>
           <a:p>
-            <a:pPr/>
+            <a:endParaRPr/>
           </a:p>
         </p:txBody>
       </p:sp>
@@ -3436,12 +3935,12 @@
   <p:clrMapOvr>
     <a:masterClrMapping/>
   </p:clrMapOvr>
-  <p:transition xmlns:p14="http://schemas.microsoft.com/office/powerpoint/2010/main" spd="med" advClick="1" p14:dur="1000"/>
+  <p:transition spd="slow"/>
 </p:sld>
 </file>
 
 <file path=ppt/theme/theme1.xml><?xml version="1.0" encoding="utf-8"?>
-<a:theme xmlns:a="http://schemas.openxmlformats.org/drawingml/2006/main" xmlns:r="http://schemas.openxmlformats.org/officeDocument/2006/relationships" name="White">
+<a:theme xmlns:a="http://schemas.openxmlformats.org/drawingml/2006/main" name="White">
   <a:themeElements>
     <a:clrScheme name="White">
       <a:dk1>
@@ -3567,7 +4066,7 @@
       <a:effectStyleLst>
         <a:effectStyle>
           <a:effectLst>
-            <a:outerShdw sx="100000" sy="100000" kx="0" ky="0" algn="b" rotWithShape="0" blurRad="38100" dist="25400" dir="5400000">
+            <a:outerShdw blurRad="38100" dist="25400" dir="5400000" rotWithShape="0">
               <a:srgbClr val="000000">
                 <a:alpha val="50000"/>
               </a:srgbClr>
@@ -3576,7 +4075,7 @@
         </a:effectStyle>
         <a:effectStyle>
           <a:effectLst>
-            <a:outerShdw sx="100000" sy="100000" kx="0" ky="0" algn="b" rotWithShape="0" blurRad="50800" dist="12700" dir="0">
+            <a:outerShdw blurRad="50800" dist="12700" rotWithShape="0">
               <a:srgbClr val="000000">
                 <a:alpha val="50000"/>
               </a:srgbClr>
@@ -3585,7 +4084,7 @@
         </a:effectStyle>
         <a:effectStyle>
           <a:effectLst>
-            <a:outerShdw sx="100000" sy="100000" kx="0" ky="0" algn="b" rotWithShape="0" blurRad="38100" dist="25400" dir="5400000">
+            <a:outerShdw blurRad="38100" dist="25400" dir="5400000" rotWithShape="0">
               <a:srgbClr val="000000">
                 <a:alpha val="50000"/>
               </a:srgbClr>
@@ -3649,8 +4148,8 @@
     <a:spDef>
       <a:spPr>
         <a:blipFill rotWithShape="1">
-          <a:blip r:embed="rId1"/>
-          <a:srcRect l="0" t="0" r="0" b="0"/>
+          <a:blip xmlns:r="http://schemas.openxmlformats.org/officeDocument/2006/relationships" r:embed="rId1"/>
+          <a:srcRect/>
           <a:tile tx="0" ty="0" sx="100000" sy="100000" flip="none" algn="tl"/>
         </a:blipFill>
         <a:ln w="12700" cap="flat">
@@ -3658,7 +4157,7 @@
           <a:miter lim="400000"/>
         </a:ln>
         <a:effectLst>
-          <a:outerShdw sx="100000" sy="100000" kx="0" ky="0" algn="b" rotWithShape="0" blurRad="38100" dist="25400" dir="5400000">
+          <a:outerShdw blurRad="38100" dist="25400" dir="5400000" rotWithShape="0">
             <a:srgbClr val="000000">
               <a:alpha val="50000"/>
             </a:srgbClr>
@@ -3666,7 +4165,7 @@
         </a:effectLst>
         <a:sp3d/>
       </a:spPr>
-      <a:bodyPr rot="0" spcFirstLastPara="1" vertOverflow="overflow" horzOverflow="overflow" vert="horz" wrap="square" lIns="50800" tIns="50800" rIns="50800" bIns="50800" numCol="1" spcCol="38100" rtlCol="0" anchor="ctr" upright="0">
+      <a:bodyPr rot="0" spcFirstLastPara="1" vertOverflow="overflow" horzOverflow="overflow" vert="horz" wrap="square" lIns="50800" tIns="50800" rIns="50800" bIns="50800" numCol="1" spcCol="38100" rtlCol="0" anchor="ctr">
         <a:spAutoFit/>
       </a:bodyPr>
       <a:lstStyle>
@@ -3685,7 +4184,7 @@
           <a:buFontTx/>
           <a:buNone/>
           <a:tabLst/>
-          <a:defRPr b="0" baseline="0" cap="none" i="0" spc="0" strike="noStrike" sz="2400" u="none" kumimoji="0" normalizeH="0">
+          <a:defRPr kumimoji="0" sz="2400" b="0" i="0" u="none" strike="noStrike" cap="none" spc="0" normalizeH="0" baseline="0">
             <a:ln>
               <a:noFill/>
             </a:ln>
@@ -3715,7 +4214,7 @@
           <a:buFontTx/>
           <a:buNone/>
           <a:tabLst/>
-          <a:defRPr b="0" baseline="0" cap="none" i="0" spc="0" strike="noStrike" sz="1800" u="none" kumimoji="0" normalizeH="0">
+          <a:defRPr kumimoji="0" sz="1800" b="0" i="0" u="none" strike="noStrike" cap="none" spc="0" normalizeH="0" baseline="0">
             <a:ln>
               <a:noFill/>
             </a:ln>
@@ -3741,7 +4240,7 @@
           <a:buFontTx/>
           <a:buNone/>
           <a:tabLst/>
-          <a:defRPr b="0" baseline="0" cap="none" i="0" spc="0" strike="noStrike" sz="1800" u="none" kumimoji="0" normalizeH="0">
+          <a:defRPr kumimoji="0" sz="1800" b="0" i="0" u="none" strike="noStrike" cap="none" spc="0" normalizeH="0" baseline="0">
             <a:ln>
               <a:noFill/>
             </a:ln>
@@ -3767,7 +4266,7 @@
           <a:buFontTx/>
           <a:buNone/>
           <a:tabLst/>
-          <a:defRPr b="0" baseline="0" cap="none" i="0" spc="0" strike="noStrike" sz="1800" u="none" kumimoji="0" normalizeH="0">
+          <a:defRPr kumimoji="0" sz="1800" b="0" i="0" u="none" strike="noStrike" cap="none" spc="0" normalizeH="0" baseline="0">
             <a:ln>
               <a:noFill/>
             </a:ln>
@@ -3793,7 +4292,7 @@
           <a:buFontTx/>
           <a:buNone/>
           <a:tabLst/>
-          <a:defRPr b="0" baseline="0" cap="none" i="0" spc="0" strike="noStrike" sz="1800" u="none" kumimoji="0" normalizeH="0">
+          <a:defRPr kumimoji="0" sz="1800" b="0" i="0" u="none" strike="noStrike" cap="none" spc="0" normalizeH="0" baseline="0">
             <a:ln>
               <a:noFill/>
             </a:ln>
@@ -3819,7 +4318,7 @@
           <a:buFontTx/>
           <a:buNone/>
           <a:tabLst/>
-          <a:defRPr b="0" baseline="0" cap="none" i="0" spc="0" strike="noStrike" sz="1800" u="none" kumimoji="0" normalizeH="0">
+          <a:defRPr kumimoji="0" sz="1800" b="0" i="0" u="none" strike="noStrike" cap="none" spc="0" normalizeH="0" baseline="0">
             <a:ln>
               <a:noFill/>
             </a:ln>
@@ -3845,7 +4344,7 @@
           <a:buFontTx/>
           <a:buNone/>
           <a:tabLst/>
-          <a:defRPr b="0" baseline="0" cap="none" i="0" spc="0" strike="noStrike" sz="1800" u="none" kumimoji="0" normalizeH="0">
+          <a:defRPr kumimoji="0" sz="1800" b="0" i="0" u="none" strike="noStrike" cap="none" spc="0" normalizeH="0" baseline="0">
             <a:ln>
               <a:noFill/>
             </a:ln>
@@ -3871,7 +4370,7 @@
           <a:buFontTx/>
           <a:buNone/>
           <a:tabLst/>
-          <a:defRPr b="0" baseline="0" cap="none" i="0" spc="0" strike="noStrike" sz="1800" u="none" kumimoji="0" normalizeH="0">
+          <a:defRPr kumimoji="0" sz="1800" b="0" i="0" u="none" strike="noStrike" cap="none" spc="0" normalizeH="0" baseline="0">
             <a:ln>
               <a:noFill/>
             </a:ln>
@@ -3897,7 +4396,7 @@
           <a:buFontTx/>
           <a:buNone/>
           <a:tabLst/>
-          <a:defRPr b="0" baseline="0" cap="none" i="0" spc="0" strike="noStrike" sz="1800" u="none" kumimoji="0" normalizeH="0">
+          <a:defRPr kumimoji="0" sz="1800" b="0" i="0" u="none" strike="noStrike" cap="none" spc="0" normalizeH="0" baseline="0">
             <a:ln>
               <a:noFill/>
             </a:ln>
@@ -3923,7 +4422,7 @@
           <a:buFontTx/>
           <a:buNone/>
           <a:tabLst/>
-          <a:defRPr b="0" baseline="0" cap="none" i="0" spc="0" strike="noStrike" sz="1800" u="none" kumimoji="0" normalizeH="0">
+          <a:defRPr kumimoji="0" sz="1800" b="0" i="0" u="none" strike="noStrike" cap="none" spc="0" normalizeH="0" baseline="0">
             <a:ln>
               <a:noFill/>
             </a:ln>
@@ -3936,9 +4435,15 @@
         </a:lvl9pPr>
       </a:lstStyle>
       <a:style>
-        <a:lnRef idx="0"/>
-        <a:fillRef idx="0"/>
-        <a:effectRef idx="0"/>
+        <a:lnRef idx="0">
+          <a:scrgbClr r="0" g="0" b="0"/>
+        </a:lnRef>
+        <a:fillRef idx="0">
+          <a:scrgbClr r="0" g="0" b="0"/>
+        </a:fillRef>
+        <a:effectRef idx="0">
+          <a:scrgbClr r="0" g="0" b="0"/>
+        </a:effectRef>
         <a:fontRef idx="none"/>
       </a:style>
     </a:spDef>
@@ -3955,7 +4460,7 @@
         <a:effectLst/>
         <a:sp3d/>
       </a:spPr>
-      <a:bodyPr rot="0" spcFirstLastPara="1" vertOverflow="overflow" horzOverflow="overflow" vert="horz" wrap="square" lIns="91439" tIns="45719" rIns="91439" bIns="45719" numCol="1" spcCol="38100" rtlCol="0" anchor="t" upright="0">
+      <a:bodyPr rot="0" spcFirstLastPara="1" vertOverflow="overflow" horzOverflow="overflow" vert="horz" wrap="square" lIns="91439" tIns="45719" rIns="91439" bIns="45719" numCol="1" spcCol="38100" rtlCol="0" anchor="t">
         <a:noAutofit/>
       </a:bodyPr>
       <a:lstStyle>
@@ -3974,7 +4479,7 @@
           <a:buFontTx/>
           <a:buNone/>
           <a:tabLst/>
-          <a:defRPr b="0" baseline="0" cap="none" i="0" spc="0" strike="noStrike" sz="1800" u="none" kumimoji="0" normalizeH="0">
+          <a:defRPr kumimoji="0" sz="1800" b="0" i="0" u="none" strike="noStrike" cap="none" spc="0" normalizeH="0" baseline="0">
             <a:ln>
               <a:noFill/>
             </a:ln>
@@ -4000,7 +4505,7 @@
           <a:buFontTx/>
           <a:buNone/>
           <a:tabLst/>
-          <a:defRPr b="0" baseline="0" cap="none" i="0" spc="0" strike="noStrike" sz="1800" u="none" kumimoji="0" normalizeH="0">
+          <a:defRPr kumimoji="0" sz="1800" b="0" i="0" u="none" strike="noStrike" cap="none" spc="0" normalizeH="0" baseline="0">
             <a:ln>
               <a:noFill/>
             </a:ln>
@@ -4026,7 +4531,7 @@
           <a:buFontTx/>
           <a:buNone/>
           <a:tabLst/>
-          <a:defRPr b="0" baseline="0" cap="none" i="0" spc="0" strike="noStrike" sz="1800" u="none" kumimoji="0" normalizeH="0">
+          <a:defRPr kumimoji="0" sz="1800" b="0" i="0" u="none" strike="noStrike" cap="none" spc="0" normalizeH="0" baseline="0">
             <a:ln>
               <a:noFill/>
             </a:ln>
@@ -4052,7 +4557,7 @@
           <a:buFontTx/>
           <a:buNone/>
           <a:tabLst/>
-          <a:defRPr b="0" baseline="0" cap="none" i="0" spc="0" strike="noStrike" sz="1800" u="none" kumimoji="0" normalizeH="0">
+          <a:defRPr kumimoji="0" sz="1800" b="0" i="0" u="none" strike="noStrike" cap="none" spc="0" normalizeH="0" baseline="0">
             <a:ln>
               <a:noFill/>
             </a:ln>
@@ -4078,7 +4583,7 @@
           <a:buFontTx/>
           <a:buNone/>
           <a:tabLst/>
-          <a:defRPr b="0" baseline="0" cap="none" i="0" spc="0" strike="noStrike" sz="1800" u="none" kumimoji="0" normalizeH="0">
+          <a:defRPr kumimoji="0" sz="1800" b="0" i="0" u="none" strike="noStrike" cap="none" spc="0" normalizeH="0" baseline="0">
             <a:ln>
               <a:noFill/>
             </a:ln>
@@ -4104,7 +4609,7 @@
           <a:buFontTx/>
           <a:buNone/>
           <a:tabLst/>
-          <a:defRPr b="0" baseline="0" cap="none" i="0" spc="0" strike="noStrike" sz="1800" u="none" kumimoji="0" normalizeH="0">
+          <a:defRPr kumimoji="0" sz="1800" b="0" i="0" u="none" strike="noStrike" cap="none" spc="0" normalizeH="0" baseline="0">
             <a:ln>
               <a:noFill/>
             </a:ln>
@@ -4130,7 +4635,7 @@
           <a:buFontTx/>
           <a:buNone/>
           <a:tabLst/>
-          <a:defRPr b="0" baseline="0" cap="none" i="0" spc="0" strike="noStrike" sz="1800" u="none" kumimoji="0" normalizeH="0">
+          <a:defRPr kumimoji="0" sz="1800" b="0" i="0" u="none" strike="noStrike" cap="none" spc="0" normalizeH="0" baseline="0">
             <a:ln>
               <a:noFill/>
             </a:ln>
@@ -4156,7 +4661,7 @@
           <a:buFontTx/>
           <a:buNone/>
           <a:tabLst/>
-          <a:defRPr b="0" baseline="0" cap="none" i="0" spc="0" strike="noStrike" sz="1800" u="none" kumimoji="0" normalizeH="0">
+          <a:defRPr kumimoji="0" sz="1800" b="0" i="0" u="none" strike="noStrike" cap="none" spc="0" normalizeH="0" baseline="0">
             <a:ln>
               <a:noFill/>
             </a:ln>
@@ -4182,7 +4687,7 @@
           <a:buFontTx/>
           <a:buNone/>
           <a:tabLst/>
-          <a:defRPr b="0" baseline="0" cap="none" i="0" spc="0" strike="noStrike" sz="1800" u="none" kumimoji="0" normalizeH="0">
+          <a:defRPr kumimoji="0" sz="1800" b="0" i="0" u="none" strike="noStrike" cap="none" spc="0" normalizeH="0" baseline="0">
             <a:ln>
               <a:noFill/>
             </a:ln>
@@ -4208,7 +4713,7 @@
           <a:buFontTx/>
           <a:buNone/>
           <a:tabLst/>
-          <a:defRPr b="0" baseline="0" cap="none" i="0" spc="0" strike="noStrike" sz="1800" u="none" kumimoji="0" normalizeH="0">
+          <a:defRPr kumimoji="0" sz="1800" b="0" i="0" u="none" strike="noStrike" cap="none" spc="0" normalizeH="0" baseline="0">
             <a:ln>
               <a:noFill/>
             </a:ln>
@@ -4221,9 +4726,15 @@
         </a:lvl9pPr>
       </a:lstStyle>
       <a:style>
-        <a:lnRef idx="0"/>
-        <a:fillRef idx="0"/>
-        <a:effectRef idx="0"/>
+        <a:lnRef idx="0">
+          <a:scrgbClr r="0" g="0" b="0"/>
+        </a:lnRef>
+        <a:fillRef idx="0">
+          <a:scrgbClr r="0" g="0" b="0"/>
+        </a:fillRef>
+        <a:effectRef idx="0">
+          <a:scrgbClr r="0" g="0" b="0"/>
+        </a:effectRef>
         <a:fontRef idx="none"/>
       </a:style>
     </a:lnDef>
@@ -4237,7 +4748,7 @@
         <a:effectLst/>
         <a:sp3d/>
       </a:spPr>
-      <a:bodyPr rot="0" spcFirstLastPara="1" vertOverflow="overflow" horzOverflow="overflow" vert="horz" wrap="square" lIns="50800" tIns="50800" rIns="50800" bIns="50800" numCol="1" spcCol="38100" rtlCol="0" anchor="ctr" upright="0">
+      <a:bodyPr rot="0" spcFirstLastPara="1" vertOverflow="overflow" horzOverflow="overflow" vert="horz" wrap="square" lIns="50800" tIns="50800" rIns="50800" bIns="50800" numCol="1" spcCol="38100" rtlCol="0" anchor="ctr">
         <a:spAutoFit/>
       </a:bodyPr>
       <a:lstStyle>
@@ -4256,7 +4767,7 @@
           <a:buFontTx/>
           <a:buNone/>
           <a:tabLst/>
-          <a:defRPr b="0" baseline="0" cap="none" i="0" spc="0" strike="noStrike" sz="3600" u="none" kumimoji="0" normalizeH="0">
+          <a:defRPr kumimoji="0" sz="3600" b="0" i="0" u="none" strike="noStrike" cap="none" spc="0" normalizeH="0" baseline="0">
             <a:ln>
               <a:noFill/>
             </a:ln>
@@ -4286,7 +4797,7 @@
           <a:buFontTx/>
           <a:buNone/>
           <a:tabLst/>
-          <a:defRPr b="0" baseline="0" cap="none" i="0" spc="0" strike="noStrike" sz="1800" u="none" kumimoji="0" normalizeH="0">
+          <a:defRPr kumimoji="0" sz="1800" b="0" i="0" u="none" strike="noStrike" cap="none" spc="0" normalizeH="0" baseline="0">
             <a:ln>
               <a:noFill/>
             </a:ln>
@@ -4312,7 +4823,7 @@
           <a:buFontTx/>
           <a:buNone/>
           <a:tabLst/>
-          <a:defRPr b="0" baseline="0" cap="none" i="0" spc="0" strike="noStrike" sz="1800" u="none" kumimoji="0" normalizeH="0">
+          <a:defRPr kumimoji="0" sz="1800" b="0" i="0" u="none" strike="noStrike" cap="none" spc="0" normalizeH="0" baseline="0">
             <a:ln>
               <a:noFill/>
             </a:ln>
@@ -4338,7 +4849,7 @@
           <a:buFontTx/>
           <a:buNone/>
           <a:tabLst/>
-          <a:defRPr b="0" baseline="0" cap="none" i="0" spc="0" strike="noStrike" sz="1800" u="none" kumimoji="0" normalizeH="0">
+          <a:defRPr kumimoji="0" sz="1800" b="0" i="0" u="none" strike="noStrike" cap="none" spc="0" normalizeH="0" baseline="0">
             <a:ln>
               <a:noFill/>
             </a:ln>
@@ -4364,7 +4875,7 @@
           <a:buFontTx/>
           <a:buNone/>
           <a:tabLst/>
-          <a:defRPr b="0" baseline="0" cap="none" i="0" spc="0" strike="noStrike" sz="1800" u="none" kumimoji="0" normalizeH="0">
+          <a:defRPr kumimoji="0" sz="1800" b="0" i="0" u="none" strike="noStrike" cap="none" spc="0" normalizeH="0" baseline="0">
             <a:ln>
               <a:noFill/>
             </a:ln>
@@ -4390,7 +4901,7 @@
           <a:buFontTx/>
           <a:buNone/>
           <a:tabLst/>
-          <a:defRPr b="0" baseline="0" cap="none" i="0" spc="0" strike="noStrike" sz="1800" u="none" kumimoji="0" normalizeH="0">
+          <a:defRPr kumimoji="0" sz="1800" b="0" i="0" u="none" strike="noStrike" cap="none" spc="0" normalizeH="0" baseline="0">
             <a:ln>
               <a:noFill/>
             </a:ln>
@@ -4416,7 +4927,7 @@
           <a:buFontTx/>
           <a:buNone/>
           <a:tabLst/>
-          <a:defRPr b="0" baseline="0" cap="none" i="0" spc="0" strike="noStrike" sz="1800" u="none" kumimoji="0" normalizeH="0">
+          <a:defRPr kumimoji="0" sz="1800" b="0" i="0" u="none" strike="noStrike" cap="none" spc="0" normalizeH="0" baseline="0">
             <a:ln>
               <a:noFill/>
             </a:ln>
@@ -4442,7 +4953,7 @@
           <a:buFontTx/>
           <a:buNone/>
           <a:tabLst/>
-          <a:defRPr b="0" baseline="0" cap="none" i="0" spc="0" strike="noStrike" sz="1800" u="none" kumimoji="0" normalizeH="0">
+          <a:defRPr kumimoji="0" sz="1800" b="0" i="0" u="none" strike="noStrike" cap="none" spc="0" normalizeH="0" baseline="0">
             <a:ln>
               <a:noFill/>
             </a:ln>
@@ -4468,7 +4979,7 @@
           <a:buFontTx/>
           <a:buNone/>
           <a:tabLst/>
-          <a:defRPr b="0" baseline="0" cap="none" i="0" spc="0" strike="noStrike" sz="1800" u="none" kumimoji="0" normalizeH="0">
+          <a:defRPr kumimoji="0" sz="1800" b="0" i="0" u="none" strike="noStrike" cap="none" spc="0" normalizeH="0" baseline="0">
             <a:ln>
               <a:noFill/>
             </a:ln>
@@ -4494,7 +5005,7 @@
           <a:buFontTx/>
           <a:buNone/>
           <a:tabLst/>
-          <a:defRPr b="0" baseline="0" cap="none" i="0" spc="0" strike="noStrike" sz="1800" u="none" kumimoji="0" normalizeH="0">
+          <a:defRPr kumimoji="0" sz="1800" b="0" i="0" u="none" strike="noStrike" cap="none" spc="0" normalizeH="0" baseline="0">
             <a:ln>
               <a:noFill/>
             </a:ln>
@@ -4507,18 +5018,25 @@
         </a:lvl9pPr>
       </a:lstStyle>
       <a:style>
-        <a:lnRef idx="0"/>
-        <a:fillRef idx="0"/>
-        <a:effectRef idx="0"/>
+        <a:lnRef idx="0">
+          <a:scrgbClr r="0" g="0" b="0"/>
+        </a:lnRef>
+        <a:fillRef idx="0">
+          <a:scrgbClr r="0" g="0" b="0"/>
+        </a:fillRef>
+        <a:effectRef idx="0">
+          <a:scrgbClr r="0" g="0" b="0"/>
+        </a:effectRef>
         <a:fontRef idx="none"/>
       </a:style>
     </a:txDef>
   </a:objectDefaults>
+  <a:extraClrSchemeLst/>
 </a:theme>
 </file>
 
 <file path=ppt/theme/theme2.xml><?xml version="1.0" encoding="utf-8"?>
-<a:theme xmlns:a="http://schemas.openxmlformats.org/drawingml/2006/main" xmlns:r="http://schemas.openxmlformats.org/officeDocument/2006/relationships" name="White">
+<a:theme xmlns:a="http://schemas.openxmlformats.org/drawingml/2006/main" name="White">
   <a:themeElements>
     <a:clrScheme name="White">
       <a:dk1>
@@ -4644,7 +5162,7 @@
       <a:effectStyleLst>
         <a:effectStyle>
           <a:effectLst>
-            <a:outerShdw sx="100000" sy="100000" kx="0" ky="0" algn="b" rotWithShape="0" blurRad="38100" dist="25400" dir="5400000">
+            <a:outerShdw blurRad="38100" dist="25400" dir="5400000" rotWithShape="0">
               <a:srgbClr val="000000">
                 <a:alpha val="50000"/>
               </a:srgbClr>
@@ -4653,7 +5171,7 @@
         </a:effectStyle>
         <a:effectStyle>
           <a:effectLst>
-            <a:outerShdw sx="100000" sy="100000" kx="0" ky="0" algn="b" rotWithShape="0" blurRad="50800" dist="12700" dir="0">
+            <a:outerShdw blurRad="50800" dist="12700" rotWithShape="0">
               <a:srgbClr val="000000">
                 <a:alpha val="50000"/>
               </a:srgbClr>
@@ -4662,7 +5180,7 @@
         </a:effectStyle>
         <a:effectStyle>
           <a:effectLst>
-            <a:outerShdw sx="100000" sy="100000" kx="0" ky="0" algn="b" rotWithShape="0" blurRad="38100" dist="25400" dir="5400000">
+            <a:outerShdw blurRad="38100" dist="25400" dir="5400000" rotWithShape="0">
               <a:srgbClr val="000000">
                 <a:alpha val="50000"/>
               </a:srgbClr>
@@ -4726,8 +5244,8 @@
     <a:spDef>
       <a:spPr>
         <a:blipFill rotWithShape="1">
-          <a:blip r:embed="rId1"/>
-          <a:srcRect l="0" t="0" r="0" b="0"/>
+          <a:blip xmlns:r="http://schemas.openxmlformats.org/officeDocument/2006/relationships" r:embed="rId1"/>
+          <a:srcRect/>
           <a:tile tx="0" ty="0" sx="100000" sy="100000" flip="none" algn="tl"/>
         </a:blipFill>
         <a:ln w="12700" cap="flat">
@@ -4735,7 +5253,7 @@
           <a:miter lim="400000"/>
         </a:ln>
         <a:effectLst>
-          <a:outerShdw sx="100000" sy="100000" kx="0" ky="0" algn="b" rotWithShape="0" blurRad="38100" dist="25400" dir="5400000">
+          <a:outerShdw blurRad="38100" dist="25400" dir="5400000" rotWithShape="0">
             <a:srgbClr val="000000">
               <a:alpha val="50000"/>
             </a:srgbClr>
@@ -4743,7 +5261,7 @@
         </a:effectLst>
         <a:sp3d/>
       </a:spPr>
-      <a:bodyPr rot="0" spcFirstLastPara="1" vertOverflow="overflow" horzOverflow="overflow" vert="horz" wrap="square" lIns="50800" tIns="50800" rIns="50800" bIns="50800" numCol="1" spcCol="38100" rtlCol="0" anchor="ctr" upright="0">
+      <a:bodyPr rot="0" spcFirstLastPara="1" vertOverflow="overflow" horzOverflow="overflow" vert="horz" wrap="square" lIns="50800" tIns="50800" rIns="50800" bIns="50800" numCol="1" spcCol="38100" rtlCol="0" anchor="ctr">
         <a:spAutoFit/>
       </a:bodyPr>
       <a:lstStyle>
@@ -4762,7 +5280,7 @@
           <a:buFontTx/>
           <a:buNone/>
           <a:tabLst/>
-          <a:defRPr b="0" baseline="0" cap="none" i="0" spc="0" strike="noStrike" sz="2400" u="none" kumimoji="0" normalizeH="0">
+          <a:defRPr kumimoji="0" sz="2400" b="0" i="0" u="none" strike="noStrike" cap="none" spc="0" normalizeH="0" baseline="0">
             <a:ln>
               <a:noFill/>
             </a:ln>
@@ -4792,7 +5310,7 @@
           <a:buFontTx/>
           <a:buNone/>
           <a:tabLst/>
-          <a:defRPr b="0" baseline="0" cap="none" i="0" spc="0" strike="noStrike" sz="1800" u="none" kumimoji="0" normalizeH="0">
+          <a:defRPr kumimoji="0" sz="1800" b="0" i="0" u="none" strike="noStrike" cap="none" spc="0" normalizeH="0" baseline="0">
             <a:ln>
               <a:noFill/>
             </a:ln>
@@ -4818,7 +5336,7 @@
           <a:buFontTx/>
           <a:buNone/>
           <a:tabLst/>
-          <a:defRPr b="0" baseline="0" cap="none" i="0" spc="0" strike="noStrike" sz="1800" u="none" kumimoji="0" normalizeH="0">
+          <a:defRPr kumimoji="0" sz="1800" b="0" i="0" u="none" strike="noStrike" cap="none" spc="0" normalizeH="0" baseline="0">
             <a:ln>
               <a:noFill/>
             </a:ln>
@@ -4844,7 +5362,7 @@
           <a:buFontTx/>
           <a:buNone/>
           <a:tabLst/>
-          <a:defRPr b="0" baseline="0" cap="none" i="0" spc="0" strike="noStrike" sz="1800" u="none" kumimoji="0" normalizeH="0">
+          <a:defRPr kumimoji="0" sz="1800" b="0" i="0" u="none" strike="noStrike" cap="none" spc="0" normalizeH="0" baseline="0">
             <a:ln>
               <a:noFill/>
             </a:ln>
@@ -4870,7 +5388,7 @@
           <a:buFontTx/>
           <a:buNone/>
           <a:tabLst/>
-          <a:defRPr b="0" baseline="0" cap="none" i="0" spc="0" strike="noStrike" sz="1800" u="none" kumimoji="0" normalizeH="0">
+          <a:defRPr kumimoji="0" sz="1800" b="0" i="0" u="none" strike="noStrike" cap="none" spc="0" normalizeH="0" baseline="0">
             <a:ln>
               <a:noFill/>
             </a:ln>
@@ -4896,7 +5414,7 @@
           <a:buFontTx/>
           <a:buNone/>
           <a:tabLst/>
-          <a:defRPr b="0" baseline="0" cap="none" i="0" spc="0" strike="noStrike" sz="1800" u="none" kumimoji="0" normalizeH="0">
+          <a:defRPr kumimoji="0" sz="1800" b="0" i="0" u="none" strike="noStrike" cap="none" spc="0" normalizeH="0" baseline="0">
             <a:ln>
               <a:noFill/>
             </a:ln>
@@ -4922,7 +5440,7 @@
           <a:buFontTx/>
           <a:buNone/>
           <a:tabLst/>
-          <a:defRPr b="0" baseline="0" cap="none" i="0" spc="0" strike="noStrike" sz="1800" u="none" kumimoji="0" normalizeH="0">
+          <a:defRPr kumimoji="0" sz="1800" b="0" i="0" u="none" strike="noStrike" cap="none" spc="0" normalizeH="0" baseline="0">
             <a:ln>
               <a:noFill/>
             </a:ln>
@@ -4948,7 +5466,7 @@
           <a:buFontTx/>
           <a:buNone/>
           <a:tabLst/>
-          <a:defRPr b="0" baseline="0" cap="none" i="0" spc="0" strike="noStrike" sz="1800" u="none" kumimoji="0" normalizeH="0">
+          <a:defRPr kumimoji="0" sz="1800" b="0" i="0" u="none" strike="noStrike" cap="none" spc="0" normalizeH="0" baseline="0">
             <a:ln>
               <a:noFill/>
             </a:ln>
@@ -4974,7 +5492,7 @@
           <a:buFontTx/>
           <a:buNone/>
           <a:tabLst/>
-          <a:defRPr b="0" baseline="0" cap="none" i="0" spc="0" strike="noStrike" sz="1800" u="none" kumimoji="0" normalizeH="0">
+          <a:defRPr kumimoji="0" sz="1800" b="0" i="0" u="none" strike="noStrike" cap="none" spc="0" normalizeH="0" baseline="0">
             <a:ln>
               <a:noFill/>
             </a:ln>
@@ -5000,7 +5518,7 @@
           <a:buFontTx/>
           <a:buNone/>
           <a:tabLst/>
-          <a:defRPr b="0" baseline="0" cap="none" i="0" spc="0" strike="noStrike" sz="1800" u="none" kumimoji="0" normalizeH="0">
+          <a:defRPr kumimoji="0" sz="1800" b="0" i="0" u="none" strike="noStrike" cap="none" spc="0" normalizeH="0" baseline="0">
             <a:ln>
               <a:noFill/>
             </a:ln>
@@ -5013,9 +5531,15 @@
         </a:lvl9pPr>
       </a:lstStyle>
       <a:style>
-        <a:lnRef idx="0"/>
-        <a:fillRef idx="0"/>
-        <a:effectRef idx="0"/>
+        <a:lnRef idx="0">
+          <a:scrgbClr r="0" g="0" b="0"/>
+        </a:lnRef>
+        <a:fillRef idx="0">
+          <a:scrgbClr r="0" g="0" b="0"/>
+        </a:fillRef>
+        <a:effectRef idx="0">
+          <a:scrgbClr r="0" g="0" b="0"/>
+        </a:effectRef>
         <a:fontRef idx="none"/>
       </a:style>
     </a:spDef>
@@ -5032,7 +5556,7 @@
         <a:effectLst/>
         <a:sp3d/>
       </a:spPr>
-      <a:bodyPr rot="0" spcFirstLastPara="1" vertOverflow="overflow" horzOverflow="overflow" vert="horz" wrap="square" lIns="91439" tIns="45719" rIns="91439" bIns="45719" numCol="1" spcCol="38100" rtlCol="0" anchor="t" upright="0">
+      <a:bodyPr rot="0" spcFirstLastPara="1" vertOverflow="overflow" horzOverflow="overflow" vert="horz" wrap="square" lIns="91439" tIns="45719" rIns="91439" bIns="45719" numCol="1" spcCol="38100" rtlCol="0" anchor="t">
         <a:noAutofit/>
       </a:bodyPr>
       <a:lstStyle>
@@ -5051,7 +5575,7 @@
           <a:buFontTx/>
           <a:buNone/>
           <a:tabLst/>
-          <a:defRPr b="0" baseline="0" cap="none" i="0" spc="0" strike="noStrike" sz="1800" u="none" kumimoji="0" normalizeH="0">
+          <a:defRPr kumimoji="0" sz="1800" b="0" i="0" u="none" strike="noStrike" cap="none" spc="0" normalizeH="0" baseline="0">
             <a:ln>
               <a:noFill/>
             </a:ln>
@@ -5077,7 +5601,7 @@
           <a:buFontTx/>
           <a:buNone/>
           <a:tabLst/>
-          <a:defRPr b="0" baseline="0" cap="none" i="0" spc="0" strike="noStrike" sz="1800" u="none" kumimoji="0" normalizeH="0">
+          <a:defRPr kumimoji="0" sz="1800" b="0" i="0" u="none" strike="noStrike" cap="none" spc="0" normalizeH="0" baseline="0">
             <a:ln>
               <a:noFill/>
             </a:ln>
@@ -5103,7 +5627,7 @@
           <a:buFontTx/>
           <a:buNone/>
           <a:tabLst/>
-          <a:defRPr b="0" baseline="0" cap="none" i="0" spc="0" strike="noStrike" sz="1800" u="none" kumimoji="0" normalizeH="0">
+          <a:defRPr kumimoji="0" sz="1800" b="0" i="0" u="none" strike="noStrike" cap="none" spc="0" normalizeH="0" baseline="0">
             <a:ln>
               <a:noFill/>
             </a:ln>
@@ -5129,7 +5653,7 @@
           <a:buFontTx/>
           <a:buNone/>
           <a:tabLst/>
-          <a:defRPr b="0" baseline="0" cap="none" i="0" spc="0" strike="noStrike" sz="1800" u="none" kumimoji="0" normalizeH="0">
+          <a:defRPr kumimoji="0" sz="1800" b="0" i="0" u="none" strike="noStrike" cap="none" spc="0" normalizeH="0" baseline="0">
             <a:ln>
               <a:noFill/>
             </a:ln>
@@ -5155,7 +5679,7 @@
           <a:buFontTx/>
           <a:buNone/>
           <a:tabLst/>
-          <a:defRPr b="0" baseline="0" cap="none" i="0" spc="0" strike="noStrike" sz="1800" u="none" kumimoji="0" normalizeH="0">
+          <a:defRPr kumimoji="0" sz="1800" b="0" i="0" u="none" strike="noStrike" cap="none" spc="0" normalizeH="0" baseline="0">
             <a:ln>
               <a:noFill/>
             </a:ln>
@@ -5181,7 +5705,7 @@
           <a:buFontTx/>
           <a:buNone/>
           <a:tabLst/>
-          <a:defRPr b="0" baseline="0" cap="none" i="0" spc="0" strike="noStrike" sz="1800" u="none" kumimoji="0" normalizeH="0">
+          <a:defRPr kumimoji="0" sz="1800" b="0" i="0" u="none" strike="noStrike" cap="none" spc="0" normalizeH="0" baseline="0">
             <a:ln>
               <a:noFill/>
             </a:ln>
@@ -5207,7 +5731,7 @@
           <a:buFontTx/>
           <a:buNone/>
           <a:tabLst/>
-          <a:defRPr b="0" baseline="0" cap="none" i="0" spc="0" strike="noStrike" sz="1800" u="none" kumimoji="0" normalizeH="0">
+          <a:defRPr kumimoji="0" sz="1800" b="0" i="0" u="none" strike="noStrike" cap="none" spc="0" normalizeH="0" baseline="0">
             <a:ln>
               <a:noFill/>
             </a:ln>
@@ -5233,7 +5757,7 @@
           <a:buFontTx/>
           <a:buNone/>
           <a:tabLst/>
-          <a:defRPr b="0" baseline="0" cap="none" i="0" spc="0" strike="noStrike" sz="1800" u="none" kumimoji="0" normalizeH="0">
+          <a:defRPr kumimoji="0" sz="1800" b="0" i="0" u="none" strike="noStrike" cap="none" spc="0" normalizeH="0" baseline="0">
             <a:ln>
               <a:noFill/>
             </a:ln>
@@ -5259,7 +5783,7 @@
           <a:buFontTx/>
           <a:buNone/>
           <a:tabLst/>
-          <a:defRPr b="0" baseline="0" cap="none" i="0" spc="0" strike="noStrike" sz="1800" u="none" kumimoji="0" normalizeH="0">
+          <a:defRPr kumimoji="0" sz="1800" b="0" i="0" u="none" strike="noStrike" cap="none" spc="0" normalizeH="0" baseline="0">
             <a:ln>
               <a:noFill/>
             </a:ln>
@@ -5285,7 +5809,7 @@
           <a:buFontTx/>
           <a:buNone/>
           <a:tabLst/>
-          <a:defRPr b="0" baseline="0" cap="none" i="0" spc="0" strike="noStrike" sz="1800" u="none" kumimoji="0" normalizeH="0">
+          <a:defRPr kumimoji="0" sz="1800" b="0" i="0" u="none" strike="noStrike" cap="none" spc="0" normalizeH="0" baseline="0">
             <a:ln>
               <a:noFill/>
             </a:ln>
@@ -5298,9 +5822,15 @@
         </a:lvl9pPr>
       </a:lstStyle>
       <a:style>
-        <a:lnRef idx="0"/>
-        <a:fillRef idx="0"/>
-        <a:effectRef idx="0"/>
+        <a:lnRef idx="0">
+          <a:scrgbClr r="0" g="0" b="0"/>
+        </a:lnRef>
+        <a:fillRef idx="0">
+          <a:scrgbClr r="0" g="0" b="0"/>
+        </a:fillRef>
+        <a:effectRef idx="0">
+          <a:scrgbClr r="0" g="0" b="0"/>
+        </a:effectRef>
         <a:fontRef idx="none"/>
       </a:style>
     </a:lnDef>
@@ -5314,7 +5844,7 @@
         <a:effectLst/>
         <a:sp3d/>
       </a:spPr>
-      <a:bodyPr rot="0" spcFirstLastPara="1" vertOverflow="overflow" horzOverflow="overflow" vert="horz" wrap="square" lIns="50800" tIns="50800" rIns="50800" bIns="50800" numCol="1" spcCol="38100" rtlCol="0" anchor="ctr" upright="0">
+      <a:bodyPr rot="0" spcFirstLastPara="1" vertOverflow="overflow" horzOverflow="overflow" vert="horz" wrap="square" lIns="50800" tIns="50800" rIns="50800" bIns="50800" numCol="1" spcCol="38100" rtlCol="0" anchor="ctr">
         <a:spAutoFit/>
       </a:bodyPr>
       <a:lstStyle>
@@ -5333,7 +5863,7 @@
           <a:buFontTx/>
           <a:buNone/>
           <a:tabLst/>
-          <a:defRPr b="0" baseline="0" cap="none" i="0" spc="0" strike="noStrike" sz="3600" u="none" kumimoji="0" normalizeH="0">
+          <a:defRPr kumimoji="0" sz="3600" b="0" i="0" u="none" strike="noStrike" cap="none" spc="0" normalizeH="0" baseline="0">
             <a:ln>
               <a:noFill/>
             </a:ln>
@@ -5363,7 +5893,7 @@
           <a:buFontTx/>
           <a:buNone/>
           <a:tabLst/>
-          <a:defRPr b="0" baseline="0" cap="none" i="0" spc="0" strike="noStrike" sz="1800" u="none" kumimoji="0" normalizeH="0">
+          <a:defRPr kumimoji="0" sz="1800" b="0" i="0" u="none" strike="noStrike" cap="none" spc="0" normalizeH="0" baseline="0">
             <a:ln>
               <a:noFill/>
             </a:ln>
@@ -5389,7 +5919,7 @@
           <a:buFontTx/>
           <a:buNone/>
           <a:tabLst/>
-          <a:defRPr b="0" baseline="0" cap="none" i="0" spc="0" strike="noStrike" sz="1800" u="none" kumimoji="0" normalizeH="0">
+          <a:defRPr kumimoji="0" sz="1800" b="0" i="0" u="none" strike="noStrike" cap="none" spc="0" normalizeH="0" baseline="0">
             <a:ln>
               <a:noFill/>
             </a:ln>
@@ -5415,7 +5945,7 @@
           <a:buFontTx/>
           <a:buNone/>
           <a:tabLst/>
-          <a:defRPr b="0" baseline="0" cap="none" i="0" spc="0" strike="noStrike" sz="1800" u="none" kumimoji="0" normalizeH="0">
+          <a:defRPr kumimoji="0" sz="1800" b="0" i="0" u="none" strike="noStrike" cap="none" spc="0" normalizeH="0" baseline="0">
             <a:ln>
               <a:noFill/>
             </a:ln>
@@ -5441,7 +5971,7 @@
           <a:buFontTx/>
           <a:buNone/>
           <a:tabLst/>
-          <a:defRPr b="0" baseline="0" cap="none" i="0" spc="0" strike="noStrike" sz="1800" u="none" kumimoji="0" normalizeH="0">
+          <a:defRPr kumimoji="0" sz="1800" b="0" i="0" u="none" strike="noStrike" cap="none" spc="0" normalizeH="0" baseline="0">
             <a:ln>
               <a:noFill/>
             </a:ln>
@@ -5467,7 +5997,7 @@
           <a:buFontTx/>
           <a:buNone/>
           <a:tabLst/>
-          <a:defRPr b="0" baseline="0" cap="none" i="0" spc="0" strike="noStrike" sz="1800" u="none" kumimoji="0" normalizeH="0">
+          <a:defRPr kumimoji="0" sz="1800" b="0" i="0" u="none" strike="noStrike" cap="none" spc="0" normalizeH="0" baseline="0">
             <a:ln>
               <a:noFill/>
             </a:ln>
@@ -5493,7 +6023,7 @@
           <a:buFontTx/>
           <a:buNone/>
           <a:tabLst/>
-          <a:defRPr b="0" baseline="0" cap="none" i="0" spc="0" strike="noStrike" sz="1800" u="none" kumimoji="0" normalizeH="0">
+          <a:defRPr kumimoji="0" sz="1800" b="0" i="0" u="none" strike="noStrike" cap="none" spc="0" normalizeH="0" baseline="0">
             <a:ln>
               <a:noFill/>
             </a:ln>
@@ -5519,7 +6049,7 @@
           <a:buFontTx/>
           <a:buNone/>
           <a:tabLst/>
-          <a:defRPr b="0" baseline="0" cap="none" i="0" spc="0" strike="noStrike" sz="1800" u="none" kumimoji="0" normalizeH="0">
+          <a:defRPr kumimoji="0" sz="1800" b="0" i="0" u="none" strike="noStrike" cap="none" spc="0" normalizeH="0" baseline="0">
             <a:ln>
               <a:noFill/>
             </a:ln>
@@ -5545,7 +6075,7 @@
           <a:buFontTx/>
           <a:buNone/>
           <a:tabLst/>
-          <a:defRPr b="0" baseline="0" cap="none" i="0" spc="0" strike="noStrike" sz="1800" u="none" kumimoji="0" normalizeH="0">
+          <a:defRPr kumimoji="0" sz="1800" b="0" i="0" u="none" strike="noStrike" cap="none" spc="0" normalizeH="0" baseline="0">
             <a:ln>
               <a:noFill/>
             </a:ln>
@@ -5571,7 +6101,7 @@
           <a:buFontTx/>
           <a:buNone/>
           <a:tabLst/>
-          <a:defRPr b="0" baseline="0" cap="none" i="0" spc="0" strike="noStrike" sz="1800" u="none" kumimoji="0" normalizeH="0">
+          <a:defRPr kumimoji="0" sz="1800" b="0" i="0" u="none" strike="noStrike" cap="none" spc="0" normalizeH="0" baseline="0">
             <a:ln>
               <a:noFill/>
             </a:ln>
@@ -5584,12 +6114,19 @@
         </a:lvl9pPr>
       </a:lstStyle>
       <a:style>
-        <a:lnRef idx="0"/>
-        <a:fillRef idx="0"/>
-        <a:effectRef idx="0"/>
+        <a:lnRef idx="0">
+          <a:scrgbClr r="0" g="0" b="0"/>
+        </a:lnRef>
+        <a:fillRef idx="0">
+          <a:scrgbClr r="0" g="0" b="0"/>
+        </a:fillRef>
+        <a:effectRef idx="0">
+          <a:scrgbClr r="0" g="0" b="0"/>
+        </a:effectRef>
         <a:fontRef idx="none"/>
       </a:style>
     </a:txDef>
   </a:objectDefaults>
+  <a:extraClrSchemeLst/>
 </a:theme>
 </file>
</xml_diff>

<commit_message>
General challnges section updated
Updated the file. Added my parts, added agenda section
</commit_message>
<xml_diff>
--- a/PPT.pptx
+++ b/PPT.pptx
@@ -5,20 +5,26 @@
     <p:sldMasterId id="2147483648" r:id="rId1"/>
   </p:sldMasterIdLst>
   <p:notesMasterIdLst>
-    <p:notesMasterId r:id="rId13"/>
+    <p:notesMasterId r:id="rId19"/>
   </p:notesMasterIdLst>
   <p:sldIdLst>
     <p:sldId id="256" r:id="rId2"/>
-    <p:sldId id="257" r:id="rId3"/>
-    <p:sldId id="261" r:id="rId4"/>
-    <p:sldId id="262" r:id="rId5"/>
-    <p:sldId id="263" r:id="rId6"/>
-    <p:sldId id="258" r:id="rId7"/>
-    <p:sldId id="266" r:id="rId8"/>
-    <p:sldId id="267" r:id="rId9"/>
-    <p:sldId id="265" r:id="rId10"/>
-    <p:sldId id="259" r:id="rId11"/>
-    <p:sldId id="260" r:id="rId12"/>
+    <p:sldId id="271" r:id="rId3"/>
+    <p:sldId id="269" r:id="rId4"/>
+    <p:sldId id="257" r:id="rId5"/>
+    <p:sldId id="272" r:id="rId6"/>
+    <p:sldId id="268" r:id="rId7"/>
+    <p:sldId id="261" r:id="rId8"/>
+    <p:sldId id="262" r:id="rId9"/>
+    <p:sldId id="263" r:id="rId10"/>
+    <p:sldId id="273" r:id="rId11"/>
+    <p:sldId id="274" r:id="rId12"/>
+    <p:sldId id="258" r:id="rId13"/>
+    <p:sldId id="266" r:id="rId14"/>
+    <p:sldId id="267" r:id="rId15"/>
+    <p:sldId id="265" r:id="rId16"/>
+    <p:sldId id="259" r:id="rId17"/>
+    <p:sldId id="260" r:id="rId18"/>
   </p:sldIdLst>
   <p:sldSz cx="13004800" cy="9753600"/>
   <p:notesSz cx="6858000" cy="9144000"/>
@@ -322,7 +328,7 @@
   </p:defaultTextStyle>
   <p:extLst>
     <p:ext uri="{EFAFB233-063F-42B5-8137-9DF3F51BA10A}">
-      <p15:sldGuideLst xmlns:p15="http://schemas.microsoft.com/office/powerpoint/2012/main">
+      <p15:sldGuideLst xmlns:p15="http://schemas.microsoft.com/office/powerpoint/2012/main" xmlns="">
         <p15:guide id="1" orient="horz" pos="3072">
           <p15:clr>
             <a:srgbClr val="A4A3A4"/>
@@ -2149,7 +2155,7 @@
           </a:ln>
           <a:extLst>
             <a:ext uri="{C572A759-6A51-4108-AA02-DFA0A04FC94B}">
-              <ma14:wrappingTextBoxFlag xmlns="" xmlns:ma14="http://schemas.microsoft.com/office/mac/drawingml/2011/main" val="1"/>
+              <ma14:wrappingTextBoxFlag xmlns:ma14="http://schemas.microsoft.com/office/mac/drawingml/2011/main" xmlns="" val="1"/>
             </a:ext>
           </a:extLst>
         </p:spPr>
@@ -2188,7 +2194,7 @@
           </a:ln>
           <a:extLst>
             <a:ext uri="{C572A759-6A51-4108-AA02-DFA0A04FC94B}">
-              <ma14:wrappingTextBoxFlag xmlns="" xmlns:ma14="http://schemas.microsoft.com/office/mac/drawingml/2011/main" val="1"/>
+              <ma14:wrappingTextBoxFlag xmlns:ma14="http://schemas.microsoft.com/office/mac/drawingml/2011/main" xmlns="" val="1"/>
             </a:ext>
           </a:extLst>
         </p:spPr>
@@ -3122,6 +3128,7 @@
           </a:lstStyle>
           <a:p>
             <a:r>
+              <a:rPr dirty="0"/>
               <a:t>Challenges of Intercultural Project Management</a:t>
             </a:r>
           </a:p>
@@ -3171,7 +3178,7 @@
           </a:ln>
           <a:extLst>
             <a:ext uri="{C572A759-6A51-4108-AA02-DFA0A04FC94B}">
-              <ma14:wrappingTextBoxFlag xmlns="" xmlns:ma14="http://schemas.microsoft.com/office/mac/drawingml/2011/main" val="1"/>
+              <ma14:wrappingTextBoxFlag xmlns:ma14="http://schemas.microsoft.com/office/mac/drawingml/2011/main" xmlns="" val="1"/>
             </a:ext>
           </a:extLst>
         </p:spPr>
@@ -3219,7 +3226,7 @@
       </p:grpSpPr>
       <p:pic>
         <p:nvPicPr>
-          <p:cNvPr id="131" name="110809_familychineseoahu_en_00317_2040x1360.jpeg"/>
+          <p:cNvPr id="123" name="110809_familychineseoahu_en_00317_2040x1360.jpeg"/>
           <p:cNvPicPr>
             <a:picLocks noGrp="1" noChangeAspect="1"/>
           </p:cNvPicPr>
@@ -3229,14 +3236,21 @@
         </p:nvPicPr>
         <p:blipFill>
           <a:blip r:embed="rId2">
-            <a:extLst/>
+            <a:extLst>
+              <a:ext uri="{28A0092B-C50C-407E-A947-70E740481C1C}">
+                <a14:useLocalDpi xmlns:a14="http://schemas.microsoft.com/office/drawing/2010/main" val="0"/>
+              </a:ext>
+            </a:extLst>
           </a:blip>
-          <a:srcRect l="32374" r="24460" b="102"/>
           <a:stretch>
             <a:fillRect/>
           </a:stretch>
         </p:blipFill>
         <p:spPr>
+          <a:xfrm>
+            <a:off x="6807200" y="2895600"/>
+            <a:ext cx="5334000" cy="5715000"/>
+          </a:xfrm>
           <a:prstGeom prst="rect">
             <a:avLst/>
           </a:prstGeom>
@@ -3244,7 +3258,7 @@
       </p:pic>
       <p:sp>
         <p:nvSpPr>
-          <p:cNvPr id="132" name="Shape 132"/>
+          <p:cNvPr id="124" name="Shape 124"/>
           <p:cNvSpPr>
             <a:spLocks noGrp="1"/>
           </p:cNvSpPr>
@@ -3253,6 +3267,10 @@
           </p:nvPr>
         </p:nvSpPr>
         <p:spPr>
+          <a:xfrm>
+            <a:off x="1016000" y="533400"/>
+            <a:ext cx="5334000" cy="2184400"/>
+          </a:xfrm>
           <a:prstGeom prst="rect">
             <a:avLst/>
           </a:prstGeom>
@@ -3262,14 +3280,15 @@
           <a:lstStyle/>
           <a:p>
             <a:r>
-              <a:t>Onsite </a:t>
+              <a:rPr dirty="0"/>
+              <a:t>General Challenges</a:t>
             </a:r>
           </a:p>
         </p:txBody>
       </p:sp>
       <p:sp>
         <p:nvSpPr>
-          <p:cNvPr id="133" name="Shape 133"/>
+          <p:cNvPr id="125" name="Shape 125"/>
           <p:cNvSpPr>
             <a:spLocks noGrp="1"/>
           </p:cNvSpPr>
@@ -3278,20 +3297,93 @@
           </p:nvPr>
         </p:nvSpPr>
         <p:spPr>
+          <a:xfrm>
+            <a:off x="952500" y="2971800"/>
+            <a:ext cx="5334000" cy="5892800"/>
+          </a:xfrm>
           <a:prstGeom prst="rect">
             <a:avLst/>
           </a:prstGeom>
         </p:spPr>
         <p:txBody>
-          <a:bodyPr/>
+          <a:bodyPr>
+            <a:normAutofit fontScale="77500" lnSpcReduction="20000"/>
+          </a:bodyPr>
           <a:lstStyle/>
           <a:p>
+            <a:pPr algn="just"/>
+            <a:r>
+              <a:rPr lang="en-US" dirty="0"/>
+              <a:t>Understand and respect cultural differences</a:t>
+            </a:r>
+            <a:endParaRPr lang="en-US" dirty="0"/>
+          </a:p>
+          <a:p>
+            <a:pPr algn="just"/>
+            <a:r>
+              <a:rPr lang="en-US" dirty="0"/>
+              <a:t>– Know your clients/team and be prepared; not knowing can affect </a:t>
+            </a:r>
+            <a:r>
+              <a:rPr lang="en-US" dirty="0" smtClean="0"/>
+              <a:t>relationship</a:t>
+            </a:r>
+          </a:p>
+          <a:p>
+            <a:pPr algn="just"/>
+            <a:endParaRPr lang="en-US" dirty="0"/>
+          </a:p>
+          <a:p>
+            <a:pPr algn="just"/>
+            <a:r>
+              <a:rPr lang="en-US" dirty="0"/>
+              <a:t>– Judging people’s origin by looks Physical appearance or by their last names, for</a:t>
+            </a:r>
+            <a:endParaRPr lang="en-US" dirty="0"/>
+          </a:p>
+          <a:p>
+            <a:pPr algn="just"/>
+            <a:r>
+              <a:rPr lang="en-US" dirty="0"/>
+              <a:t>example Pakistanis are not Indian, Taiwanese are not Chinese, Korean are </a:t>
+            </a:r>
+            <a:r>
+              <a:rPr lang="en-US" dirty="0" smtClean="0"/>
+              <a:t>not Japanese</a:t>
+            </a:r>
+          </a:p>
+          <a:p>
+            <a:pPr algn="just"/>
+            <a:endParaRPr lang="en-US" dirty="0"/>
+          </a:p>
+          <a:p>
+            <a:pPr algn="just"/>
+            <a:r>
+              <a:rPr lang="en-US" dirty="0"/>
+              <a:t>– Accent can usually tell where people are from</a:t>
+            </a:r>
+            <a:endParaRPr lang="en-US" dirty="0"/>
+          </a:p>
+          <a:p>
+            <a:pPr algn="just"/>
+            <a:r>
+              <a:rPr lang="en-US" dirty="0"/>
+              <a:t>– Respect culture by trying their food; can be a good conversation topic</a:t>
+            </a:r>
+            <a:endParaRPr lang="en-US" dirty="0"/>
+          </a:p>
+          <a:p>
             <a:pPr algn="l"/>
-            <a:endParaRPr/>
+            <a:endParaRPr dirty="0"/>
           </a:p>
         </p:txBody>
       </p:sp>
     </p:spTree>
+    <p:extLst>
+      <p:ext uri="{BB962C8B-B14F-4D97-AF65-F5344CB8AC3E}">
+        <p14:creationId xmlns:p14="http://schemas.microsoft.com/office/powerpoint/2010/main" val="3730208288"/>
+      </p:ext>
+    </p:extLst>
   </p:cSld>
   <p:clrMapOvr>
     <a:masterClrMapping/>
@@ -3324,87 +3416,6 @@
           <a:chExt cx="0" cy="0"/>
         </a:xfrm>
       </p:grpSpPr>
-      <p:sp>
-        <p:nvSpPr>
-          <p:cNvPr id="135" name="Shape 135"/>
-          <p:cNvSpPr>
-            <a:spLocks noGrp="1"/>
-          </p:cNvSpPr>
-          <p:nvPr>
-            <p:ph type="title"/>
-          </p:nvPr>
-        </p:nvSpPr>
-        <p:spPr>
-          <a:prstGeom prst="rect">
-            <a:avLst/>
-          </a:prstGeom>
-        </p:spPr>
-        <p:txBody>
-          <a:bodyPr/>
-          <a:lstStyle/>
-          <a:p>
-            <a:r>
-              <a:t>Drawbacks</a:t>
-            </a:r>
-          </a:p>
-        </p:txBody>
-      </p:sp>
-      <p:sp>
-        <p:nvSpPr>
-          <p:cNvPr id="136" name="Shape 136"/>
-          <p:cNvSpPr>
-            <a:spLocks noGrp="1"/>
-          </p:cNvSpPr>
-          <p:nvPr>
-            <p:ph type="body" idx="1"/>
-          </p:nvPr>
-        </p:nvSpPr>
-        <p:spPr>
-          <a:prstGeom prst="rect">
-            <a:avLst/>
-          </a:prstGeom>
-        </p:spPr>
-        <p:txBody>
-          <a:bodyPr/>
-          <a:lstStyle/>
-          <a:p>
-            <a:endParaRPr/>
-          </a:p>
-        </p:txBody>
-      </p:sp>
-    </p:spTree>
-  </p:cSld>
-  <p:clrMapOvr>
-    <a:masterClrMapping/>
-  </p:clrMapOvr>
-  <p:transition spd="slow"/>
-  <p:timing>
-    <p:tnLst>
-      <p:par>
-        <p:cTn id="1" dur="indefinite" restart="never" nodeType="tmRoot"/>
-      </p:par>
-    </p:tnLst>
-  </p:timing>
-</p:sld>
-</file>
-
-<file path=ppt/slides/slide2.xml><?xml version="1.0" encoding="utf-8"?>
-<p:sld xmlns:a="http://schemas.openxmlformats.org/drawingml/2006/main" xmlns:r="http://schemas.openxmlformats.org/officeDocument/2006/relationships" xmlns:p="http://schemas.openxmlformats.org/presentationml/2006/main">
-  <p:cSld>
-    <p:spTree>
-      <p:nvGrpSpPr>
-        <p:cNvPr id="1" name=""/>
-        <p:cNvGrpSpPr/>
-        <p:nvPr/>
-      </p:nvGrpSpPr>
-      <p:grpSpPr>
-        <a:xfrm>
-          <a:off x="0" y="0"/>
-          <a:ext cx="0" cy="0"/>
-          <a:chOff x="0" y="0"/>
-          <a:chExt cx="0" cy="0"/>
-        </a:xfrm>
-      </p:grpSpPr>
       <p:pic>
         <p:nvPicPr>
           <p:cNvPr id="123" name="110809_familychineseoahu_en_00317_2040x1360.jpeg"/>
@@ -3417,14 +3428,21 @@
         </p:nvPicPr>
         <p:blipFill>
           <a:blip r:embed="rId2">
-            <a:extLst/>
+            <a:extLst>
+              <a:ext uri="{28A0092B-C50C-407E-A947-70E740481C1C}">
+                <a14:useLocalDpi xmlns:a14="http://schemas.microsoft.com/office/drawing/2010/main" val="0"/>
+              </a:ext>
+            </a:extLst>
           </a:blip>
-          <a:srcRect l="32374" r="24460" b="102"/>
           <a:stretch>
             <a:fillRect/>
           </a:stretch>
         </p:blipFill>
         <p:spPr>
+          <a:xfrm>
+            <a:off x="6654800" y="2667000"/>
+            <a:ext cx="5486400" cy="5562600"/>
+          </a:xfrm>
           <a:prstGeom prst="rect">
             <a:avLst/>
           </a:prstGeom>
@@ -3441,6 +3459,10 @@
           </p:nvPr>
         </p:nvSpPr>
         <p:spPr>
+          <a:xfrm>
+            <a:off x="1016000" y="533400"/>
+            <a:ext cx="5334000" cy="2184400"/>
+          </a:xfrm>
           <a:prstGeom prst="rect">
             <a:avLst/>
           </a:prstGeom>
@@ -3467,132 +3489,111 @@
           </p:nvPr>
         </p:nvSpPr>
         <p:spPr>
-          <a:prstGeom prst="rect">
-            <a:avLst/>
-          </a:prstGeom>
-        </p:spPr>
-        <p:txBody>
-          <a:bodyPr/>
-          <a:lstStyle/>
-          <a:p>
-            <a:pPr algn="l"/>
-            <a:r>
-              <a:rPr lang="en-US" dirty="0"/>
-              <a:t>The PMs should be aware of the following challenges while working in a culturally diverse team -</a:t>
-            </a:r>
-          </a:p>
-        </p:txBody>
-      </p:sp>
-    </p:spTree>
-  </p:cSld>
-  <p:clrMapOvr>
-    <a:masterClrMapping/>
-  </p:clrMapOvr>
-  <p:transition spd="slow"/>
-</p:sld>
-</file>
-
-<file path=ppt/slides/slide3.xml><?xml version="1.0" encoding="utf-8"?>
-<p:sld xmlns:a="http://schemas.openxmlformats.org/drawingml/2006/main" xmlns:r="http://schemas.openxmlformats.org/officeDocument/2006/relationships" xmlns:p="http://schemas.openxmlformats.org/presentationml/2006/main">
-  <p:cSld>
-    <p:spTree>
-      <p:nvGrpSpPr>
-        <p:cNvPr id="1" name=""/>
-        <p:cNvGrpSpPr/>
-        <p:nvPr/>
-      </p:nvGrpSpPr>
-      <p:grpSpPr>
-        <a:xfrm>
-          <a:off x="0" y="0"/>
-          <a:ext cx="0" cy="0"/>
-          <a:chOff x="0" y="0"/>
-          <a:chExt cx="0" cy="0"/>
-        </a:xfrm>
-      </p:grpSpPr>
-      <p:pic>
-        <p:nvPicPr>
-          <p:cNvPr id="123" name="110809_familychineseoahu_en_00317_2040x1360.jpeg"/>
-          <p:cNvPicPr>
-            <a:picLocks noGrp="1" noChangeAspect="1"/>
-          </p:cNvPicPr>
-          <p:nvPr>
-            <p:ph type="pic" idx="13"/>
-          </p:nvPr>
-        </p:nvPicPr>
-        <p:blipFill>
-          <a:blip r:embed="rId2">
-            <a:extLst/>
-          </a:blip>
-          <a:srcRect l="32374" r="24460" b="102"/>
-          <a:stretch>
-            <a:fillRect/>
-          </a:stretch>
-        </p:blipFill>
-        <p:spPr>
-          <a:prstGeom prst="rect">
-            <a:avLst/>
-          </a:prstGeom>
-        </p:spPr>
-      </p:pic>
-      <p:sp>
-        <p:nvSpPr>
-          <p:cNvPr id="124" name="Shape 124"/>
-          <p:cNvSpPr>
-            <a:spLocks noGrp="1"/>
-          </p:cNvSpPr>
-          <p:nvPr>
-            <p:ph type="title"/>
-          </p:nvPr>
-        </p:nvSpPr>
-        <p:spPr>
-          <a:prstGeom prst="rect">
-            <a:avLst/>
-          </a:prstGeom>
-        </p:spPr>
-        <p:txBody>
-          <a:bodyPr/>
-          <a:lstStyle/>
-          <a:p>
-            <a:r>
-              <a:rPr dirty="0"/>
-              <a:t>General Challenges</a:t>
-            </a:r>
-          </a:p>
-        </p:txBody>
-      </p:sp>
-      <p:sp>
-        <p:nvSpPr>
-          <p:cNvPr id="125" name="Shape 125"/>
-          <p:cNvSpPr>
-            <a:spLocks noGrp="1"/>
-          </p:cNvSpPr>
-          <p:nvPr>
-            <p:ph type="body" sz="quarter" idx="1"/>
-          </p:nvPr>
-        </p:nvSpPr>
-        <p:spPr>
+          <a:xfrm>
+            <a:off x="952500" y="2971800"/>
+            <a:ext cx="5334000" cy="5892800"/>
+          </a:xfrm>
           <a:prstGeom prst="rect">
             <a:avLst/>
           </a:prstGeom>
         </p:spPr>
         <p:txBody>
           <a:bodyPr>
-            <a:normAutofit fontScale="92500" lnSpcReduction="10000"/>
+            <a:normAutofit fontScale="70000" lnSpcReduction="20000"/>
           </a:bodyPr>
           <a:lstStyle/>
           <a:p>
             <a:pPr algn="just"/>
             <a:r>
               <a:rPr lang="en-US" dirty="0"/>
-              <a:t>Every country or even the states within the country have some different national culture and ways of business thinking. Not understanding them might create issues </a:t>
+              <a:t>Understand and respect cultural </a:t>
             </a:r>
             <a:r>
               <a:rPr lang="en-US" dirty="0" smtClean="0"/>
-              <a:t>during the </a:t>
-            </a:r>
+              <a:t>differences</a:t>
+            </a:r>
+          </a:p>
+          <a:p>
+            <a:pPr algn="just"/>
+            <a:endParaRPr lang="en-US" dirty="0"/>
+          </a:p>
+          <a:p>
+            <a:pPr algn="just"/>
             <a:r>
               <a:rPr lang="en-US" dirty="0"/>
-              <a:t>projects. PMs should be encouraged to realize and respect these issues.</a:t>
+              <a:t>– Religion/Culture vs. professionalism (get help from HR) Prayer before </a:t>
+            </a:r>
+            <a:r>
+              <a:rPr lang="en-US" dirty="0" smtClean="0"/>
+              <a:t>sunset</a:t>
+            </a:r>
+          </a:p>
+          <a:p>
+            <a:pPr algn="just"/>
+            <a:endParaRPr lang="en-US" dirty="0"/>
+          </a:p>
+          <a:p>
+            <a:pPr algn="just"/>
+            <a:r>
+              <a:rPr lang="en-US" dirty="0"/>
+              <a:t>– People fasting (Ramadan). Not working on Sundays. Caste issue in India</a:t>
+            </a:r>
+            <a:r>
+              <a:rPr lang="en-US" dirty="0" smtClean="0"/>
+              <a:t>;</a:t>
+            </a:r>
+          </a:p>
+          <a:p>
+            <a:pPr algn="just"/>
+            <a:endParaRPr lang="en-US" dirty="0"/>
+          </a:p>
+          <a:p>
+            <a:pPr algn="just"/>
+            <a:r>
+              <a:rPr lang="en-US" dirty="0"/>
+              <a:t>– taught to respect elders. Eye contact may be interpreted as rude</a:t>
+            </a:r>
+            <a:r>
+              <a:rPr lang="en-US" dirty="0" smtClean="0"/>
+              <a:t>.</a:t>
+            </a:r>
+          </a:p>
+          <a:p>
+            <a:pPr algn="just"/>
+            <a:endParaRPr lang="en-US" dirty="0"/>
+          </a:p>
+          <a:p>
+            <a:pPr algn="just"/>
+            <a:r>
+              <a:rPr lang="en-US" dirty="0"/>
+              <a:t>– Siesta - a nap in the early afternoon (especially in hot countries</a:t>
+            </a:r>
+            <a:r>
+              <a:rPr lang="en-US" dirty="0" smtClean="0"/>
+              <a:t>)</a:t>
+            </a:r>
+          </a:p>
+          <a:p>
+            <a:pPr algn="just"/>
+            <a:endParaRPr lang="en-US" dirty="0"/>
+          </a:p>
+          <a:p>
+            <a:pPr algn="just"/>
+            <a:r>
+              <a:rPr lang="en-US" dirty="0"/>
+              <a:t>– Different ways of greeting people. Namaste, Bowing, Hand shake, kissing </a:t>
+            </a:r>
+            <a:r>
+              <a:rPr lang="en-US" dirty="0" smtClean="0"/>
+              <a:t>on cheek</a:t>
+            </a:r>
+            <a:r>
+              <a:rPr lang="en-US" dirty="0"/>
+              <a:t>, Rub noses, etc</a:t>
+            </a:r>
+            <a:r>
+              <a:rPr lang="en-US" dirty="0" smtClean="0"/>
+              <a:t>.</a:t>
             </a:r>
           </a:p>
           <a:p>
@@ -3604,260 +3605,7 @@
     </p:spTree>
     <p:extLst>
       <p:ext uri="{BB962C8B-B14F-4D97-AF65-F5344CB8AC3E}">
-        <p14:creationId xmlns:p14="http://schemas.microsoft.com/office/powerpoint/2010/main" val="1135872767"/>
-      </p:ext>
-    </p:extLst>
-  </p:cSld>
-  <p:clrMapOvr>
-    <a:masterClrMapping/>
-  </p:clrMapOvr>
-  <p:transition spd="slow"/>
-</p:sld>
-</file>
-
-<file path=ppt/slides/slide4.xml><?xml version="1.0" encoding="utf-8"?>
-<p:sld xmlns:a="http://schemas.openxmlformats.org/drawingml/2006/main" xmlns:r="http://schemas.openxmlformats.org/officeDocument/2006/relationships" xmlns:p="http://schemas.openxmlformats.org/presentationml/2006/main">
-  <p:cSld>
-    <p:spTree>
-      <p:nvGrpSpPr>
-        <p:cNvPr id="1" name=""/>
-        <p:cNvGrpSpPr/>
-        <p:nvPr/>
-      </p:nvGrpSpPr>
-      <p:grpSpPr>
-        <a:xfrm>
-          <a:off x="0" y="0"/>
-          <a:ext cx="0" cy="0"/>
-          <a:chOff x="0" y="0"/>
-          <a:chExt cx="0" cy="0"/>
-        </a:xfrm>
-      </p:grpSpPr>
-      <p:pic>
-        <p:nvPicPr>
-          <p:cNvPr id="123" name="110809_familychineseoahu_en_00317_2040x1360.jpeg"/>
-          <p:cNvPicPr>
-            <a:picLocks noGrp="1" noChangeAspect="1"/>
-          </p:cNvPicPr>
-          <p:nvPr>
-            <p:ph type="pic" idx="13"/>
-          </p:nvPr>
-        </p:nvPicPr>
-        <p:blipFill>
-          <a:blip r:embed="rId2">
-            <a:extLst/>
-          </a:blip>
-          <a:srcRect l="32374" r="24460" b="102"/>
-          <a:stretch>
-            <a:fillRect/>
-          </a:stretch>
-        </p:blipFill>
-        <p:spPr>
-          <a:prstGeom prst="rect">
-            <a:avLst/>
-          </a:prstGeom>
-        </p:spPr>
-      </p:pic>
-      <p:sp>
-        <p:nvSpPr>
-          <p:cNvPr id="124" name="Shape 124"/>
-          <p:cNvSpPr>
-            <a:spLocks noGrp="1"/>
-          </p:cNvSpPr>
-          <p:nvPr>
-            <p:ph type="title"/>
-          </p:nvPr>
-        </p:nvSpPr>
-        <p:spPr>
-          <a:prstGeom prst="rect">
-            <a:avLst/>
-          </a:prstGeom>
-        </p:spPr>
-        <p:txBody>
-          <a:bodyPr/>
-          <a:lstStyle/>
-          <a:p>
-            <a:r>
-              <a:rPr dirty="0"/>
-              <a:t>General Challenges</a:t>
-            </a:r>
-          </a:p>
-        </p:txBody>
-      </p:sp>
-      <p:sp>
-        <p:nvSpPr>
-          <p:cNvPr id="125" name="Shape 125"/>
-          <p:cNvSpPr>
-            <a:spLocks noGrp="1"/>
-          </p:cNvSpPr>
-          <p:nvPr>
-            <p:ph type="body" sz="quarter" idx="1"/>
-          </p:nvPr>
-        </p:nvSpPr>
-        <p:spPr>
-          <a:prstGeom prst="rect">
-            <a:avLst/>
-          </a:prstGeom>
-        </p:spPr>
-        <p:txBody>
-          <a:bodyPr>
-            <a:normAutofit/>
-          </a:bodyPr>
-          <a:lstStyle/>
-          <a:p>
-            <a:pPr algn="just"/>
-            <a:r>
-              <a:rPr lang="en-US" dirty="0"/>
-              <a:t>Not being careful with stereotypes, and peoples perspective. Every individuals have different ideas and ways of looking at life.</a:t>
-            </a:r>
-          </a:p>
-          <a:p>
-            <a:pPr algn="l"/>
-            <a:endParaRPr dirty="0"/>
-          </a:p>
-        </p:txBody>
-      </p:sp>
-    </p:spTree>
-    <p:extLst>
-      <p:ext uri="{BB962C8B-B14F-4D97-AF65-F5344CB8AC3E}">
-        <p14:creationId xmlns:p14="http://schemas.microsoft.com/office/powerpoint/2010/main" val="1518596562"/>
-      </p:ext>
-    </p:extLst>
-  </p:cSld>
-  <p:clrMapOvr>
-    <a:masterClrMapping/>
-  </p:clrMapOvr>
-  <p:transition spd="slow"/>
-</p:sld>
-</file>
-
-<file path=ppt/slides/slide5.xml><?xml version="1.0" encoding="utf-8"?>
-<p:sld xmlns:a="http://schemas.openxmlformats.org/drawingml/2006/main" xmlns:r="http://schemas.openxmlformats.org/officeDocument/2006/relationships" xmlns:p="http://schemas.openxmlformats.org/presentationml/2006/main">
-  <p:cSld>
-    <p:spTree>
-      <p:nvGrpSpPr>
-        <p:cNvPr id="1" name=""/>
-        <p:cNvGrpSpPr/>
-        <p:nvPr/>
-      </p:nvGrpSpPr>
-      <p:grpSpPr>
-        <a:xfrm>
-          <a:off x="0" y="0"/>
-          <a:ext cx="0" cy="0"/>
-          <a:chOff x="0" y="0"/>
-          <a:chExt cx="0" cy="0"/>
-        </a:xfrm>
-      </p:grpSpPr>
-      <p:pic>
-        <p:nvPicPr>
-          <p:cNvPr id="123" name="110809_familychineseoahu_en_00317_2040x1360.jpeg"/>
-          <p:cNvPicPr>
-            <a:picLocks noGrp="1" noChangeAspect="1"/>
-          </p:cNvPicPr>
-          <p:nvPr>
-            <p:ph type="pic" idx="13"/>
-          </p:nvPr>
-        </p:nvPicPr>
-        <p:blipFill>
-          <a:blip r:embed="rId2">
-            <a:extLst/>
-          </a:blip>
-          <a:srcRect l="32374" r="24460" b="102"/>
-          <a:stretch>
-            <a:fillRect/>
-          </a:stretch>
-        </p:blipFill>
-        <p:spPr>
-          <a:prstGeom prst="rect">
-            <a:avLst/>
-          </a:prstGeom>
-        </p:spPr>
-      </p:pic>
-      <p:sp>
-        <p:nvSpPr>
-          <p:cNvPr id="124" name="Shape 124"/>
-          <p:cNvSpPr>
-            <a:spLocks noGrp="1"/>
-          </p:cNvSpPr>
-          <p:nvPr>
-            <p:ph type="title"/>
-          </p:nvPr>
-        </p:nvSpPr>
-        <p:spPr>
-          <a:prstGeom prst="rect">
-            <a:avLst/>
-          </a:prstGeom>
-        </p:spPr>
-        <p:txBody>
-          <a:bodyPr/>
-          <a:lstStyle/>
-          <a:p>
-            <a:r>
-              <a:rPr dirty="0"/>
-              <a:t>General Challenges</a:t>
-            </a:r>
-          </a:p>
-        </p:txBody>
-      </p:sp>
-      <p:sp>
-        <p:nvSpPr>
-          <p:cNvPr id="125" name="Shape 125"/>
-          <p:cNvSpPr>
-            <a:spLocks noGrp="1"/>
-          </p:cNvSpPr>
-          <p:nvPr>
-            <p:ph type="body" sz="quarter" idx="1"/>
-          </p:nvPr>
-        </p:nvSpPr>
-        <p:spPr>
-          <a:prstGeom prst="rect">
-            <a:avLst/>
-          </a:prstGeom>
-        </p:spPr>
-        <p:txBody>
-          <a:bodyPr>
-            <a:normAutofit fontScale="85000" lnSpcReduction="20000"/>
-          </a:bodyPr>
-          <a:lstStyle/>
-          <a:p>
-            <a:pPr algn="just"/>
-            <a:r>
-              <a:rPr lang="en-US" dirty="0"/>
-              <a:t>Language barrier. This is one of the primary reason behind miscommunication and misunderstanding in teams</a:t>
-            </a:r>
-            <a:r>
-              <a:rPr lang="en-US" dirty="0" smtClean="0"/>
-              <a:t>.</a:t>
-            </a:r>
-          </a:p>
-          <a:p>
-            <a:pPr algn="just"/>
-            <a:endParaRPr lang="en-US" dirty="0"/>
-          </a:p>
-          <a:p>
-            <a:pPr algn="just"/>
-            <a:r>
-              <a:rPr lang="en-US" dirty="0"/>
-              <a:t>Some languages might sound rude, some might sound polite while speaking. By looking at others' voice and tone people might get offended while the person speaking is not </a:t>
-            </a:r>
-            <a:r>
-              <a:rPr lang="en-US" dirty="0" smtClean="0"/>
-              <a:t>actually meaning </a:t>
-            </a:r>
-            <a:r>
-              <a:rPr lang="en-US" dirty="0"/>
-              <a:t>any offense.</a:t>
-            </a:r>
-          </a:p>
-          <a:p>
-            <a:pPr algn="l"/>
-            <a:endParaRPr dirty="0"/>
-          </a:p>
-        </p:txBody>
-      </p:sp>
-    </p:spTree>
-    <p:extLst>
-      <p:ext uri="{BB962C8B-B14F-4D97-AF65-F5344CB8AC3E}">
-        <p14:creationId xmlns:p14="http://schemas.microsoft.com/office/powerpoint/2010/main" val="1119995063"/>
+        <p14:creationId xmlns:p14="http://schemas.microsoft.com/office/powerpoint/2010/main" val="1210344363"/>
       </p:ext>
     </p:extLst>
   </p:cSld>
@@ -3875,7 +3623,7 @@
 </p:sld>
 </file>
 
-<file path=ppt/slides/slide6.xml><?xml version="1.0" encoding="utf-8"?>
+<file path=ppt/slides/slide12.xml><?xml version="1.0" encoding="utf-8"?>
 <p:sld xmlns:a="http://schemas.openxmlformats.org/drawingml/2006/main" xmlns:r="http://schemas.openxmlformats.org/officeDocument/2006/relationships" xmlns:p="http://schemas.openxmlformats.org/presentationml/2006/main">
   <p:cSld>
     <p:spTree>
@@ -4457,7 +4205,7 @@
 </p:sld>
 </file>
 
-<file path=ppt/slides/slide7.xml><?xml version="1.0" encoding="utf-8"?>
+<file path=ppt/slides/slide13.xml><?xml version="1.0" encoding="utf-8"?>
 <p:sld xmlns:a="http://schemas.openxmlformats.org/drawingml/2006/main" xmlns:r="http://schemas.openxmlformats.org/officeDocument/2006/relationships" xmlns:p="http://schemas.openxmlformats.org/presentationml/2006/main">
   <p:cSld>
     <p:spTree>
@@ -4591,7 +4339,6 @@
               <a:rPr lang="en-US" sz="2000" dirty="0"/>
               <a:t>Language Barriers</a:t>
             </a:r>
-            <a:endParaRPr lang="en-US" sz="2000" dirty="0"/>
           </a:p>
         </p:txBody>
       </p:sp>
@@ -5419,7 +5166,7 @@
 </p:sld>
 </file>
 
-<file path=ppt/slides/slide8.xml><?xml version="1.0" encoding="utf-8"?>
+<file path=ppt/slides/slide14.xml><?xml version="1.0" encoding="utf-8"?>
 <p:sld xmlns:a="http://schemas.openxmlformats.org/drawingml/2006/main" xmlns:r="http://schemas.openxmlformats.org/officeDocument/2006/relationships" xmlns:p="http://schemas.openxmlformats.org/presentationml/2006/main">
   <p:cSld>
     <p:spTree>
@@ -6130,7 +5877,7 @@
 </p:sld>
 </file>
 
-<file path=ppt/slides/slide9.xml><?xml version="1.0" encoding="utf-8"?>
+<file path=ppt/slides/slide15.xml><?xml version="1.0" encoding="utf-8"?>
 <p:sld xmlns:a="http://schemas.openxmlformats.org/drawingml/2006/main" xmlns:r="http://schemas.openxmlformats.org/officeDocument/2006/relationships" xmlns:p="http://schemas.openxmlformats.org/presentationml/2006/main">
   <p:cSld>
     <p:spTree>
@@ -6200,7 +5947,7 @@
           </a:ln>
           <a:extLst>
             <a:ext uri="{C572A759-6A51-4108-AA02-DFA0A04FC94B}">
-              <ma14:wrappingTextBoxFlag xmlns="" xmlns:ma14="http://schemas.microsoft.com/office/mac/drawingml/2011/main" val="1"/>
+              <ma14:wrappingTextBoxFlag xmlns:ma14="http://schemas.microsoft.com/office/mac/drawingml/2011/main" xmlns="" val="1"/>
             </a:ext>
           </a:extLst>
         </p:spPr>
@@ -6502,7 +6249,7 @@
           </a:ln>
           <a:extLst>
             <a:ext uri="{C572A759-6A51-4108-AA02-DFA0A04FC94B}">
-              <ma14:wrappingTextBoxFlag xmlns="" xmlns:ma14="http://schemas.microsoft.com/office/mac/drawingml/2011/main" val="1"/>
+              <ma14:wrappingTextBoxFlag xmlns:ma14="http://schemas.microsoft.com/office/mac/drawingml/2011/main" xmlns="" val="1"/>
             </a:ext>
           </a:extLst>
         </p:spPr>
@@ -6804,7 +6551,7 @@
           </a:ln>
           <a:extLst>
             <a:ext uri="{C572A759-6A51-4108-AA02-DFA0A04FC94B}">
-              <ma14:wrappingTextBoxFlag xmlns="" xmlns:ma14="http://schemas.microsoft.com/office/mac/drawingml/2011/main" val="1"/>
+              <ma14:wrappingTextBoxFlag xmlns:ma14="http://schemas.microsoft.com/office/mac/drawingml/2011/main" xmlns="" val="1"/>
             </a:ext>
           </a:extLst>
         </p:spPr>
@@ -7106,7 +6853,7 @@
           </a:ln>
           <a:extLst>
             <a:ext uri="{C572A759-6A51-4108-AA02-DFA0A04FC94B}">
-              <ma14:wrappingTextBoxFlag xmlns="" xmlns:ma14="http://schemas.microsoft.com/office/mac/drawingml/2011/main" val="1"/>
+              <ma14:wrappingTextBoxFlag xmlns:ma14="http://schemas.microsoft.com/office/mac/drawingml/2011/main" xmlns="" val="1"/>
             </a:ext>
           </a:extLst>
         </p:spPr>
@@ -7872,6 +7619,1536 @@
 </p:sld>
 </file>
 
+<file path=ppt/slides/slide16.xml><?xml version="1.0" encoding="utf-8"?>
+<p:sld xmlns:a="http://schemas.openxmlformats.org/drawingml/2006/main" xmlns:r="http://schemas.openxmlformats.org/officeDocument/2006/relationships" xmlns:p="http://schemas.openxmlformats.org/presentationml/2006/main">
+  <p:cSld>
+    <p:spTree>
+      <p:nvGrpSpPr>
+        <p:cNvPr id="1" name=""/>
+        <p:cNvGrpSpPr/>
+        <p:nvPr/>
+      </p:nvGrpSpPr>
+      <p:grpSpPr>
+        <a:xfrm>
+          <a:off x="0" y="0"/>
+          <a:ext cx="0" cy="0"/>
+          <a:chOff x="0" y="0"/>
+          <a:chExt cx="0" cy="0"/>
+        </a:xfrm>
+      </p:grpSpPr>
+      <p:pic>
+        <p:nvPicPr>
+          <p:cNvPr id="131" name="110809_familychineseoahu_en_00317_2040x1360.jpeg"/>
+          <p:cNvPicPr>
+            <a:picLocks noGrp="1" noChangeAspect="1"/>
+          </p:cNvPicPr>
+          <p:nvPr>
+            <p:ph type="pic" idx="13"/>
+          </p:nvPr>
+        </p:nvPicPr>
+        <p:blipFill>
+          <a:blip r:embed="rId2">
+            <a:extLst/>
+          </a:blip>
+          <a:srcRect l="32374" r="24460" b="102"/>
+          <a:stretch>
+            <a:fillRect/>
+          </a:stretch>
+        </p:blipFill>
+        <p:spPr>
+          <a:prstGeom prst="rect">
+            <a:avLst/>
+          </a:prstGeom>
+        </p:spPr>
+      </p:pic>
+      <p:sp>
+        <p:nvSpPr>
+          <p:cNvPr id="132" name="Shape 132"/>
+          <p:cNvSpPr>
+            <a:spLocks noGrp="1"/>
+          </p:cNvSpPr>
+          <p:nvPr>
+            <p:ph type="title"/>
+          </p:nvPr>
+        </p:nvSpPr>
+        <p:spPr>
+          <a:prstGeom prst="rect">
+            <a:avLst/>
+          </a:prstGeom>
+        </p:spPr>
+        <p:txBody>
+          <a:bodyPr/>
+          <a:lstStyle/>
+          <a:p>
+            <a:r>
+              <a:t>Onsite </a:t>
+            </a:r>
+          </a:p>
+        </p:txBody>
+      </p:sp>
+      <p:sp>
+        <p:nvSpPr>
+          <p:cNvPr id="133" name="Shape 133"/>
+          <p:cNvSpPr>
+            <a:spLocks noGrp="1"/>
+          </p:cNvSpPr>
+          <p:nvPr>
+            <p:ph type="body" sz="quarter" idx="1"/>
+          </p:nvPr>
+        </p:nvSpPr>
+        <p:spPr>
+          <a:prstGeom prst="rect">
+            <a:avLst/>
+          </a:prstGeom>
+        </p:spPr>
+        <p:txBody>
+          <a:bodyPr/>
+          <a:lstStyle/>
+          <a:p>
+            <a:pPr algn="l"/>
+            <a:endParaRPr/>
+          </a:p>
+        </p:txBody>
+      </p:sp>
+    </p:spTree>
+  </p:cSld>
+  <p:clrMapOvr>
+    <a:masterClrMapping/>
+  </p:clrMapOvr>
+  <p:transition spd="slow"/>
+  <p:timing>
+    <p:tnLst>
+      <p:par>
+        <p:cTn id="1" dur="indefinite" restart="never" nodeType="tmRoot"/>
+      </p:par>
+    </p:tnLst>
+  </p:timing>
+</p:sld>
+</file>
+
+<file path=ppt/slides/slide17.xml><?xml version="1.0" encoding="utf-8"?>
+<p:sld xmlns:a="http://schemas.openxmlformats.org/drawingml/2006/main" xmlns:r="http://schemas.openxmlformats.org/officeDocument/2006/relationships" xmlns:p="http://schemas.openxmlformats.org/presentationml/2006/main">
+  <p:cSld>
+    <p:spTree>
+      <p:nvGrpSpPr>
+        <p:cNvPr id="1" name=""/>
+        <p:cNvGrpSpPr/>
+        <p:nvPr/>
+      </p:nvGrpSpPr>
+      <p:grpSpPr>
+        <a:xfrm>
+          <a:off x="0" y="0"/>
+          <a:ext cx="0" cy="0"/>
+          <a:chOff x="0" y="0"/>
+          <a:chExt cx="0" cy="0"/>
+        </a:xfrm>
+      </p:grpSpPr>
+      <p:sp>
+        <p:nvSpPr>
+          <p:cNvPr id="135" name="Shape 135"/>
+          <p:cNvSpPr>
+            <a:spLocks noGrp="1"/>
+          </p:cNvSpPr>
+          <p:nvPr>
+            <p:ph type="title"/>
+          </p:nvPr>
+        </p:nvSpPr>
+        <p:spPr>
+          <a:prstGeom prst="rect">
+            <a:avLst/>
+          </a:prstGeom>
+        </p:spPr>
+        <p:txBody>
+          <a:bodyPr/>
+          <a:lstStyle/>
+          <a:p>
+            <a:r>
+              <a:t>Drawbacks</a:t>
+            </a:r>
+          </a:p>
+        </p:txBody>
+      </p:sp>
+      <p:sp>
+        <p:nvSpPr>
+          <p:cNvPr id="136" name="Shape 136"/>
+          <p:cNvSpPr>
+            <a:spLocks noGrp="1"/>
+          </p:cNvSpPr>
+          <p:nvPr>
+            <p:ph type="body" idx="1"/>
+          </p:nvPr>
+        </p:nvSpPr>
+        <p:spPr>
+          <a:prstGeom prst="rect">
+            <a:avLst/>
+          </a:prstGeom>
+        </p:spPr>
+        <p:txBody>
+          <a:bodyPr/>
+          <a:lstStyle/>
+          <a:p>
+            <a:endParaRPr/>
+          </a:p>
+        </p:txBody>
+      </p:sp>
+    </p:spTree>
+  </p:cSld>
+  <p:clrMapOvr>
+    <a:masterClrMapping/>
+  </p:clrMapOvr>
+  <p:transition spd="slow"/>
+  <p:timing>
+    <p:tnLst>
+      <p:par>
+        <p:cTn id="1" dur="indefinite" restart="never" nodeType="tmRoot"/>
+      </p:par>
+    </p:tnLst>
+  </p:timing>
+</p:sld>
+</file>
+
+<file path=ppt/slides/slide2.xml><?xml version="1.0" encoding="utf-8"?>
+<p:sld xmlns:a="http://schemas.openxmlformats.org/drawingml/2006/main" xmlns:r="http://schemas.openxmlformats.org/officeDocument/2006/relationships" xmlns:p="http://schemas.openxmlformats.org/presentationml/2006/main">
+  <p:cSld>
+    <p:spTree>
+      <p:nvGrpSpPr>
+        <p:cNvPr id="1" name=""/>
+        <p:cNvGrpSpPr/>
+        <p:nvPr/>
+      </p:nvGrpSpPr>
+      <p:grpSpPr>
+        <a:xfrm>
+          <a:off x="0" y="0"/>
+          <a:ext cx="0" cy="0"/>
+          <a:chOff x="0" y="0"/>
+          <a:chExt cx="0" cy="0"/>
+        </a:xfrm>
+      </p:grpSpPr>
+      <p:sp>
+        <p:nvSpPr>
+          <p:cNvPr id="119" name="Shape 119"/>
+          <p:cNvSpPr>
+            <a:spLocks noGrp="1"/>
+          </p:cNvSpPr>
+          <p:nvPr>
+            <p:ph type="ctrTitle"/>
+          </p:nvPr>
+        </p:nvSpPr>
+        <p:spPr>
+          <a:xfrm>
+            <a:off x="1244600" y="838200"/>
+            <a:ext cx="10464800" cy="1206500"/>
+          </a:xfrm>
+          <a:prstGeom prst="rect">
+            <a:avLst/>
+          </a:prstGeom>
+        </p:spPr>
+        <p:txBody>
+          <a:bodyPr>
+            <a:normAutofit/>
+          </a:bodyPr>
+          <a:lstStyle>
+            <a:lvl1pPr defTabSz="514095">
+              <a:defRPr sz="7040"/>
+            </a:lvl1pPr>
+          </a:lstStyle>
+          <a:p>
+            <a:r>
+              <a:rPr lang="en-US" dirty="0" smtClean="0"/>
+              <a:t>Agenda</a:t>
+            </a:r>
+            <a:endParaRPr dirty="0"/>
+          </a:p>
+        </p:txBody>
+      </p:sp>
+      <p:sp>
+        <p:nvSpPr>
+          <p:cNvPr id="5" name="TextBox 4"/>
+          <p:cNvSpPr txBox="1"/>
+          <p:nvPr/>
+        </p:nvSpPr>
+        <p:spPr>
+          <a:xfrm>
+            <a:off x="3149600" y="3191881"/>
+            <a:ext cx="7696200" cy="2318583"/>
+          </a:xfrm>
+          <a:prstGeom prst="rect">
+            <a:avLst/>
+          </a:prstGeom>
+          <a:noFill/>
+          <a:ln w="12700" cap="flat">
+            <a:noFill/>
+            <a:miter lim="400000"/>
+          </a:ln>
+          <a:effectLst/>
+          <a:sp3d/>
+        </p:spPr>
+        <p:style>
+          <a:lnRef idx="0">
+            <a:scrgbClr r="0" g="0" b="0"/>
+          </a:lnRef>
+          <a:fillRef idx="0">
+            <a:scrgbClr r="0" g="0" b="0"/>
+          </a:fillRef>
+          <a:effectRef idx="0">
+            <a:scrgbClr r="0" g="0" b="0"/>
+          </a:effectRef>
+          <a:fontRef idx="none"/>
+        </p:style>
+        <p:txBody>
+          <a:bodyPr rot="0" spcFirstLastPara="1" vertOverflow="overflow" horzOverflow="overflow" vert="horz" wrap="square" lIns="50800" tIns="50800" rIns="50800" bIns="50800" numCol="1" spcCol="38100" rtlCol="0" anchor="ctr">
+            <a:spAutoFit/>
+          </a:bodyPr>
+          <a:lstStyle/>
+          <a:p>
+            <a:pPr marL="571500" marR="0" indent="-571500" algn="l" defTabSz="584200" rtl="0" fontAlgn="auto" latinLnBrk="0" hangingPunct="0">
+              <a:lnSpc>
+                <a:spcPct val="100000"/>
+              </a:lnSpc>
+              <a:spcBef>
+                <a:spcPts val="0"/>
+              </a:spcBef>
+              <a:spcAft>
+                <a:spcPts val="0"/>
+              </a:spcAft>
+              <a:buClrTx/>
+              <a:buSzTx/>
+              <a:buFont typeface="Arial" pitchFamily="34" charset="0"/>
+              <a:buChar char="•"/>
+              <a:tabLst/>
+            </a:pPr>
+            <a:r>
+              <a:rPr kumimoji="0" lang="en-US" sz="3600" b="0" i="0" u="none" strike="noStrike" cap="none" spc="0" normalizeH="0" baseline="0" dirty="0" smtClean="0">
+                <a:ln>
+                  <a:noFill/>
+                </a:ln>
+                <a:solidFill>
+                  <a:srgbClr val="000000"/>
+                </a:solidFill>
+                <a:effectLst/>
+                <a:uFillTx/>
+                <a:latin typeface="+mn-lt"/>
+                <a:ea typeface="+mn-ea"/>
+                <a:cs typeface="+mn-cs"/>
+                <a:sym typeface="Helvetica Light"/>
+              </a:rPr>
+              <a:t>Challenges in general</a:t>
+            </a:r>
+          </a:p>
+          <a:p>
+            <a:pPr marL="571500" marR="0" indent="-571500" algn="l" defTabSz="584200" rtl="0" fontAlgn="auto" latinLnBrk="0" hangingPunct="0">
+              <a:lnSpc>
+                <a:spcPct val="100000"/>
+              </a:lnSpc>
+              <a:spcBef>
+                <a:spcPts val="0"/>
+              </a:spcBef>
+              <a:spcAft>
+                <a:spcPts val="0"/>
+              </a:spcAft>
+              <a:buClrTx/>
+              <a:buSzTx/>
+              <a:buFont typeface="Arial" pitchFamily="34" charset="0"/>
+              <a:buChar char="•"/>
+              <a:tabLst/>
+            </a:pPr>
+            <a:r>
+              <a:rPr lang="en-US" dirty="0" smtClean="0"/>
+              <a:t>Challenges in virtual PM</a:t>
+            </a:r>
+          </a:p>
+          <a:p>
+            <a:pPr marL="571500" marR="0" indent="-571500" algn="l" defTabSz="584200" rtl="0" fontAlgn="auto" latinLnBrk="0" hangingPunct="0">
+              <a:lnSpc>
+                <a:spcPct val="100000"/>
+              </a:lnSpc>
+              <a:spcBef>
+                <a:spcPts val="0"/>
+              </a:spcBef>
+              <a:spcAft>
+                <a:spcPts val="0"/>
+              </a:spcAft>
+              <a:buClrTx/>
+              <a:buSzTx/>
+              <a:buFont typeface="Arial" pitchFamily="34" charset="0"/>
+              <a:buChar char="•"/>
+              <a:tabLst/>
+            </a:pPr>
+            <a:r>
+              <a:rPr kumimoji="0" lang="en-US" sz="3600" b="0" i="0" u="none" strike="noStrike" cap="none" spc="0" normalizeH="0" baseline="0" dirty="0" smtClean="0">
+                <a:ln>
+                  <a:noFill/>
+                </a:ln>
+                <a:solidFill>
+                  <a:srgbClr val="000000"/>
+                </a:solidFill>
+                <a:effectLst/>
+                <a:uFillTx/>
+                <a:latin typeface="+mn-lt"/>
+                <a:ea typeface="+mn-ea"/>
+                <a:cs typeface="+mn-cs"/>
+                <a:sym typeface="Helvetica Light"/>
+              </a:rPr>
+              <a:t>Challenges in on site PM</a:t>
+            </a:r>
+          </a:p>
+          <a:p>
+            <a:pPr marL="571500" marR="0" indent="-571500" algn="l" defTabSz="584200" rtl="0" fontAlgn="auto" latinLnBrk="0" hangingPunct="0">
+              <a:lnSpc>
+                <a:spcPct val="100000"/>
+              </a:lnSpc>
+              <a:spcBef>
+                <a:spcPts val="0"/>
+              </a:spcBef>
+              <a:spcAft>
+                <a:spcPts val="0"/>
+              </a:spcAft>
+              <a:buClrTx/>
+              <a:buSzTx/>
+              <a:buFont typeface="Arial" pitchFamily="34" charset="0"/>
+              <a:buChar char="•"/>
+              <a:tabLst/>
+            </a:pPr>
+            <a:r>
+              <a:rPr lang="en-US" dirty="0" smtClean="0"/>
+              <a:t>QA</a:t>
+            </a:r>
+            <a:endParaRPr kumimoji="0" lang="en-US" sz="3600" b="0" i="0" u="none" strike="noStrike" cap="none" spc="0" normalizeH="0" baseline="0" dirty="0">
+              <a:ln>
+                <a:noFill/>
+              </a:ln>
+              <a:solidFill>
+                <a:srgbClr val="000000"/>
+              </a:solidFill>
+              <a:effectLst/>
+              <a:uFillTx/>
+              <a:latin typeface="+mn-lt"/>
+              <a:ea typeface="+mn-ea"/>
+              <a:cs typeface="+mn-cs"/>
+              <a:sym typeface="Helvetica Light"/>
+            </a:endParaRPr>
+          </a:p>
+        </p:txBody>
+      </p:sp>
+    </p:spTree>
+    <p:extLst>
+      <p:ext uri="{BB962C8B-B14F-4D97-AF65-F5344CB8AC3E}">
+        <p14:creationId xmlns:p14="http://schemas.microsoft.com/office/powerpoint/2010/main" val="828240650"/>
+      </p:ext>
+    </p:extLst>
+  </p:cSld>
+  <p:clrMapOvr>
+    <a:masterClrMapping/>
+  </p:clrMapOvr>
+  <p:transition spd="med"/>
+</p:sld>
+</file>
+
+<file path=ppt/slides/slide3.xml><?xml version="1.0" encoding="utf-8"?>
+<p:sld xmlns:a="http://schemas.openxmlformats.org/drawingml/2006/main" xmlns:r="http://schemas.openxmlformats.org/officeDocument/2006/relationships" xmlns:p="http://schemas.openxmlformats.org/presentationml/2006/main">
+  <p:cSld>
+    <p:spTree>
+      <p:nvGrpSpPr>
+        <p:cNvPr id="1" name=""/>
+        <p:cNvGrpSpPr/>
+        <p:nvPr/>
+      </p:nvGrpSpPr>
+      <p:grpSpPr>
+        <a:xfrm>
+          <a:off x="0" y="0"/>
+          <a:ext cx="0" cy="0"/>
+          <a:chOff x="0" y="0"/>
+          <a:chExt cx="0" cy="0"/>
+        </a:xfrm>
+      </p:grpSpPr>
+      <p:sp>
+        <p:nvSpPr>
+          <p:cNvPr id="119" name="Shape 119"/>
+          <p:cNvSpPr>
+            <a:spLocks noGrp="1"/>
+          </p:cNvSpPr>
+          <p:nvPr>
+            <p:ph type="ctrTitle"/>
+          </p:nvPr>
+        </p:nvSpPr>
+        <p:spPr>
+          <a:xfrm>
+            <a:off x="1473200" y="-304800"/>
+            <a:ext cx="10464800" cy="1587500"/>
+          </a:xfrm>
+          <a:prstGeom prst="rect">
+            <a:avLst/>
+          </a:prstGeom>
+        </p:spPr>
+        <p:txBody>
+          <a:bodyPr>
+            <a:normAutofit/>
+          </a:bodyPr>
+          <a:lstStyle>
+            <a:lvl1pPr defTabSz="514095">
+              <a:defRPr sz="7040"/>
+            </a:lvl1pPr>
+          </a:lstStyle>
+          <a:p>
+            <a:r>
+              <a:rPr lang="en-US" dirty="0"/>
+              <a:t>I</a:t>
+            </a:r>
+            <a:r>
+              <a:rPr lang="en-US" dirty="0" smtClean="0"/>
+              <a:t>ntroduction</a:t>
+            </a:r>
+            <a:endParaRPr dirty="0"/>
+          </a:p>
+        </p:txBody>
+      </p:sp>
+      <p:sp>
+        <p:nvSpPr>
+          <p:cNvPr id="121" name="Shape 121"/>
+          <p:cNvSpPr/>
+          <p:nvPr/>
+        </p:nvSpPr>
+        <p:spPr>
+          <a:xfrm>
+            <a:off x="1384300" y="6134100"/>
+            <a:ext cx="10464800" cy="1130300"/>
+          </a:xfrm>
+          <a:prstGeom prst="rect">
+            <a:avLst/>
+          </a:prstGeom>
+          <a:ln w="12700">
+            <a:miter lim="400000"/>
+          </a:ln>
+          <a:extLst>
+            <a:ext uri="{C572A759-6A51-4108-AA02-DFA0A04FC94B}">
+              <ma14:wrappingTextBoxFlag xmlns:ma14="http://schemas.microsoft.com/office/mac/drawingml/2011/main" xmlns="" val="1"/>
+            </a:ext>
+          </a:extLst>
+        </p:spPr>
+        <p:txBody>
+          <a:bodyPr lIns="50800" tIns="50800" rIns="50800" bIns="50800">
+            <a:normAutofit/>
+          </a:bodyPr>
+          <a:lstStyle>
+            <a:lvl1pPr>
+              <a:defRPr sz="3200"/>
+            </a:lvl1pPr>
+          </a:lstStyle>
+          <a:p>
+            <a:endParaRPr dirty="0"/>
+          </a:p>
+        </p:txBody>
+      </p:sp>
+      <p:pic>
+        <p:nvPicPr>
+          <p:cNvPr id="2" name="Picture 1"/>
+          <p:cNvPicPr>
+            <a:picLocks noChangeAspect="1"/>
+          </p:cNvPicPr>
+          <p:nvPr/>
+        </p:nvPicPr>
+        <p:blipFill>
+          <a:blip r:embed="rId2">
+            <a:extLst>
+              <a:ext uri="{28A0092B-C50C-407E-A947-70E740481C1C}">
+                <a14:useLocalDpi xmlns:a14="http://schemas.microsoft.com/office/drawing/2010/main" val="0"/>
+              </a:ext>
+            </a:extLst>
+          </a:blip>
+          <a:stretch>
+            <a:fillRect/>
+          </a:stretch>
+        </p:blipFill>
+        <p:spPr>
+          <a:xfrm>
+            <a:off x="558800" y="2209800"/>
+            <a:ext cx="11811000" cy="6477000"/>
+          </a:xfrm>
+          <a:prstGeom prst="rect">
+            <a:avLst/>
+          </a:prstGeom>
+        </p:spPr>
+      </p:pic>
+    </p:spTree>
+    <p:extLst>
+      <p:ext uri="{BB962C8B-B14F-4D97-AF65-F5344CB8AC3E}">
+        <p14:creationId xmlns:p14="http://schemas.microsoft.com/office/powerpoint/2010/main" val="1227890937"/>
+      </p:ext>
+    </p:extLst>
+  </p:cSld>
+  <p:clrMapOvr>
+    <a:masterClrMapping/>
+  </p:clrMapOvr>
+  <p:transition spd="med"/>
+</p:sld>
+</file>
+
+<file path=ppt/slides/slide4.xml><?xml version="1.0" encoding="utf-8"?>
+<p:sld xmlns:a="http://schemas.openxmlformats.org/drawingml/2006/main" xmlns:r="http://schemas.openxmlformats.org/officeDocument/2006/relationships" xmlns:p="http://schemas.openxmlformats.org/presentationml/2006/main">
+  <p:cSld>
+    <p:spTree>
+      <p:nvGrpSpPr>
+        <p:cNvPr id="1" name=""/>
+        <p:cNvGrpSpPr/>
+        <p:nvPr/>
+      </p:nvGrpSpPr>
+      <p:grpSpPr>
+        <a:xfrm>
+          <a:off x="0" y="0"/>
+          <a:ext cx="0" cy="0"/>
+          <a:chOff x="0" y="0"/>
+          <a:chExt cx="0" cy="0"/>
+        </a:xfrm>
+      </p:grpSpPr>
+      <p:sp>
+        <p:nvSpPr>
+          <p:cNvPr id="124" name="Shape 124"/>
+          <p:cNvSpPr>
+            <a:spLocks noGrp="1"/>
+          </p:cNvSpPr>
+          <p:nvPr>
+            <p:ph type="title"/>
+          </p:nvPr>
+        </p:nvSpPr>
+        <p:spPr>
+          <a:xfrm>
+            <a:off x="939800" y="685800"/>
+            <a:ext cx="5334000" cy="8280400"/>
+          </a:xfrm>
+          <a:prstGeom prst="rect">
+            <a:avLst/>
+          </a:prstGeom>
+        </p:spPr>
+        <p:txBody>
+          <a:bodyPr>
+            <a:noAutofit/>
+          </a:bodyPr>
+          <a:lstStyle/>
+          <a:p>
+            <a:pPr algn="just"/>
+            <a:r>
+              <a:rPr lang="en-US" sz="2100" dirty="0" smtClean="0"/>
+              <a:t/>
+            </a:r>
+            <a:br>
+              <a:rPr lang="en-US" sz="2100" dirty="0" smtClean="0"/>
+            </a:br>
+            <a:r>
+              <a:rPr lang="en-US" sz="2100" dirty="0"/>
+              <a:t/>
+            </a:r>
+            <a:br>
+              <a:rPr lang="en-US" sz="2100" dirty="0"/>
+            </a:br>
+            <a:r>
+              <a:rPr lang="en-US" sz="2100" dirty="0" smtClean="0"/>
+              <a:t/>
+            </a:r>
+            <a:br>
+              <a:rPr lang="en-US" sz="2100" dirty="0" smtClean="0"/>
+            </a:br>
+            <a:r>
+              <a:rPr lang="en-US" sz="2100" dirty="0"/>
+              <a:t/>
+            </a:r>
+            <a:br>
+              <a:rPr lang="en-US" sz="2100" dirty="0"/>
+            </a:br>
+            <a:r>
+              <a:rPr lang="en-US" sz="2100" dirty="0" smtClean="0"/>
+              <a:t>…</a:t>
+            </a:r>
+            <a:r>
+              <a:rPr lang="en-US" sz="2100" dirty="0"/>
+              <a:t>whence came all these people? They are a mixture of English, Scotch, Irish, French, Dutch, Germans, and Swedes... What, then, is the American, this new man? He is either an European or the descendant of an European; hence that strange mixture of blood, which you will find in no other country. </a:t>
+            </a:r>
+            <a:r>
+              <a:rPr lang="en-US" sz="2100" b="1" dirty="0"/>
+              <a:t>I could point out to you a family whose grandfather was an Englishman, whose wife was Dutch, whose son married a French woman, and whose present four sons have now four wives of different nations.</a:t>
+            </a:r>
+            <a:r>
+              <a:rPr lang="en-US" sz="2100" dirty="0"/>
+              <a:t> He is an American, who, leaving behind him all his ancient prejudices and manners, receives new ones from the new mode of life he has embraced, the new government he obeys, and the new rank he holds. . . . The Americans were once scattered all over Europe; here they are incorporated into one of the finest systems of population which has ever appeared.</a:t>
+            </a:r>
+            <a:br>
+              <a:rPr lang="en-US" sz="2100" dirty="0"/>
+            </a:br>
+            <a:r>
+              <a:rPr lang="en-US" sz="2100" i="1" dirty="0"/>
+              <a:t>— J. Hector St. John de Crevecoeur, Letters from an American Farmer</a:t>
+            </a:r>
+            <a:r>
+              <a:rPr lang="en-US" sz="2100" dirty="0"/>
+              <a:t/>
+            </a:r>
+            <a:br>
+              <a:rPr lang="en-US" sz="2100" dirty="0"/>
+            </a:br>
+            <a:endParaRPr sz="2100" dirty="0"/>
+          </a:p>
+        </p:txBody>
+      </p:sp>
+      <p:pic>
+        <p:nvPicPr>
+          <p:cNvPr id="4" name="Picture Placeholder 3"/>
+          <p:cNvPicPr>
+            <a:picLocks noGrp="1" noChangeAspect="1"/>
+          </p:cNvPicPr>
+          <p:nvPr>
+            <p:ph type="pic" sz="half" idx="13"/>
+          </p:nvPr>
+        </p:nvPicPr>
+        <p:blipFill>
+          <a:blip r:embed="rId2">
+            <a:extLst>
+              <a:ext uri="{28A0092B-C50C-407E-A947-70E740481C1C}">
+                <a14:useLocalDpi xmlns:a14="http://schemas.microsoft.com/office/drawing/2010/main" val="0"/>
+              </a:ext>
+            </a:extLst>
+          </a:blip>
+          <a:srcRect l="5318" r="5318"/>
+          <a:stretch>
+            <a:fillRect/>
+          </a:stretch>
+        </p:blipFill>
+        <p:spPr>
+          <a:xfrm>
+            <a:off x="6807200" y="762000"/>
+            <a:ext cx="5334000" cy="8229600"/>
+          </a:xfrm>
+        </p:spPr>
+      </p:pic>
+    </p:spTree>
+  </p:cSld>
+  <p:clrMapOvr>
+    <a:masterClrMapping/>
+  </p:clrMapOvr>
+  <p:transition spd="slow"/>
+</p:sld>
+</file>
+
+<file path=ppt/slides/slide5.xml><?xml version="1.0" encoding="utf-8"?>
+<p:sld xmlns:a="http://schemas.openxmlformats.org/drawingml/2006/main" xmlns:r="http://schemas.openxmlformats.org/officeDocument/2006/relationships" xmlns:p="http://schemas.openxmlformats.org/presentationml/2006/main">
+  <p:cSld>
+    <p:spTree>
+      <p:nvGrpSpPr>
+        <p:cNvPr id="1" name=""/>
+        <p:cNvGrpSpPr/>
+        <p:nvPr/>
+      </p:nvGrpSpPr>
+      <p:grpSpPr>
+        <a:xfrm>
+          <a:off x="0" y="0"/>
+          <a:ext cx="0" cy="0"/>
+          <a:chOff x="0" y="0"/>
+          <a:chExt cx="0" cy="0"/>
+        </a:xfrm>
+      </p:grpSpPr>
+      <p:sp>
+        <p:nvSpPr>
+          <p:cNvPr id="124" name="Shape 124"/>
+          <p:cNvSpPr>
+            <a:spLocks noGrp="1"/>
+          </p:cNvSpPr>
+          <p:nvPr>
+            <p:ph type="title"/>
+          </p:nvPr>
+        </p:nvSpPr>
+        <p:spPr>
+          <a:xfrm>
+            <a:off x="939800" y="1828800"/>
+            <a:ext cx="11353800" cy="5461000"/>
+          </a:xfrm>
+          <a:prstGeom prst="rect">
+            <a:avLst/>
+          </a:prstGeom>
+        </p:spPr>
+        <p:txBody>
+          <a:bodyPr>
+            <a:noAutofit/>
+          </a:bodyPr>
+          <a:lstStyle/>
+          <a:p>
+            <a:pPr algn="just"/>
+            <a:r>
+              <a:rPr lang="en-US" sz="2400" dirty="0" smtClean="0"/>
+              <a:t>Culture </a:t>
+            </a:r>
+            <a:r>
+              <a:rPr lang="en-US" sz="2400" dirty="0"/>
+              <a:t>is the integrated pattern of knowledge, belief, and behavior that depends upon the capacity for learning and transmitting knowledge to </a:t>
+            </a:r>
+            <a:r>
+              <a:rPr lang="en-US" sz="2400" dirty="0" smtClean="0"/>
+              <a:t>succeeding generations.</a:t>
+            </a:r>
+            <a:r>
+              <a:rPr lang="en-US" sz="2400" dirty="0"/>
+              <a:t/>
+            </a:r>
+            <a:br>
+              <a:rPr lang="en-US" sz="2400" dirty="0"/>
+            </a:br>
+            <a:r>
+              <a:rPr lang="en-US" sz="2400" dirty="0" smtClean="0"/>
+              <a:t/>
+            </a:r>
+            <a:br>
+              <a:rPr lang="en-US" sz="2400" dirty="0" smtClean="0"/>
+            </a:br>
+            <a:r>
+              <a:rPr lang="en-US" sz="2400" dirty="0"/>
+              <a:t/>
+            </a:r>
+            <a:br>
+              <a:rPr lang="en-US" sz="2400" dirty="0"/>
+            </a:br>
+            <a:r>
+              <a:rPr lang="en-US" sz="2400" dirty="0"/>
+              <a:t>Culture is the learned values and behaviors shared by a group of people and play a vital role in how a person performs his or her work based on individual patterns of thinking, feeling, and acting. </a:t>
+            </a:r>
+            <a:r>
+              <a:rPr lang="en-US" sz="2400" dirty="0" smtClean="0"/>
+              <a:t/>
+            </a:r>
+            <a:br>
+              <a:rPr lang="en-US" sz="2400" dirty="0" smtClean="0"/>
+            </a:br>
+            <a:r>
+              <a:rPr lang="en-US" sz="2400" dirty="0"/>
+              <a:t/>
+            </a:r>
+            <a:br>
+              <a:rPr lang="en-US" sz="2400" dirty="0"/>
+            </a:br>
+            <a:r>
+              <a:rPr lang="en-US" sz="2400" dirty="0"/>
+              <a:t/>
+            </a:r>
+            <a:br>
+              <a:rPr lang="en-US" sz="2400" dirty="0"/>
+            </a:br>
+            <a:r>
+              <a:rPr lang="en-US" sz="2400" dirty="0"/>
+              <a:t>Culture has visible attributes like dining, clothing, religious rituals, architectures, or sports while invisible attributes comprise of orientations to environment, time, communication, space, power, individualism, competitiveness, structure, and thinking. </a:t>
+            </a:r>
+            <a:endParaRPr sz="2100" dirty="0"/>
+          </a:p>
+        </p:txBody>
+      </p:sp>
+    </p:spTree>
+    <p:extLst>
+      <p:ext uri="{BB962C8B-B14F-4D97-AF65-F5344CB8AC3E}">
+        <p14:creationId xmlns:p14="http://schemas.microsoft.com/office/powerpoint/2010/main" val="1544498971"/>
+      </p:ext>
+    </p:extLst>
+  </p:cSld>
+  <p:clrMapOvr>
+    <a:masterClrMapping/>
+  </p:clrMapOvr>
+  <p:transition spd="slow"/>
+</p:sld>
+</file>
+
+<file path=ppt/slides/slide6.xml><?xml version="1.0" encoding="utf-8"?>
+<p:sld xmlns:a="http://schemas.openxmlformats.org/drawingml/2006/main" xmlns:r="http://schemas.openxmlformats.org/officeDocument/2006/relationships" xmlns:p="http://schemas.openxmlformats.org/presentationml/2006/main">
+  <p:cSld>
+    <p:spTree>
+      <p:nvGrpSpPr>
+        <p:cNvPr id="1" name=""/>
+        <p:cNvGrpSpPr/>
+        <p:nvPr/>
+      </p:nvGrpSpPr>
+      <p:grpSpPr>
+        <a:xfrm>
+          <a:off x="0" y="0"/>
+          <a:ext cx="0" cy="0"/>
+          <a:chOff x="0" y="0"/>
+          <a:chExt cx="0" cy="0"/>
+        </a:xfrm>
+      </p:grpSpPr>
+      <p:sp>
+        <p:nvSpPr>
+          <p:cNvPr id="124" name="Shape 124"/>
+          <p:cNvSpPr>
+            <a:spLocks noGrp="1"/>
+          </p:cNvSpPr>
+          <p:nvPr>
+            <p:ph type="title"/>
+          </p:nvPr>
+        </p:nvSpPr>
+        <p:spPr>
+          <a:xfrm>
+            <a:off x="952500" y="1143000"/>
+            <a:ext cx="9359900" cy="2108200"/>
+          </a:xfrm>
+          <a:prstGeom prst="rect">
+            <a:avLst/>
+          </a:prstGeom>
+        </p:spPr>
+        <p:txBody>
+          <a:bodyPr/>
+          <a:lstStyle/>
+          <a:p>
+            <a:r>
+              <a:rPr dirty="0"/>
+              <a:t>General </a:t>
+            </a:r>
+            <a:r>
+              <a:rPr dirty="0" smtClean="0"/>
+              <a:t>Challenges</a:t>
+            </a:r>
+            <a:r>
+              <a:rPr lang="en-US" dirty="0" smtClean="0"/>
+              <a:t> – key factors</a:t>
+            </a:r>
+            <a:endParaRPr dirty="0"/>
+          </a:p>
+        </p:txBody>
+      </p:sp>
+      <p:sp>
+        <p:nvSpPr>
+          <p:cNvPr id="125" name="Shape 125"/>
+          <p:cNvSpPr>
+            <a:spLocks noGrp="1"/>
+          </p:cNvSpPr>
+          <p:nvPr>
+            <p:ph type="body" sz="quarter" idx="1"/>
+          </p:nvPr>
+        </p:nvSpPr>
+        <p:spPr>
+          <a:xfrm>
+            <a:off x="1092200" y="3657600"/>
+            <a:ext cx="10744200" cy="5867400"/>
+          </a:xfrm>
+          <a:prstGeom prst="rect">
+            <a:avLst/>
+          </a:prstGeom>
+        </p:spPr>
+        <p:txBody>
+          <a:bodyPr>
+            <a:normAutofit/>
+          </a:bodyPr>
+          <a:lstStyle/>
+          <a:p>
+            <a:pPr algn="l"/>
+            <a:r>
+              <a:rPr lang="en-US" dirty="0"/>
+              <a:t>According to experts in the field </a:t>
+            </a:r>
+            <a:r>
+              <a:rPr lang="en-US" dirty="0" smtClean="0"/>
+              <a:t>some factors include</a:t>
+            </a:r>
+            <a:r>
+              <a:rPr lang="en-US" dirty="0"/>
+              <a:t>: </a:t>
+            </a:r>
+            <a:endParaRPr lang="en-US" dirty="0" smtClean="0"/>
+          </a:p>
+          <a:p>
+            <a:pPr algn="l"/>
+            <a:r>
+              <a:rPr lang="en-US" dirty="0" smtClean="0"/>
+              <a:t>– </a:t>
+            </a:r>
+            <a:r>
+              <a:rPr lang="en-US" dirty="0"/>
+              <a:t>The Cultural Identity </a:t>
+            </a:r>
+            <a:r>
+              <a:rPr lang="en-US" dirty="0" smtClean="0"/>
+              <a:t>Factor</a:t>
+            </a:r>
+          </a:p>
+          <a:p>
+            <a:pPr algn="l"/>
+            <a:r>
+              <a:rPr lang="en-US" dirty="0" smtClean="0"/>
+              <a:t>– </a:t>
+            </a:r>
+            <a:r>
+              <a:rPr lang="en-US" dirty="0"/>
+              <a:t>The Racial Identity </a:t>
+            </a:r>
+            <a:r>
+              <a:rPr lang="en-US" dirty="0" smtClean="0"/>
+              <a:t>Factor</a:t>
+            </a:r>
+          </a:p>
+          <a:p>
+            <a:pPr algn="l"/>
+            <a:r>
+              <a:rPr lang="en-US" dirty="0" smtClean="0"/>
+              <a:t>– </a:t>
+            </a:r>
+            <a:r>
+              <a:rPr lang="en-US" dirty="0"/>
+              <a:t>The Ethnic Identity </a:t>
+            </a:r>
+            <a:r>
+              <a:rPr lang="en-US" dirty="0" smtClean="0"/>
+              <a:t>Factor</a:t>
+            </a:r>
+          </a:p>
+          <a:p>
+            <a:pPr algn="l"/>
+            <a:r>
+              <a:rPr lang="en-US" dirty="0" smtClean="0"/>
+              <a:t>– </a:t>
+            </a:r>
+            <a:r>
+              <a:rPr lang="en-US" dirty="0"/>
+              <a:t>The Gender Role Identity </a:t>
+            </a:r>
+            <a:r>
+              <a:rPr lang="en-US" dirty="0" smtClean="0"/>
+              <a:t>Factor</a:t>
+            </a:r>
+          </a:p>
+          <a:p>
+            <a:pPr algn="l"/>
+            <a:r>
+              <a:rPr lang="en-US" dirty="0" smtClean="0"/>
+              <a:t>– </a:t>
+            </a:r>
+            <a:r>
+              <a:rPr lang="en-US" dirty="0"/>
+              <a:t>The Individual Identity </a:t>
+            </a:r>
+            <a:r>
+              <a:rPr lang="en-US" dirty="0" smtClean="0"/>
+              <a:t>Factor </a:t>
+            </a:r>
+          </a:p>
+          <a:p>
+            <a:pPr algn="l"/>
+            <a:r>
+              <a:rPr lang="en-US" dirty="0" smtClean="0"/>
+              <a:t>– </a:t>
+            </a:r>
+            <a:r>
+              <a:rPr lang="en-US" dirty="0"/>
+              <a:t>The Social Class Identity </a:t>
+            </a:r>
+            <a:r>
+              <a:rPr lang="en-US" dirty="0" smtClean="0"/>
+              <a:t>Factor </a:t>
+            </a:r>
+          </a:p>
+          <a:p>
+            <a:pPr algn="l"/>
+            <a:r>
+              <a:rPr lang="en-US" dirty="0" smtClean="0"/>
+              <a:t>– </a:t>
+            </a:r>
+            <a:r>
+              <a:rPr lang="en-US" dirty="0"/>
+              <a:t>The Age Identity </a:t>
+            </a:r>
+            <a:r>
+              <a:rPr lang="en-US" dirty="0" smtClean="0"/>
+              <a:t>Factor </a:t>
+            </a:r>
+          </a:p>
+          <a:p>
+            <a:pPr algn="l"/>
+            <a:r>
+              <a:rPr lang="en-US" dirty="0" smtClean="0"/>
+              <a:t>– </a:t>
+            </a:r>
+            <a:r>
+              <a:rPr lang="en-US" dirty="0"/>
+              <a:t>The Roles Identity </a:t>
+            </a:r>
+            <a:r>
+              <a:rPr lang="en-US" dirty="0" smtClean="0"/>
+              <a:t>Factor</a:t>
+            </a:r>
+            <a:endParaRPr lang="en-US" dirty="0"/>
+          </a:p>
+        </p:txBody>
+      </p:sp>
+    </p:spTree>
+    <p:extLst>
+      <p:ext uri="{BB962C8B-B14F-4D97-AF65-F5344CB8AC3E}">
+        <p14:creationId xmlns:p14="http://schemas.microsoft.com/office/powerpoint/2010/main" val="2824245201"/>
+      </p:ext>
+    </p:extLst>
+  </p:cSld>
+  <p:clrMapOvr>
+    <a:masterClrMapping/>
+  </p:clrMapOvr>
+  <p:transition spd="slow"/>
+</p:sld>
+</file>
+
+<file path=ppt/slides/slide7.xml><?xml version="1.0" encoding="utf-8"?>
+<p:sld xmlns:a="http://schemas.openxmlformats.org/drawingml/2006/main" xmlns:r="http://schemas.openxmlformats.org/officeDocument/2006/relationships" xmlns:p="http://schemas.openxmlformats.org/presentationml/2006/main">
+  <p:cSld>
+    <p:spTree>
+      <p:nvGrpSpPr>
+        <p:cNvPr id="1" name=""/>
+        <p:cNvGrpSpPr/>
+        <p:nvPr/>
+      </p:nvGrpSpPr>
+      <p:grpSpPr>
+        <a:xfrm>
+          <a:off x="0" y="0"/>
+          <a:ext cx="0" cy="0"/>
+          <a:chOff x="0" y="0"/>
+          <a:chExt cx="0" cy="0"/>
+        </a:xfrm>
+      </p:grpSpPr>
+      <p:pic>
+        <p:nvPicPr>
+          <p:cNvPr id="123" name="110809_familychineseoahu_en_00317_2040x1360.jpeg"/>
+          <p:cNvPicPr>
+            <a:picLocks noGrp="1" noChangeAspect="1"/>
+          </p:cNvPicPr>
+          <p:nvPr>
+            <p:ph type="pic" idx="13"/>
+          </p:nvPr>
+        </p:nvPicPr>
+        <p:blipFill>
+          <a:blip r:embed="rId2">
+            <a:extLst>
+              <a:ext uri="{28A0092B-C50C-407E-A947-70E740481C1C}">
+                <a14:useLocalDpi xmlns:a14="http://schemas.microsoft.com/office/drawing/2010/main" val="0"/>
+              </a:ext>
+            </a:extLst>
+          </a:blip>
+          <a:stretch>
+            <a:fillRect/>
+          </a:stretch>
+        </p:blipFill>
+        <p:spPr>
+          <a:xfrm>
+            <a:off x="6718300" y="1981200"/>
+            <a:ext cx="5334000" cy="6553200"/>
+          </a:xfrm>
+          <a:prstGeom prst="rect">
+            <a:avLst/>
+          </a:prstGeom>
+        </p:spPr>
+      </p:pic>
+      <p:sp>
+        <p:nvSpPr>
+          <p:cNvPr id="124" name="Shape 124"/>
+          <p:cNvSpPr>
+            <a:spLocks noGrp="1"/>
+          </p:cNvSpPr>
+          <p:nvPr>
+            <p:ph type="title"/>
+          </p:nvPr>
+        </p:nvSpPr>
+        <p:spPr>
+          <a:xfrm>
+            <a:off x="939800" y="1143000"/>
+            <a:ext cx="5334000" cy="2489200"/>
+          </a:xfrm>
+          <a:prstGeom prst="rect">
+            <a:avLst/>
+          </a:prstGeom>
+        </p:spPr>
+        <p:txBody>
+          <a:bodyPr/>
+          <a:lstStyle/>
+          <a:p>
+            <a:r>
+              <a:rPr dirty="0"/>
+              <a:t>General Challenges</a:t>
+            </a:r>
+          </a:p>
+        </p:txBody>
+      </p:sp>
+      <p:sp>
+        <p:nvSpPr>
+          <p:cNvPr id="125" name="Shape 125"/>
+          <p:cNvSpPr>
+            <a:spLocks noGrp="1"/>
+          </p:cNvSpPr>
+          <p:nvPr>
+            <p:ph type="body" sz="quarter" idx="1"/>
+          </p:nvPr>
+        </p:nvSpPr>
+        <p:spPr>
+          <a:xfrm>
+            <a:off x="952500" y="3810000"/>
+            <a:ext cx="5334000" cy="5054600"/>
+          </a:xfrm>
+          <a:prstGeom prst="rect">
+            <a:avLst/>
+          </a:prstGeom>
+        </p:spPr>
+        <p:txBody>
+          <a:bodyPr>
+            <a:normAutofit lnSpcReduction="10000"/>
+          </a:bodyPr>
+          <a:lstStyle/>
+          <a:p>
+            <a:pPr algn="just"/>
+            <a:r>
+              <a:rPr lang="en-US" dirty="0"/>
+              <a:t>Every country or even the states within the country have some different national culture and ways of business thinking</a:t>
+            </a:r>
+            <a:r>
+              <a:rPr lang="en-US" dirty="0" smtClean="0"/>
+              <a:t>.</a:t>
+            </a:r>
+          </a:p>
+          <a:p>
+            <a:pPr algn="just"/>
+            <a:endParaRPr lang="en-US" dirty="0" smtClean="0"/>
+          </a:p>
+          <a:p>
+            <a:pPr algn="just"/>
+            <a:r>
+              <a:rPr lang="en-US" dirty="0" smtClean="0"/>
+              <a:t>Not </a:t>
+            </a:r>
+            <a:r>
+              <a:rPr lang="en-US" dirty="0"/>
+              <a:t>understanding them might create issues </a:t>
+            </a:r>
+            <a:r>
+              <a:rPr lang="en-US" dirty="0" smtClean="0"/>
+              <a:t>during the </a:t>
+            </a:r>
+            <a:r>
+              <a:rPr lang="en-US" dirty="0"/>
+              <a:t>projects. PMs should be encouraged to realize and respect these issues.</a:t>
+            </a:r>
+          </a:p>
+          <a:p>
+            <a:pPr algn="l"/>
+            <a:endParaRPr dirty="0"/>
+          </a:p>
+        </p:txBody>
+      </p:sp>
+    </p:spTree>
+    <p:extLst>
+      <p:ext uri="{BB962C8B-B14F-4D97-AF65-F5344CB8AC3E}">
+        <p14:creationId xmlns:p14="http://schemas.microsoft.com/office/powerpoint/2010/main" val="1135872767"/>
+      </p:ext>
+    </p:extLst>
+  </p:cSld>
+  <p:clrMapOvr>
+    <a:masterClrMapping/>
+  </p:clrMapOvr>
+  <p:transition spd="slow"/>
+</p:sld>
+</file>
+
+<file path=ppt/slides/slide8.xml><?xml version="1.0" encoding="utf-8"?>
+<p:sld xmlns:a="http://schemas.openxmlformats.org/drawingml/2006/main" xmlns:r="http://schemas.openxmlformats.org/officeDocument/2006/relationships" xmlns:p="http://schemas.openxmlformats.org/presentationml/2006/main">
+  <p:cSld>
+    <p:spTree>
+      <p:nvGrpSpPr>
+        <p:cNvPr id="1" name=""/>
+        <p:cNvGrpSpPr/>
+        <p:nvPr/>
+      </p:nvGrpSpPr>
+      <p:grpSpPr>
+        <a:xfrm>
+          <a:off x="0" y="0"/>
+          <a:ext cx="0" cy="0"/>
+          <a:chOff x="0" y="0"/>
+          <a:chExt cx="0" cy="0"/>
+        </a:xfrm>
+      </p:grpSpPr>
+      <p:pic>
+        <p:nvPicPr>
+          <p:cNvPr id="123" name="110809_familychineseoahu_en_00317_2040x1360.jpeg"/>
+          <p:cNvPicPr>
+            <a:picLocks noGrp="1" noChangeAspect="1"/>
+          </p:cNvPicPr>
+          <p:nvPr>
+            <p:ph type="pic" idx="13"/>
+          </p:nvPr>
+        </p:nvPicPr>
+        <p:blipFill>
+          <a:blip r:embed="rId2">
+            <a:extLst>
+              <a:ext uri="{28A0092B-C50C-407E-A947-70E740481C1C}">
+                <a14:useLocalDpi xmlns:a14="http://schemas.microsoft.com/office/drawing/2010/main" val="0"/>
+              </a:ext>
+            </a:extLst>
+          </a:blip>
+          <a:stretch>
+            <a:fillRect/>
+          </a:stretch>
+        </p:blipFill>
+        <p:spPr>
+          <a:xfrm>
+            <a:off x="6578600" y="1828800"/>
+            <a:ext cx="5473700" cy="6553200"/>
+          </a:xfrm>
+          <a:prstGeom prst="rect">
+            <a:avLst/>
+          </a:prstGeom>
+        </p:spPr>
+      </p:pic>
+      <p:sp>
+        <p:nvSpPr>
+          <p:cNvPr id="124" name="Shape 124"/>
+          <p:cNvSpPr>
+            <a:spLocks noGrp="1"/>
+          </p:cNvSpPr>
+          <p:nvPr>
+            <p:ph type="title"/>
+          </p:nvPr>
+        </p:nvSpPr>
+        <p:spPr>
+          <a:xfrm>
+            <a:off x="1016000" y="1828800"/>
+            <a:ext cx="5334000" cy="1752600"/>
+          </a:xfrm>
+          <a:prstGeom prst="rect">
+            <a:avLst/>
+          </a:prstGeom>
+        </p:spPr>
+        <p:txBody>
+          <a:bodyPr>
+            <a:normAutofit fontScale="90000"/>
+          </a:bodyPr>
+          <a:lstStyle/>
+          <a:p>
+            <a:r>
+              <a:rPr dirty="0"/>
+              <a:t>General Challenges</a:t>
+            </a:r>
+          </a:p>
+        </p:txBody>
+      </p:sp>
+      <p:sp>
+        <p:nvSpPr>
+          <p:cNvPr id="125" name="Shape 125"/>
+          <p:cNvSpPr>
+            <a:spLocks noGrp="1"/>
+          </p:cNvSpPr>
+          <p:nvPr>
+            <p:ph type="body" sz="quarter" idx="1"/>
+          </p:nvPr>
+        </p:nvSpPr>
+        <p:spPr>
+          <a:xfrm>
+            <a:off x="863600" y="4267200"/>
+            <a:ext cx="5334000" cy="4102100"/>
+          </a:xfrm>
+          <a:prstGeom prst="rect">
+            <a:avLst/>
+          </a:prstGeom>
+        </p:spPr>
+        <p:txBody>
+          <a:bodyPr>
+            <a:normAutofit/>
+          </a:bodyPr>
+          <a:lstStyle/>
+          <a:p>
+            <a:pPr marL="514350" indent="-514350" algn="just">
+              <a:buFont typeface="Arial" pitchFamily="34" charset="0"/>
+              <a:buChar char="•"/>
+            </a:pPr>
+            <a:r>
+              <a:rPr lang="en-US" dirty="0"/>
+              <a:t>Not being careful with stereotypes, and peoples perspective. </a:t>
+            </a:r>
+            <a:endParaRPr lang="en-US" dirty="0" smtClean="0"/>
+          </a:p>
+          <a:p>
+            <a:pPr marL="514350" indent="-514350" algn="just">
+              <a:buFont typeface="Arial" pitchFamily="34" charset="0"/>
+              <a:buChar char="•"/>
+            </a:pPr>
+            <a:endParaRPr lang="en-US" dirty="0" smtClean="0"/>
+          </a:p>
+          <a:p>
+            <a:pPr marL="514350" indent="-514350" algn="just">
+              <a:buFont typeface="Arial" pitchFamily="34" charset="0"/>
+              <a:buChar char="•"/>
+            </a:pPr>
+            <a:r>
+              <a:rPr lang="en-US" dirty="0" smtClean="0"/>
+              <a:t>Every </a:t>
+            </a:r>
+            <a:r>
+              <a:rPr lang="en-US" dirty="0"/>
+              <a:t>individuals have different ideas and ways of looking at life.</a:t>
+            </a:r>
+          </a:p>
+          <a:p>
+            <a:pPr algn="l"/>
+            <a:endParaRPr dirty="0"/>
+          </a:p>
+        </p:txBody>
+      </p:sp>
+    </p:spTree>
+    <p:extLst>
+      <p:ext uri="{BB962C8B-B14F-4D97-AF65-F5344CB8AC3E}">
+        <p14:creationId xmlns:p14="http://schemas.microsoft.com/office/powerpoint/2010/main" val="1518596562"/>
+      </p:ext>
+    </p:extLst>
+  </p:cSld>
+  <p:clrMapOvr>
+    <a:masterClrMapping/>
+  </p:clrMapOvr>
+  <p:transition spd="slow"/>
+</p:sld>
+</file>
+
+<file path=ppt/slides/slide9.xml><?xml version="1.0" encoding="utf-8"?>
+<p:sld xmlns:a="http://schemas.openxmlformats.org/drawingml/2006/main" xmlns:r="http://schemas.openxmlformats.org/officeDocument/2006/relationships" xmlns:p="http://schemas.openxmlformats.org/presentationml/2006/main">
+  <p:cSld>
+    <p:spTree>
+      <p:nvGrpSpPr>
+        <p:cNvPr id="1" name=""/>
+        <p:cNvGrpSpPr/>
+        <p:nvPr/>
+      </p:nvGrpSpPr>
+      <p:grpSpPr>
+        <a:xfrm>
+          <a:off x="0" y="0"/>
+          <a:ext cx="0" cy="0"/>
+          <a:chOff x="0" y="0"/>
+          <a:chExt cx="0" cy="0"/>
+        </a:xfrm>
+      </p:grpSpPr>
+      <p:pic>
+        <p:nvPicPr>
+          <p:cNvPr id="123" name="110809_familychineseoahu_en_00317_2040x1360.jpeg"/>
+          <p:cNvPicPr>
+            <a:picLocks noGrp="1" noChangeAspect="1"/>
+          </p:cNvPicPr>
+          <p:nvPr>
+            <p:ph type="pic" idx="13"/>
+          </p:nvPr>
+        </p:nvPicPr>
+        <p:blipFill>
+          <a:blip r:embed="rId2">
+            <a:extLst>
+              <a:ext uri="{28A0092B-C50C-407E-A947-70E740481C1C}">
+                <a14:useLocalDpi xmlns:a14="http://schemas.microsoft.com/office/drawing/2010/main" val="0"/>
+              </a:ext>
+            </a:extLst>
+          </a:blip>
+          <a:stretch>
+            <a:fillRect/>
+          </a:stretch>
+        </p:blipFill>
+        <p:spPr>
+          <a:xfrm>
+            <a:off x="6718300" y="2749550"/>
+            <a:ext cx="5334000" cy="5861050"/>
+          </a:xfrm>
+          <a:prstGeom prst="rect">
+            <a:avLst/>
+          </a:prstGeom>
+        </p:spPr>
+      </p:pic>
+      <p:sp>
+        <p:nvSpPr>
+          <p:cNvPr id="124" name="Shape 124"/>
+          <p:cNvSpPr>
+            <a:spLocks noGrp="1"/>
+          </p:cNvSpPr>
+          <p:nvPr>
+            <p:ph type="title"/>
+          </p:nvPr>
+        </p:nvSpPr>
+        <p:spPr>
+          <a:prstGeom prst="rect">
+            <a:avLst/>
+          </a:prstGeom>
+        </p:spPr>
+        <p:txBody>
+          <a:bodyPr/>
+          <a:lstStyle/>
+          <a:p>
+            <a:r>
+              <a:rPr dirty="0"/>
+              <a:t>General Challenges</a:t>
+            </a:r>
+          </a:p>
+        </p:txBody>
+      </p:sp>
+      <p:sp>
+        <p:nvSpPr>
+          <p:cNvPr id="125" name="Shape 125"/>
+          <p:cNvSpPr>
+            <a:spLocks noGrp="1"/>
+          </p:cNvSpPr>
+          <p:nvPr>
+            <p:ph type="body" sz="quarter" idx="1"/>
+          </p:nvPr>
+        </p:nvSpPr>
+        <p:spPr>
+          <a:prstGeom prst="rect">
+            <a:avLst/>
+          </a:prstGeom>
+        </p:spPr>
+        <p:txBody>
+          <a:bodyPr>
+            <a:normAutofit fontScale="85000" lnSpcReduction="20000"/>
+          </a:bodyPr>
+          <a:lstStyle/>
+          <a:p>
+            <a:pPr algn="just"/>
+            <a:r>
+              <a:rPr lang="en-US" dirty="0"/>
+              <a:t>Language barrier. This is one of the primary reason behind miscommunication and misunderstanding in teams</a:t>
+            </a:r>
+            <a:r>
+              <a:rPr lang="en-US" dirty="0" smtClean="0"/>
+              <a:t>.</a:t>
+            </a:r>
+          </a:p>
+          <a:p>
+            <a:pPr algn="just"/>
+            <a:endParaRPr lang="en-US" dirty="0"/>
+          </a:p>
+          <a:p>
+            <a:pPr algn="just"/>
+            <a:r>
+              <a:rPr lang="en-US" dirty="0"/>
+              <a:t>Some languages might sound rude, some might sound polite while speaking. By looking at others' voice and tone people might get offended while the person speaking is not </a:t>
+            </a:r>
+            <a:r>
+              <a:rPr lang="en-US" dirty="0" smtClean="0"/>
+              <a:t>actually meaning </a:t>
+            </a:r>
+            <a:r>
+              <a:rPr lang="en-US" dirty="0"/>
+              <a:t>any offense.</a:t>
+            </a:r>
+          </a:p>
+          <a:p>
+            <a:pPr algn="l"/>
+            <a:endParaRPr dirty="0"/>
+          </a:p>
+        </p:txBody>
+      </p:sp>
+    </p:spTree>
+    <p:extLst>
+      <p:ext uri="{BB962C8B-B14F-4D97-AF65-F5344CB8AC3E}">
+        <p14:creationId xmlns:p14="http://schemas.microsoft.com/office/powerpoint/2010/main" val="1119995063"/>
+      </p:ext>
+    </p:extLst>
+  </p:cSld>
+  <p:clrMapOvr>
+    <a:masterClrMapping/>
+  </p:clrMapOvr>
+  <p:transition spd="slow"/>
+  <p:timing>
+    <p:tnLst>
+      <p:par>
+        <p:cTn id="1" dur="indefinite" restart="never" nodeType="tmRoot"/>
+      </p:par>
+    </p:tnLst>
+  </p:timing>
+</p:sld>
+</file>
+
 <file path=ppt/theme/theme1.xml><?xml version="1.0" encoding="utf-8"?>
 <a:theme xmlns:a="http://schemas.openxmlformats.org/drawingml/2006/main" name="White">
   <a:themeElements>

</xml_diff>